<commit_message>
removed some dependencies and unused classes
</commit_message>
<xml_diff>
--- a/doc/diagrams/LogicComponent.pptx
+++ b/doc/diagrams/LogicComponent.pptx
@@ -4,6 +4,9 @@
   <p:sldMasterIdLst>
     <p:sldMasterId id="2147483648" r:id="rId1"/>
   </p:sldMasterIdLst>
+  <p:notesMasterIdLst>
+    <p:notesMasterId r:id="rId3"/>
+  </p:notesMasterIdLst>
   <p:sldIdLst>
     <p:sldId id="256" r:id="rId2"/>
   </p:sldIdLst>
@@ -107,6 +110,440 @@
 </p:presentation>
 </file>
 
+<file path=ppt/notesMasters/notesMaster1.xml><?xml version="1.0" encoding="utf-8"?>
+<p:notesMaster xmlns:a="http://schemas.openxmlformats.org/drawingml/2006/main" xmlns:r="http://schemas.openxmlformats.org/officeDocument/2006/relationships" xmlns:p="http://schemas.openxmlformats.org/presentationml/2006/main">
+  <p:cSld>
+    <p:bg>
+      <p:bgRef idx="1001">
+        <a:schemeClr val="bg1"/>
+      </p:bgRef>
+    </p:bg>
+    <p:spTree>
+      <p:nvGrpSpPr>
+        <p:cNvPr id="1" name=""/>
+        <p:cNvGrpSpPr/>
+        <p:nvPr/>
+      </p:nvGrpSpPr>
+      <p:grpSpPr>
+        <a:xfrm>
+          <a:off x="0" y="0"/>
+          <a:ext cx="0" cy="0"/>
+          <a:chOff x="0" y="0"/>
+          <a:chExt cx="0" cy="0"/>
+        </a:xfrm>
+      </p:grpSpPr>
+      <p:sp>
+        <p:nvSpPr>
+          <p:cNvPr id="2" name="Header Placeholder 1"/>
+          <p:cNvSpPr>
+            <a:spLocks noGrp="1"/>
+          </p:cNvSpPr>
+          <p:nvPr>
+            <p:ph type="hdr" sz="quarter"/>
+          </p:nvPr>
+        </p:nvSpPr>
+        <p:spPr>
+          <a:xfrm>
+            <a:off x="0" y="0"/>
+            <a:ext cx="2971800" cy="457200"/>
+          </a:xfrm>
+          <a:prstGeom prst="rect">
+            <a:avLst/>
+          </a:prstGeom>
+        </p:spPr>
+        <p:txBody>
+          <a:bodyPr vert="horz" lIns="91440" tIns="45720" rIns="91440" bIns="45720" rtlCol="0"/>
+          <a:lstStyle>
+            <a:lvl1pPr algn="l">
+              <a:defRPr sz="1200"/>
+            </a:lvl1pPr>
+          </a:lstStyle>
+          <a:p>
+            <a:endParaRPr lang="en-SG"/>
+          </a:p>
+        </p:txBody>
+      </p:sp>
+      <p:sp>
+        <p:nvSpPr>
+          <p:cNvPr id="3" name="Date Placeholder 2"/>
+          <p:cNvSpPr>
+            <a:spLocks noGrp="1"/>
+          </p:cNvSpPr>
+          <p:nvPr>
+            <p:ph type="dt" idx="1"/>
+          </p:nvPr>
+        </p:nvSpPr>
+        <p:spPr>
+          <a:xfrm>
+            <a:off x="3884613" y="0"/>
+            <a:ext cx="2971800" cy="457200"/>
+          </a:xfrm>
+          <a:prstGeom prst="rect">
+            <a:avLst/>
+          </a:prstGeom>
+        </p:spPr>
+        <p:txBody>
+          <a:bodyPr vert="horz" lIns="91440" tIns="45720" rIns="91440" bIns="45720" rtlCol="0"/>
+          <a:lstStyle>
+            <a:lvl1pPr algn="r">
+              <a:defRPr sz="1200"/>
+            </a:lvl1pPr>
+          </a:lstStyle>
+          <a:p>
+            <a:fld id="{AF301891-4E62-472A-98E9-95DBD40531A4}" type="datetimeFigureOut">
+              <a:rPr lang="en-SG" smtClean="0"/>
+              <a:t>6/7/2012</a:t>
+            </a:fld>
+            <a:endParaRPr lang="en-SG"/>
+          </a:p>
+        </p:txBody>
+      </p:sp>
+      <p:sp>
+        <p:nvSpPr>
+          <p:cNvPr id="4" name="Slide Image Placeholder 3"/>
+          <p:cNvSpPr>
+            <a:spLocks noGrp="1" noRot="1" noChangeAspect="1"/>
+          </p:cNvSpPr>
+          <p:nvPr>
+            <p:ph type="sldImg" idx="2"/>
+          </p:nvPr>
+        </p:nvSpPr>
+        <p:spPr>
+          <a:xfrm>
+            <a:off x="1143000" y="685800"/>
+            <a:ext cx="4572000" cy="3429000"/>
+          </a:xfrm>
+          <a:prstGeom prst="rect">
+            <a:avLst/>
+          </a:prstGeom>
+          <a:noFill/>
+          <a:ln w="12700">
+            <a:solidFill>
+              <a:prstClr val="black"/>
+            </a:solidFill>
+          </a:ln>
+        </p:spPr>
+        <p:txBody>
+          <a:bodyPr vert="horz" lIns="91440" tIns="45720" rIns="91440" bIns="45720" rtlCol="0" anchor="ctr"/>
+          <a:lstStyle/>
+          <a:p>
+            <a:endParaRPr lang="en-SG"/>
+          </a:p>
+        </p:txBody>
+      </p:sp>
+      <p:sp>
+        <p:nvSpPr>
+          <p:cNvPr id="5" name="Notes Placeholder 4"/>
+          <p:cNvSpPr>
+            <a:spLocks noGrp="1"/>
+          </p:cNvSpPr>
+          <p:nvPr>
+            <p:ph type="body" sz="quarter" idx="3"/>
+          </p:nvPr>
+        </p:nvSpPr>
+        <p:spPr>
+          <a:xfrm>
+            <a:off x="685800" y="4343400"/>
+            <a:ext cx="5486400" cy="4114800"/>
+          </a:xfrm>
+          <a:prstGeom prst="rect">
+            <a:avLst/>
+          </a:prstGeom>
+        </p:spPr>
+        <p:txBody>
+          <a:bodyPr vert="horz" lIns="91440" tIns="45720" rIns="91440" bIns="45720" rtlCol="0"/>
+          <a:lstStyle/>
+          <a:p>
+            <a:pPr lvl="0"/>
+            <a:r>
+              <a:rPr lang="en-US" smtClean="0"/>
+              <a:t>Click to edit Master text styles</a:t>
+            </a:r>
+          </a:p>
+          <a:p>
+            <a:pPr lvl="1"/>
+            <a:r>
+              <a:rPr lang="en-US" smtClean="0"/>
+              <a:t>Second level</a:t>
+            </a:r>
+          </a:p>
+          <a:p>
+            <a:pPr lvl="2"/>
+            <a:r>
+              <a:rPr lang="en-US" smtClean="0"/>
+              <a:t>Third level</a:t>
+            </a:r>
+          </a:p>
+          <a:p>
+            <a:pPr lvl="3"/>
+            <a:r>
+              <a:rPr lang="en-US" smtClean="0"/>
+              <a:t>Fourth level</a:t>
+            </a:r>
+          </a:p>
+          <a:p>
+            <a:pPr lvl="4"/>
+            <a:r>
+              <a:rPr lang="en-US" smtClean="0"/>
+              <a:t>Fifth level</a:t>
+            </a:r>
+            <a:endParaRPr lang="en-SG"/>
+          </a:p>
+        </p:txBody>
+      </p:sp>
+      <p:sp>
+        <p:nvSpPr>
+          <p:cNvPr id="6" name="Footer Placeholder 5"/>
+          <p:cNvSpPr>
+            <a:spLocks noGrp="1"/>
+          </p:cNvSpPr>
+          <p:nvPr>
+            <p:ph type="ftr" sz="quarter" idx="4"/>
+          </p:nvPr>
+        </p:nvSpPr>
+        <p:spPr>
+          <a:xfrm>
+            <a:off x="0" y="8685213"/>
+            <a:ext cx="2971800" cy="457200"/>
+          </a:xfrm>
+          <a:prstGeom prst="rect">
+            <a:avLst/>
+          </a:prstGeom>
+        </p:spPr>
+        <p:txBody>
+          <a:bodyPr vert="horz" lIns="91440" tIns="45720" rIns="91440" bIns="45720" rtlCol="0" anchor="b"/>
+          <a:lstStyle>
+            <a:lvl1pPr algn="l">
+              <a:defRPr sz="1200"/>
+            </a:lvl1pPr>
+          </a:lstStyle>
+          <a:p>
+            <a:endParaRPr lang="en-SG"/>
+          </a:p>
+        </p:txBody>
+      </p:sp>
+      <p:sp>
+        <p:nvSpPr>
+          <p:cNvPr id="7" name="Slide Number Placeholder 6"/>
+          <p:cNvSpPr>
+            <a:spLocks noGrp="1"/>
+          </p:cNvSpPr>
+          <p:nvPr>
+            <p:ph type="sldNum" sz="quarter" idx="5"/>
+          </p:nvPr>
+        </p:nvSpPr>
+        <p:spPr>
+          <a:xfrm>
+            <a:off x="3884613" y="8685213"/>
+            <a:ext cx="2971800" cy="457200"/>
+          </a:xfrm>
+          <a:prstGeom prst="rect">
+            <a:avLst/>
+          </a:prstGeom>
+        </p:spPr>
+        <p:txBody>
+          <a:bodyPr vert="horz" lIns="91440" tIns="45720" rIns="91440" bIns="45720" rtlCol="0" anchor="b"/>
+          <a:lstStyle>
+            <a:lvl1pPr algn="r">
+              <a:defRPr sz="1200"/>
+            </a:lvl1pPr>
+          </a:lstStyle>
+          <a:p>
+            <a:fld id="{F5BE55D7-9F3A-4A65-A86C-A2B1968CD57D}" type="slidenum">
+              <a:rPr lang="en-SG" smtClean="0"/>
+              <a:t>‹#›</a:t>
+            </a:fld>
+            <a:endParaRPr lang="en-SG"/>
+          </a:p>
+        </p:txBody>
+      </p:sp>
+    </p:spTree>
+    <p:extLst>
+      <p:ext uri="{BB962C8B-B14F-4D97-AF65-F5344CB8AC3E}">
+        <p14:creationId xmlns:p14="http://schemas.microsoft.com/office/powerpoint/2010/main" val="913918898"/>
+      </p:ext>
+    </p:extLst>
+  </p:cSld>
+  <p:clrMap bg1="lt1" tx1="dk1" bg2="lt2" tx2="dk2" accent1="accent1" accent2="accent2" accent3="accent3" accent4="accent4" accent5="accent5" accent6="accent6" hlink="hlink" folHlink="folHlink"/>
+  <p:notesStyle>
+    <a:lvl1pPr marL="0" algn="l" defTabSz="914400" rtl="0" eaLnBrk="1" latinLnBrk="0" hangingPunct="1">
+      <a:defRPr sz="1200" kern="1200">
+        <a:solidFill>
+          <a:schemeClr val="tx1"/>
+        </a:solidFill>
+        <a:latin typeface="+mn-lt"/>
+        <a:ea typeface="+mn-ea"/>
+        <a:cs typeface="+mn-cs"/>
+      </a:defRPr>
+    </a:lvl1pPr>
+    <a:lvl2pPr marL="457200" algn="l" defTabSz="914400" rtl="0" eaLnBrk="1" latinLnBrk="0" hangingPunct="1">
+      <a:defRPr sz="1200" kern="1200">
+        <a:solidFill>
+          <a:schemeClr val="tx1"/>
+        </a:solidFill>
+        <a:latin typeface="+mn-lt"/>
+        <a:ea typeface="+mn-ea"/>
+        <a:cs typeface="+mn-cs"/>
+      </a:defRPr>
+    </a:lvl2pPr>
+    <a:lvl3pPr marL="914400" algn="l" defTabSz="914400" rtl="0" eaLnBrk="1" latinLnBrk="0" hangingPunct="1">
+      <a:defRPr sz="1200" kern="1200">
+        <a:solidFill>
+          <a:schemeClr val="tx1"/>
+        </a:solidFill>
+        <a:latin typeface="+mn-lt"/>
+        <a:ea typeface="+mn-ea"/>
+        <a:cs typeface="+mn-cs"/>
+      </a:defRPr>
+    </a:lvl3pPr>
+    <a:lvl4pPr marL="1371600" algn="l" defTabSz="914400" rtl="0" eaLnBrk="1" latinLnBrk="0" hangingPunct="1">
+      <a:defRPr sz="1200" kern="1200">
+        <a:solidFill>
+          <a:schemeClr val="tx1"/>
+        </a:solidFill>
+        <a:latin typeface="+mn-lt"/>
+        <a:ea typeface="+mn-ea"/>
+        <a:cs typeface="+mn-cs"/>
+      </a:defRPr>
+    </a:lvl4pPr>
+    <a:lvl5pPr marL="1828800" algn="l" defTabSz="914400" rtl="0" eaLnBrk="1" latinLnBrk="0" hangingPunct="1">
+      <a:defRPr sz="1200" kern="1200">
+        <a:solidFill>
+          <a:schemeClr val="tx1"/>
+        </a:solidFill>
+        <a:latin typeface="+mn-lt"/>
+        <a:ea typeface="+mn-ea"/>
+        <a:cs typeface="+mn-cs"/>
+      </a:defRPr>
+    </a:lvl5pPr>
+    <a:lvl6pPr marL="2286000" algn="l" defTabSz="914400" rtl="0" eaLnBrk="1" latinLnBrk="0" hangingPunct="1">
+      <a:defRPr sz="1200" kern="1200">
+        <a:solidFill>
+          <a:schemeClr val="tx1"/>
+        </a:solidFill>
+        <a:latin typeface="+mn-lt"/>
+        <a:ea typeface="+mn-ea"/>
+        <a:cs typeface="+mn-cs"/>
+      </a:defRPr>
+    </a:lvl6pPr>
+    <a:lvl7pPr marL="2743200" algn="l" defTabSz="914400" rtl="0" eaLnBrk="1" latinLnBrk="0" hangingPunct="1">
+      <a:defRPr sz="1200" kern="1200">
+        <a:solidFill>
+          <a:schemeClr val="tx1"/>
+        </a:solidFill>
+        <a:latin typeface="+mn-lt"/>
+        <a:ea typeface="+mn-ea"/>
+        <a:cs typeface="+mn-cs"/>
+      </a:defRPr>
+    </a:lvl7pPr>
+    <a:lvl8pPr marL="3200400" algn="l" defTabSz="914400" rtl="0" eaLnBrk="1" latinLnBrk="0" hangingPunct="1">
+      <a:defRPr sz="1200" kern="1200">
+        <a:solidFill>
+          <a:schemeClr val="tx1"/>
+        </a:solidFill>
+        <a:latin typeface="+mn-lt"/>
+        <a:ea typeface="+mn-ea"/>
+        <a:cs typeface="+mn-cs"/>
+      </a:defRPr>
+    </a:lvl8pPr>
+    <a:lvl9pPr marL="3657600" algn="l" defTabSz="914400" rtl="0" eaLnBrk="1" latinLnBrk="0" hangingPunct="1">
+      <a:defRPr sz="1200" kern="1200">
+        <a:solidFill>
+          <a:schemeClr val="tx1"/>
+        </a:solidFill>
+        <a:latin typeface="+mn-lt"/>
+        <a:ea typeface="+mn-ea"/>
+        <a:cs typeface="+mn-cs"/>
+      </a:defRPr>
+    </a:lvl9pPr>
+  </p:notesStyle>
+</p:notesMaster>
+</file>
+
+<file path=ppt/notesSlides/notesSlide1.xml><?xml version="1.0" encoding="utf-8"?>
+<p:notes xmlns:a="http://schemas.openxmlformats.org/drawingml/2006/main" xmlns:r="http://schemas.openxmlformats.org/officeDocument/2006/relationships" xmlns:p="http://schemas.openxmlformats.org/presentationml/2006/main">
+  <p:cSld>
+    <p:spTree>
+      <p:nvGrpSpPr>
+        <p:cNvPr id="1" name=""/>
+        <p:cNvGrpSpPr/>
+        <p:nvPr/>
+      </p:nvGrpSpPr>
+      <p:grpSpPr>
+        <a:xfrm>
+          <a:off x="0" y="0"/>
+          <a:ext cx="0" cy="0"/>
+          <a:chOff x="0" y="0"/>
+          <a:chExt cx="0" cy="0"/>
+        </a:xfrm>
+      </p:grpSpPr>
+      <p:sp>
+        <p:nvSpPr>
+          <p:cNvPr id="2" name="Slide Image Placeholder 1"/>
+          <p:cNvSpPr>
+            <a:spLocks noGrp="1" noRot="1" noChangeAspect="1"/>
+          </p:cNvSpPr>
+          <p:nvPr>
+            <p:ph type="sldImg"/>
+          </p:nvPr>
+        </p:nvSpPr>
+        <p:spPr/>
+      </p:sp>
+      <p:sp>
+        <p:nvSpPr>
+          <p:cNvPr id="3" name="Notes Placeholder 2"/>
+          <p:cNvSpPr>
+            <a:spLocks noGrp="1"/>
+          </p:cNvSpPr>
+          <p:nvPr>
+            <p:ph type="body" idx="1"/>
+          </p:nvPr>
+        </p:nvSpPr>
+        <p:spPr/>
+        <p:txBody>
+          <a:bodyPr/>
+          <a:lstStyle/>
+          <a:p>
+            <a:endParaRPr lang="en-SG" dirty="0"/>
+          </a:p>
+        </p:txBody>
+      </p:sp>
+      <p:sp>
+        <p:nvSpPr>
+          <p:cNvPr id="4" name="Slide Number Placeholder 3"/>
+          <p:cNvSpPr>
+            <a:spLocks noGrp="1"/>
+          </p:cNvSpPr>
+          <p:nvPr>
+            <p:ph type="sldNum" sz="quarter" idx="10"/>
+          </p:nvPr>
+        </p:nvSpPr>
+        <p:spPr/>
+        <p:txBody>
+          <a:bodyPr/>
+          <a:lstStyle/>
+          <a:p>
+            <a:fld id="{F5BE55D7-9F3A-4A65-A86C-A2B1968CD57D}" type="slidenum">
+              <a:rPr lang="en-SG" smtClean="0"/>
+              <a:t>1</a:t>
+            </a:fld>
+            <a:endParaRPr lang="en-SG"/>
+          </a:p>
+        </p:txBody>
+      </p:sp>
+    </p:spTree>
+    <p:extLst>
+      <p:ext uri="{BB962C8B-B14F-4D97-AF65-F5344CB8AC3E}">
+        <p14:creationId xmlns:p14="http://schemas.microsoft.com/office/powerpoint/2010/main" val="1998377649"/>
+      </p:ext>
+    </p:extLst>
+  </p:cSld>
+  <p:clrMapOvr>
+    <a:masterClrMapping/>
+  </p:clrMapOvr>
+</p:notes>
+</file>
+
 <file path=ppt/slideLayouts/slideLayout1.xml><?xml version="1.0" encoding="utf-8"?>
 <p:sldLayout xmlns:a="http://schemas.openxmlformats.org/drawingml/2006/main" xmlns:r="http://schemas.openxmlformats.org/officeDocument/2006/relationships" xmlns:p="http://schemas.openxmlformats.org/presentationml/2006/main" type="title" preserve="1">
   <p:cSld name="Title Slide">
@@ -289,7 +726,7 @@
             <a:fld id="{1D8BD707-D9CF-40AE-B4C6-C98DA3205C09}" type="datetimeFigureOut">
               <a:rPr lang="en-US" smtClean="0"/>
               <a:pPr/>
-              <a:t>7/5/2012</a:t>
+              <a:t>7/6/2012</a:t>
             </a:fld>
             <a:endParaRPr lang="en-US"/>
           </a:p>
@@ -456,7 +893,7 @@
             <a:fld id="{1D8BD707-D9CF-40AE-B4C6-C98DA3205C09}" type="datetimeFigureOut">
               <a:rPr lang="en-US" smtClean="0"/>
               <a:pPr/>
-              <a:t>7/5/2012</a:t>
+              <a:t>7/6/2012</a:t>
             </a:fld>
             <a:endParaRPr lang="en-US"/>
           </a:p>
@@ -633,7 +1070,7 @@
             <a:fld id="{1D8BD707-D9CF-40AE-B4C6-C98DA3205C09}" type="datetimeFigureOut">
               <a:rPr lang="en-US" smtClean="0"/>
               <a:pPr/>
-              <a:t>7/5/2012</a:t>
+              <a:t>7/6/2012</a:t>
             </a:fld>
             <a:endParaRPr lang="en-US"/>
           </a:p>
@@ -800,7 +1237,7 @@
             <a:fld id="{1D8BD707-D9CF-40AE-B4C6-C98DA3205C09}" type="datetimeFigureOut">
               <a:rPr lang="en-US" smtClean="0"/>
               <a:pPr/>
-              <a:t>7/5/2012</a:t>
+              <a:t>7/6/2012</a:t>
             </a:fld>
             <a:endParaRPr lang="en-US"/>
           </a:p>
@@ -1043,7 +1480,7 @@
             <a:fld id="{1D8BD707-D9CF-40AE-B4C6-C98DA3205C09}" type="datetimeFigureOut">
               <a:rPr lang="en-US" smtClean="0"/>
               <a:pPr/>
-              <a:t>7/5/2012</a:t>
+              <a:t>7/6/2012</a:t>
             </a:fld>
             <a:endParaRPr lang="en-US"/>
           </a:p>
@@ -1328,7 +1765,7 @@
             <a:fld id="{1D8BD707-D9CF-40AE-B4C6-C98DA3205C09}" type="datetimeFigureOut">
               <a:rPr lang="en-US" smtClean="0"/>
               <a:pPr/>
-              <a:t>7/5/2012</a:t>
+              <a:t>7/6/2012</a:t>
             </a:fld>
             <a:endParaRPr lang="en-US"/>
           </a:p>
@@ -1747,7 +2184,7 @@
             <a:fld id="{1D8BD707-D9CF-40AE-B4C6-C98DA3205C09}" type="datetimeFigureOut">
               <a:rPr lang="en-US" smtClean="0"/>
               <a:pPr/>
-              <a:t>7/5/2012</a:t>
+              <a:t>7/6/2012</a:t>
             </a:fld>
             <a:endParaRPr lang="en-US"/>
           </a:p>
@@ -1862,7 +2299,7 @@
             <a:fld id="{1D8BD707-D9CF-40AE-B4C6-C98DA3205C09}" type="datetimeFigureOut">
               <a:rPr lang="en-US" smtClean="0"/>
               <a:pPr/>
-              <a:t>7/5/2012</a:t>
+              <a:t>7/6/2012</a:t>
             </a:fld>
             <a:endParaRPr lang="en-US"/>
           </a:p>
@@ -1954,7 +2391,7 @@
             <a:fld id="{1D8BD707-D9CF-40AE-B4C6-C98DA3205C09}" type="datetimeFigureOut">
               <a:rPr lang="en-US" smtClean="0"/>
               <a:pPr/>
-              <a:t>7/5/2012</a:t>
+              <a:t>7/6/2012</a:t>
             </a:fld>
             <a:endParaRPr lang="en-US"/>
           </a:p>
@@ -2228,7 +2665,7 @@
             <a:fld id="{1D8BD707-D9CF-40AE-B4C6-C98DA3205C09}" type="datetimeFigureOut">
               <a:rPr lang="en-US" smtClean="0"/>
               <a:pPr/>
-              <a:t>7/5/2012</a:t>
+              <a:t>7/6/2012</a:t>
             </a:fld>
             <a:endParaRPr lang="en-US"/>
           </a:p>
@@ -2478,7 +2915,7 @@
             <a:fld id="{1D8BD707-D9CF-40AE-B4C6-C98DA3205C09}" type="datetimeFigureOut">
               <a:rPr lang="en-US" smtClean="0"/>
               <a:pPr/>
-              <a:t>7/5/2012</a:t>
+              <a:t>7/6/2012</a:t>
             </a:fld>
             <a:endParaRPr lang="en-US"/>
           </a:p>
@@ -2688,7 +3125,7 @@
             <a:fld id="{1D8BD707-D9CF-40AE-B4C6-C98DA3205C09}" type="datetimeFigureOut">
               <a:rPr lang="en-US" smtClean="0"/>
               <a:pPr/>
-              <a:t>7/5/2012</a:t>
+              <a:t>7/6/2012</a:t>
             </a:fld>
             <a:endParaRPr lang="en-US"/>
           </a:p>
@@ -3067,12 +3504,12 @@
         </p:nvSpPr>
         <p:spPr>
           <a:xfrm>
-            <a:off x="1371600" y="76200"/>
-            <a:ext cx="7010400" cy="6705600"/>
+            <a:off x="1295400" y="34183"/>
+            <a:ext cx="6400800" cy="6176115"/>
           </a:xfrm>
           <a:prstGeom prst="roundRect">
             <a:avLst>
-              <a:gd name="adj" fmla="val 6477"/>
+              <a:gd name="adj" fmla="val 3546"/>
             </a:avLst>
           </a:prstGeom>
           <a:solidFill>
@@ -3126,10 +3563,10 @@
         </p:nvGrpSpPr>
         <p:grpSpPr>
           <a:xfrm>
-            <a:off x="2131864" y="1752600"/>
-            <a:ext cx="5183336" cy="1828800"/>
-            <a:chOff x="-4040336" y="1371600"/>
-            <a:chExt cx="5183336" cy="1828800"/>
+            <a:off x="2133600" y="1524000"/>
+            <a:ext cx="4800600" cy="1862984"/>
+            <a:chOff x="-3657600" y="1447800"/>
+            <a:chExt cx="4800600" cy="1862984"/>
           </a:xfrm>
           <a:solidFill>
             <a:schemeClr val="bg1"/>
@@ -3143,8 +3580,8 @@
           </p:nvSpPr>
           <p:spPr>
             <a:xfrm>
-              <a:off x="-4040336" y="1524000"/>
-              <a:ext cx="5183336" cy="1676400"/>
+              <a:off x="-3657600" y="1524000"/>
+              <a:ext cx="4800600" cy="1786784"/>
             </a:xfrm>
             <a:prstGeom prst="rect">
               <a:avLst/>
@@ -3152,7 +3589,10 @@
             <a:grpFill/>
             <a:ln>
               <a:solidFill>
-                <a:srgbClr val="7030A0"/>
+                <a:schemeClr val="accent4">
+                  <a:lumMod val="60000"/>
+                  <a:lumOff val="40000"/>
+                </a:schemeClr>
               </a:solidFill>
             </a:ln>
           </p:spPr>
@@ -3208,8 +3648,8 @@
           </p:nvSpPr>
           <p:spPr>
             <a:xfrm>
-              <a:off x="647700" y="1371600"/>
-              <a:ext cx="495300" cy="152400"/>
+              <a:off x="647700" y="1447800"/>
+              <a:ext cx="495300" cy="76200"/>
             </a:xfrm>
             <a:prstGeom prst="rect">
               <a:avLst/>
@@ -3217,7 +3657,10 @@
             <a:grpFill/>
             <a:ln>
               <a:solidFill>
-                <a:srgbClr val="7030A0"/>
+                <a:schemeClr val="accent4">
+                  <a:lumMod val="60000"/>
+                  <a:lumOff val="40000"/>
+                </a:schemeClr>
               </a:solidFill>
             </a:ln>
           </p:spPr>
@@ -3259,10 +3702,10 @@
         </p:nvGrpSpPr>
         <p:grpSpPr>
           <a:xfrm>
-            <a:off x="2131864" y="381000"/>
-            <a:ext cx="5259536" cy="1143000"/>
-            <a:chOff x="-4116536" y="1371600"/>
-            <a:chExt cx="5259536" cy="1143000"/>
+            <a:off x="2131864" y="152400"/>
+            <a:ext cx="5259536" cy="1066800"/>
+            <a:chOff x="-4116536" y="1447800"/>
+            <a:chExt cx="5259536" cy="1066800"/>
           </a:xfrm>
           <a:solidFill>
             <a:schemeClr val="bg1"/>
@@ -3285,7 +3728,10 @@
             <a:grpFill/>
             <a:ln>
               <a:solidFill>
-                <a:srgbClr val="7030A0"/>
+                <a:schemeClr val="accent4">
+                  <a:lumMod val="60000"/>
+                  <a:lumOff val="40000"/>
+                </a:schemeClr>
               </a:solidFill>
             </a:ln>
           </p:spPr>
@@ -3333,8 +3779,8 @@
           </p:nvSpPr>
           <p:spPr>
             <a:xfrm>
-              <a:off x="647700" y="1371600"/>
-              <a:ext cx="495300" cy="152400"/>
+              <a:off x="647700" y="1447800"/>
+              <a:ext cx="495300" cy="76200"/>
             </a:xfrm>
             <a:prstGeom prst="rect">
               <a:avLst/>
@@ -3342,7 +3788,10 @@
             <a:grpFill/>
             <a:ln>
               <a:solidFill>
-                <a:srgbClr val="7030A0"/>
+                <a:schemeClr val="accent4">
+                  <a:lumMod val="60000"/>
+                  <a:lumOff val="40000"/>
+                </a:schemeClr>
               </a:solidFill>
             </a:ln>
           </p:spPr>
@@ -3384,7 +3833,7 @@
         </p:nvCxnSpPr>
         <p:spPr>
           <a:xfrm>
-            <a:off x="6096000" y="3352800"/>
+            <a:off x="5791200" y="3048000"/>
             <a:ext cx="762000" cy="0"/>
           </a:xfrm>
           <a:prstGeom prst="straightConnector1">
@@ -3419,17 +3868,17 @@
         </p:nvCxnSpPr>
         <p:spPr>
           <a:xfrm>
-            <a:off x="987128" y="2743200"/>
-            <a:ext cx="2289472" cy="0"/>
+            <a:off x="1090301" y="2243984"/>
+            <a:ext cx="2186299" cy="0"/>
           </a:xfrm>
           <a:prstGeom prst="straightConnector1">
             <a:avLst/>
           </a:prstGeom>
           <a:ln w="38100">
             <a:solidFill>
-              <a:schemeClr val="accent1"/>
+              <a:schemeClr val="tx1"/>
             </a:solidFill>
-            <a:prstDash val="sysDot"/>
+            <a:prstDash val="sysDash"/>
             <a:tailEnd type="arrow"/>
           </a:ln>
         </p:spPr>
@@ -3456,10 +3905,10 @@
         </p:nvGrpSpPr>
         <p:grpSpPr>
           <a:xfrm>
-            <a:off x="2131864" y="3886200"/>
-            <a:ext cx="5221436" cy="1524000"/>
-            <a:chOff x="-4078436" y="1371600"/>
-            <a:chExt cx="5221436" cy="1524000"/>
+            <a:off x="2131864" y="3733800"/>
+            <a:ext cx="5221436" cy="1177184"/>
+            <a:chOff x="-4078436" y="1447800"/>
+            <a:chExt cx="5221436" cy="1177184"/>
           </a:xfrm>
           <a:solidFill>
             <a:schemeClr val="bg1"/>
@@ -3474,7 +3923,7 @@
           <p:spPr>
             <a:xfrm>
               <a:off x="-4078436" y="1524000"/>
-              <a:ext cx="5221436" cy="1371600"/>
+              <a:ext cx="5221436" cy="1100984"/>
             </a:xfrm>
             <a:prstGeom prst="rect">
               <a:avLst/>
@@ -3482,7 +3931,10 @@
             <a:grpFill/>
             <a:ln>
               <a:solidFill>
-                <a:srgbClr val="7030A0"/>
+                <a:schemeClr val="accent4">
+                  <a:lumMod val="60000"/>
+                  <a:lumOff val="40000"/>
+                </a:schemeClr>
               </a:solidFill>
             </a:ln>
           </p:spPr>
@@ -3530,8 +3982,8 @@
           </p:nvSpPr>
           <p:spPr>
             <a:xfrm>
-              <a:off x="647700" y="1371600"/>
-              <a:ext cx="495300" cy="152400"/>
+              <a:off x="647700" y="1447800"/>
+              <a:ext cx="495300" cy="76200"/>
             </a:xfrm>
             <a:prstGeom prst="rect">
               <a:avLst/>
@@ -3539,7 +3991,10 @@
             <a:grpFill/>
             <a:ln>
               <a:solidFill>
-                <a:srgbClr val="7030A0"/>
+                <a:schemeClr val="accent4">
+                  <a:lumMod val="60000"/>
+                  <a:lumOff val="40000"/>
+                </a:schemeClr>
               </a:solidFill>
             </a:ln>
           </p:spPr>
@@ -3576,13 +4031,15 @@
       <p:cxnSp>
         <p:nvCxnSpPr>
           <p:cNvPr id="72" name="Straight Arrow Connector 71"/>
-          <p:cNvCxnSpPr/>
+          <p:cNvCxnSpPr>
+            <a:stCxn id="86" idx="2"/>
+          </p:cNvCxnSpPr>
           <p:nvPr/>
         </p:nvCxnSpPr>
         <p:spPr>
-          <a:xfrm flipH="1">
-            <a:off x="3888827" y="1324598"/>
-            <a:ext cx="987973" cy="1025850"/>
+          <a:xfrm>
+            <a:off x="3219450" y="1043299"/>
+            <a:ext cx="669378" cy="1002349"/>
           </a:xfrm>
           <a:prstGeom prst="straightConnector1">
             <a:avLst/>
@@ -3618,7 +4075,7 @@
         </p:nvSpPr>
         <p:spPr>
           <a:xfrm>
-            <a:off x="3276600" y="2350448"/>
+            <a:off x="3276600" y="1862984"/>
             <a:ext cx="1219200" cy="609600"/>
           </a:xfrm>
           <a:prstGeom prst="rect">
@@ -3662,7 +4119,7 @@
         </p:nvSpPr>
         <p:spPr>
           <a:xfrm>
-            <a:off x="2286000" y="867398"/>
+            <a:off x="5562600" y="586099"/>
             <a:ext cx="1714500" cy="457200"/>
           </a:xfrm>
           <a:prstGeom prst="rect">
@@ -3706,7 +4163,7 @@
         </p:nvSpPr>
         <p:spPr>
           <a:xfrm>
-            <a:off x="4191000" y="867398"/>
+            <a:off x="2362200" y="586099"/>
             <a:ext cx="1714500" cy="457200"/>
           </a:xfrm>
           <a:prstGeom prst="rect">
@@ -3750,12 +4207,24 @@
         </p:nvSpPr>
         <p:spPr>
           <a:xfrm>
-            <a:off x="5105400" y="2133600"/>
+            <a:off x="4800600" y="2049568"/>
             <a:ext cx="2038350" cy="304800"/>
           </a:xfrm>
           <a:prstGeom prst="rect">
             <a:avLst/>
           </a:prstGeom>
+          <a:solidFill>
+            <a:schemeClr val="bg1">
+              <a:lumMod val="75000"/>
+            </a:schemeClr>
+          </a:solidFill>
+          <a:ln>
+            <a:solidFill>
+              <a:schemeClr val="bg1">
+                <a:lumMod val="65000"/>
+              </a:schemeClr>
+            </a:solidFill>
+          </a:ln>
         </p:spPr>
         <p:style>
           <a:lnRef idx="2">
@@ -3794,12 +4263,24 @@
         </p:nvSpPr>
         <p:spPr>
           <a:xfrm>
-            <a:off x="5098279" y="2960048"/>
+            <a:off x="4793479" y="2765632"/>
             <a:ext cx="2038350" cy="304800"/>
           </a:xfrm>
           <a:prstGeom prst="rect">
             <a:avLst/>
           </a:prstGeom>
+          <a:solidFill>
+            <a:schemeClr val="bg1">
+              <a:lumMod val="75000"/>
+            </a:schemeClr>
+          </a:solidFill>
+          <a:ln>
+            <a:solidFill>
+              <a:schemeClr val="bg1">
+                <a:lumMod val="65000"/>
+              </a:schemeClr>
+            </a:solidFill>
+          </a:ln>
         </p:spPr>
         <p:style>
           <a:lnRef idx="2">
@@ -3838,12 +4319,24 @@
         </p:nvSpPr>
         <p:spPr>
           <a:xfrm>
-            <a:off x="5024214" y="3048000"/>
+            <a:off x="4719414" y="2853584"/>
             <a:ext cx="2038350" cy="304800"/>
           </a:xfrm>
           <a:prstGeom prst="rect">
             <a:avLst/>
           </a:prstGeom>
+          <a:solidFill>
+            <a:schemeClr val="bg1">
+              <a:lumMod val="75000"/>
+            </a:schemeClr>
+          </a:solidFill>
+          <a:ln>
+            <a:solidFill>
+              <a:schemeClr val="bg1">
+                <a:lumMod val="65000"/>
+              </a:schemeClr>
+            </a:solidFill>
+          </a:ln>
         </p:spPr>
         <p:style>
           <a:lnRef idx="2">
@@ -3882,12 +4375,24 @@
         </p:nvSpPr>
         <p:spPr>
           <a:xfrm>
-            <a:off x="4953000" y="3124200"/>
+            <a:off x="4648200" y="2929784"/>
             <a:ext cx="2038350" cy="304800"/>
           </a:xfrm>
           <a:prstGeom prst="rect">
             <a:avLst/>
           </a:prstGeom>
+          <a:solidFill>
+            <a:schemeClr val="bg1">
+              <a:lumMod val="75000"/>
+            </a:schemeClr>
+          </a:solidFill>
+          <a:ln>
+            <a:solidFill>
+              <a:schemeClr val="bg1">
+                <a:lumMod val="65000"/>
+              </a:schemeClr>
+            </a:solidFill>
+          </a:ln>
         </p:spPr>
         <p:style>
           <a:lnRef idx="2">
@@ -3922,46 +4427,6 @@
           </a:p>
         </p:txBody>
       </p:sp>
-      <p:sp>
-        <p:nvSpPr>
-          <p:cNvPr id="93" name="Isosceles Triangle 92"/>
-          <p:cNvSpPr/>
-          <p:nvPr/>
-        </p:nvSpPr>
-        <p:spPr>
-          <a:xfrm>
-            <a:off x="5972175" y="2438400"/>
-            <a:ext cx="276225" cy="228600"/>
-          </a:xfrm>
-          <a:prstGeom prst="triangle">
-            <a:avLst/>
-          </a:prstGeom>
-        </p:spPr>
-        <p:style>
-          <a:lnRef idx="2">
-            <a:schemeClr val="accent3">
-              <a:shade val="50000"/>
-            </a:schemeClr>
-          </a:lnRef>
-          <a:fillRef idx="1">
-            <a:schemeClr val="accent3"/>
-          </a:fillRef>
-          <a:effectRef idx="0">
-            <a:schemeClr val="accent3"/>
-          </a:effectRef>
-          <a:fontRef idx="minor">
-            <a:schemeClr val="lt1"/>
-          </a:fontRef>
-        </p:style>
-        <p:txBody>
-          <a:bodyPr rtlCol="0" anchor="ctr"/>
-          <a:lstStyle/>
-          <a:p>
-            <a:pPr algn="ctr"/>
-            <a:endParaRPr lang="en-SG"/>
-          </a:p>
-        </p:txBody>
-      </p:sp>
       <p:cxnSp>
         <p:nvCxnSpPr>
           <p:cNvPr id="59" name="Straight Arrow Connector 58"/>
@@ -3972,13 +4437,18 @@
         </p:nvCxnSpPr>
         <p:spPr>
           <a:xfrm flipH="1">
-            <a:off x="6117454" y="2680531"/>
+            <a:off x="5812654" y="2486115"/>
             <a:ext cx="712" cy="279517"/>
           </a:xfrm>
           <a:prstGeom prst="straightConnector1">
             <a:avLst/>
           </a:prstGeom>
           <a:ln>
+            <a:solidFill>
+              <a:schemeClr val="bg1">
+                <a:lumMod val="65000"/>
+              </a:schemeClr>
+            </a:solidFill>
             <a:headEnd type="none" w="med" len="med"/>
             <a:tailEnd type="none" w="med" len="med"/>
           </a:ln>
@@ -4008,7 +4478,7 @@
         </p:nvSpPr>
         <p:spPr>
           <a:xfrm>
-            <a:off x="5010150" y="4417463"/>
+            <a:off x="5010150" y="4112663"/>
             <a:ext cx="1466850" cy="609600"/>
           </a:xfrm>
           <a:prstGeom prst="rect">
@@ -4052,7 +4522,7 @@
         </p:nvSpPr>
         <p:spPr>
           <a:xfrm>
-            <a:off x="2739728" y="4417463"/>
+            <a:off x="2739728" y="4112663"/>
             <a:ext cx="1724025" cy="609600"/>
           </a:xfrm>
           <a:prstGeom prst="rect">
@@ -4096,7 +4566,7 @@
         </p:nvSpPr>
         <p:spPr>
           <a:xfrm>
-            <a:off x="3750714" y="2960048"/>
+            <a:off x="3750714" y="2472584"/>
             <a:ext cx="276225" cy="228600"/>
           </a:xfrm>
           <a:prstGeom prst="triangle">
@@ -4139,15 +4609,15 @@
         </p:nvCxnSpPr>
         <p:spPr>
           <a:xfrm rot="16200000" flipH="1">
-            <a:off x="4201794" y="2875681"/>
-            <a:ext cx="1228815" cy="1854748"/>
+            <a:off x="4110462" y="2479549"/>
+            <a:ext cx="1411479" cy="1854748"/>
           </a:xfrm>
           <a:prstGeom prst="bentConnector3">
             <a:avLst>
-              <a:gd name="adj1" fmla="val 50000"/>
+              <a:gd name="adj1" fmla="val 58476"/>
             </a:avLst>
           </a:prstGeom>
-          <a:ln>
+          <a:ln w="19050">
             <a:headEnd type="none" w="med" len="med"/>
             <a:tailEnd type="none" w="med" len="med"/>
           </a:ln>
@@ -4180,7 +4650,7 @@
         </p:nvCxnSpPr>
         <p:spPr>
           <a:xfrm>
-            <a:off x="4463753" y="4722263"/>
+            <a:off x="4463753" y="4417463"/>
             <a:ext cx="546397" cy="0"/>
           </a:xfrm>
           <a:prstGeom prst="straightConnector1">
@@ -4216,19 +4686,17 @@
         </p:nvCxnSpPr>
         <p:spPr>
           <a:xfrm>
-            <a:off x="987128" y="4724400"/>
-            <a:ext cx="1752600" cy="0"/>
+            <a:off x="1143000" y="4419600"/>
+            <a:ext cx="1596728" cy="0"/>
           </a:xfrm>
           <a:prstGeom prst="straightConnector1">
             <a:avLst/>
           </a:prstGeom>
           <a:ln w="38100">
             <a:solidFill>
-              <a:schemeClr val="accent2">
-                <a:lumMod val="75000"/>
-              </a:schemeClr>
+              <a:schemeClr val="tx1"/>
             </a:solidFill>
-            <a:prstDash val="sysDot"/>
+            <a:prstDash val="sysDash"/>
             <a:tailEnd type="arrow"/>
           </a:ln>
         </p:spPr>
@@ -4255,10 +4723,10 @@
         </p:nvGrpSpPr>
         <p:grpSpPr>
           <a:xfrm>
-            <a:off x="2131864" y="5562600"/>
-            <a:ext cx="5259536" cy="1143000"/>
-            <a:chOff x="-4116536" y="1371600"/>
-            <a:chExt cx="5259536" cy="1143000"/>
+            <a:off x="2131864" y="5029199"/>
+            <a:ext cx="5259536" cy="990600"/>
+            <a:chOff x="-4116536" y="1451133"/>
+            <a:chExt cx="5259536" cy="903358"/>
           </a:xfrm>
           <a:solidFill>
             <a:schemeClr val="bg1"/>
@@ -4273,7 +4741,7 @@
           <p:spPr>
             <a:xfrm>
               <a:off x="-4116536" y="1524000"/>
-              <a:ext cx="5259536" cy="990600"/>
+              <a:ext cx="5259536" cy="830491"/>
             </a:xfrm>
             <a:prstGeom prst="rect">
               <a:avLst/>
@@ -4281,7 +4749,10 @@
             <a:grpFill/>
             <a:ln>
               <a:solidFill>
-                <a:srgbClr val="7030A0"/>
+                <a:schemeClr val="accent4">
+                  <a:lumMod val="60000"/>
+                  <a:lumOff val="40000"/>
+                </a:schemeClr>
               </a:solidFill>
             </a:ln>
           </p:spPr>
@@ -4329,8 +4800,8 @@
           </p:nvSpPr>
           <p:spPr>
             <a:xfrm>
-              <a:off x="647700" y="1371600"/>
-              <a:ext cx="495300" cy="152400"/>
+              <a:off x="647700" y="1451133"/>
+              <a:ext cx="495300" cy="68942"/>
             </a:xfrm>
             <a:prstGeom prst="rect">
               <a:avLst/>
@@ -4338,7 +4809,10 @@
             <a:grpFill/>
             <a:ln>
               <a:solidFill>
-                <a:srgbClr val="7030A0"/>
+                <a:schemeClr val="accent4">
+                  <a:lumMod val="60000"/>
+                  <a:lumOff val="40000"/>
+                </a:schemeClr>
               </a:solidFill>
             </a:ln>
           </p:spPr>
@@ -4380,8 +4854,8 @@
         </p:nvSpPr>
         <p:spPr>
           <a:xfrm>
-            <a:off x="2514600" y="6096000"/>
-            <a:ext cx="2300065" cy="457200"/>
+            <a:off x="2514600" y="5410200"/>
+            <a:ext cx="2300065" cy="533400"/>
           </a:xfrm>
           <a:prstGeom prst="rect">
             <a:avLst/>
@@ -4410,7 +4884,7 @@
             <a:pPr algn="ctr"/>
             <a:r>
               <a:rPr lang="en-US" sz="1600" b="1" dirty="0" err="1" smtClean="0"/>
-              <a:t>EvaluationActivation</a:t>
+              <a:t>EvaluationOpening</a:t>
             </a:r>
             <a:r>
               <a:rPr lang="en-US" sz="1600" b="1" dirty="0" smtClean="0"/>
@@ -4420,8 +4894,8 @@
               <a:rPr lang="en-US" sz="1600" b="1" dirty="0" smtClean="0"/>
             </a:br>
             <a:r>
-              <a:rPr lang="en-US" sz="1600" b="1" dirty="0" smtClean="0"/>
-              <a:t>Servlet</a:t>
+              <a:rPr lang="en-US" sz="1600" b="1" dirty="0" err="1" smtClean="0"/>
+              <a:t>RemindersServlet</a:t>
             </a:r>
             <a:endParaRPr lang="en-SG" sz="1600" b="1" dirty="0"/>
           </a:p>
@@ -4435,8 +4909,8 @@
         </p:nvSpPr>
         <p:spPr>
           <a:xfrm>
-            <a:off x="4969914" y="6096000"/>
-            <a:ext cx="2300065" cy="457200"/>
+            <a:off x="4969914" y="5410200"/>
+            <a:ext cx="2300065" cy="533400"/>
           </a:xfrm>
           <a:prstGeom prst="rect">
             <a:avLst/>
@@ -4465,7 +4939,7 @@
             <a:pPr algn="ctr"/>
             <a:r>
               <a:rPr lang="en-US" sz="1600" b="1" dirty="0" err="1" smtClean="0"/>
-              <a:t>AutomatedReminders</a:t>
+              <a:t>EvaluationClosing</a:t>
             </a:r>
             <a:r>
               <a:rPr lang="en-US" sz="1600" b="1" dirty="0" smtClean="0"/>
@@ -4475,8 +4949,8 @@
               <a:rPr lang="en-US" sz="1600" b="1" dirty="0" smtClean="0"/>
             </a:br>
             <a:r>
-              <a:rPr lang="en-US" sz="1600" b="1" dirty="0" smtClean="0"/>
-              <a:t>Servlet</a:t>
+              <a:rPr lang="en-US" sz="1600" b="1" dirty="0" err="1" smtClean="0"/>
+              <a:t>RemindersServlet</a:t>
             </a:r>
             <a:endParaRPr lang="en-SG" sz="1600" b="1" dirty="0"/>
           </a:p>
@@ -4490,8 +4964,8 @@
         </p:nvCxnSpPr>
         <p:spPr>
           <a:xfrm flipV="1">
-            <a:off x="4495800" y="5027063"/>
-            <a:ext cx="1066800" cy="1068937"/>
+            <a:off x="4533900" y="4722264"/>
+            <a:ext cx="1028700" cy="687936"/>
           </a:xfrm>
           <a:prstGeom prst="straightConnector1">
             <a:avLst/>
@@ -4526,8 +5000,8 @@
         </p:nvCxnSpPr>
         <p:spPr>
           <a:xfrm flipH="1" flipV="1">
-            <a:off x="5848350" y="5027063"/>
-            <a:ext cx="628650" cy="1068937"/>
+            <a:off x="5848350" y="4722264"/>
+            <a:ext cx="400050" cy="687936"/>
           </a:xfrm>
           <a:prstGeom prst="straightConnector1">
             <a:avLst/>
@@ -4562,7 +5036,7 @@
         </p:nvSpPr>
         <p:spPr>
           <a:xfrm>
-            <a:off x="6096000" y="867398"/>
+            <a:off x="4236221" y="586099"/>
             <a:ext cx="1021579" cy="457200"/>
           </a:xfrm>
           <a:prstGeom prst="rect">
@@ -4601,13 +5075,16 @@
       <p:cxnSp>
         <p:nvCxnSpPr>
           <p:cNvPr id="118" name="Straight Arrow Connector 117"/>
-          <p:cNvCxnSpPr/>
+          <p:cNvCxnSpPr>
+            <a:stCxn id="116" idx="2"/>
+            <a:endCxn id="84" idx="0"/>
+          </p:cNvCxnSpPr>
           <p:nvPr/>
         </p:nvCxnSpPr>
         <p:spPr>
           <a:xfrm flipH="1">
-            <a:off x="3891676" y="1333856"/>
-            <a:ext cx="2585324" cy="1025850"/>
+            <a:off x="3886200" y="1043299"/>
+            <a:ext cx="860811" cy="819685"/>
           </a:xfrm>
           <a:prstGeom prst="straightConnector1">
             <a:avLst/>
@@ -4635,6 +5112,834 @@
           </a:fontRef>
         </p:style>
       </p:cxnSp>
+      <p:cxnSp>
+        <p:nvCxnSpPr>
+          <p:cNvPr id="45" name="Straight Arrow Connector 44"/>
+          <p:cNvCxnSpPr>
+            <a:stCxn id="85" idx="1"/>
+            <a:endCxn id="116" idx="3"/>
+          </p:cNvCxnSpPr>
+          <p:nvPr/>
+        </p:nvCxnSpPr>
+        <p:spPr>
+          <a:xfrm flipH="1">
+            <a:off x="5257800" y="814699"/>
+            <a:ext cx="304800" cy="0"/>
+          </a:xfrm>
+          <a:prstGeom prst="straightConnector1">
+            <a:avLst/>
+          </a:prstGeom>
+          <a:ln>
+            <a:solidFill>
+              <a:schemeClr val="accent4">
+                <a:lumMod val="75000"/>
+              </a:schemeClr>
+            </a:solidFill>
+            <a:prstDash val="sysDot"/>
+            <a:headEnd type="arrow" w="med" len="med"/>
+            <a:tailEnd type="none" w="med" len="med"/>
+          </a:ln>
+        </p:spPr>
+        <p:style>
+          <a:lnRef idx="2">
+            <a:schemeClr val="accent2">
+              <a:shade val="50000"/>
+            </a:schemeClr>
+          </a:lnRef>
+          <a:fillRef idx="1">
+            <a:schemeClr val="accent2"/>
+          </a:fillRef>
+          <a:effectRef idx="0">
+            <a:schemeClr val="accent2"/>
+          </a:effectRef>
+          <a:fontRef idx="minor">
+            <a:schemeClr val="lt1"/>
+          </a:fontRef>
+        </p:style>
+      </p:cxnSp>
+      <p:sp>
+        <p:nvSpPr>
+          <p:cNvPr id="10" name="Freeform 9"/>
+          <p:cNvSpPr/>
+          <p:nvPr/>
+        </p:nvSpPr>
+        <p:spPr>
+          <a:xfrm>
+            <a:off x="6118788" y="1062527"/>
+            <a:ext cx="1082111" cy="3042303"/>
+          </a:xfrm>
+          <a:custGeom>
+            <a:avLst/>
+            <a:gdLst>
+              <a:gd name="connsiteX0" fmla="*/ 0 w 982766"/>
+              <a:gd name="connsiteY0" fmla="*/ 3042303 h 3042303"/>
+              <a:gd name="connsiteX1" fmla="*/ 0 w 982766"/>
+              <a:gd name="connsiteY1" fmla="*/ 2452643 h 3042303"/>
+              <a:gd name="connsiteX2" fmla="*/ 982766 w 982766"/>
+              <a:gd name="connsiteY2" fmla="*/ 2452643 h 3042303"/>
+              <a:gd name="connsiteX3" fmla="*/ 974220 w 982766"/>
+              <a:gd name="connsiteY3" fmla="*/ 0 h 3042303"/>
+            </a:gdLst>
+            <a:ahLst/>
+            <a:cxnLst>
+              <a:cxn ang="0">
+                <a:pos x="connsiteX0" y="connsiteY0"/>
+              </a:cxn>
+              <a:cxn ang="0">
+                <a:pos x="connsiteX1" y="connsiteY1"/>
+              </a:cxn>
+              <a:cxn ang="0">
+                <a:pos x="connsiteX2" y="connsiteY2"/>
+              </a:cxn>
+              <a:cxn ang="0">
+                <a:pos x="connsiteX3" y="connsiteY3"/>
+              </a:cxn>
+            </a:cxnLst>
+            <a:rect l="l" t="t" r="r" b="b"/>
+            <a:pathLst>
+              <a:path w="982766" h="3042303">
+                <a:moveTo>
+                  <a:pt x="0" y="3042303"/>
+                </a:moveTo>
+                <a:lnTo>
+                  <a:pt x="0" y="2452643"/>
+                </a:lnTo>
+                <a:lnTo>
+                  <a:pt x="982766" y="2452643"/>
+                </a:lnTo>
+                <a:cubicBezTo>
+                  <a:pt x="979917" y="1635095"/>
+                  <a:pt x="977069" y="817548"/>
+                  <a:pt x="974220" y="0"/>
+                </a:cubicBezTo>
+              </a:path>
+            </a:pathLst>
+          </a:custGeom>
+          <a:noFill/>
+          <a:ln>
+            <a:prstDash val="sysDot"/>
+            <a:headEnd type="none" w="med" len="med"/>
+            <a:tailEnd type="arrow" w="med" len="med"/>
+          </a:ln>
+        </p:spPr>
+        <p:style>
+          <a:lnRef idx="2">
+            <a:schemeClr val="accent2">
+              <a:shade val="50000"/>
+            </a:schemeClr>
+          </a:lnRef>
+          <a:fillRef idx="1">
+            <a:schemeClr val="accent2"/>
+          </a:fillRef>
+          <a:effectRef idx="0">
+            <a:schemeClr val="accent2"/>
+          </a:effectRef>
+          <a:fontRef idx="minor">
+            <a:schemeClr val="lt1"/>
+          </a:fontRef>
+        </p:style>
+        <p:txBody>
+          <a:bodyPr rtlCol="0" anchor="ctr"/>
+          <a:lstStyle/>
+          <a:p>
+            <a:pPr algn="ctr"/>
+            <a:endParaRPr lang="en-SG"/>
+          </a:p>
+        </p:txBody>
+      </p:sp>
+      <p:sp>
+        <p:nvSpPr>
+          <p:cNvPr id="19" name="TextBox 18"/>
+          <p:cNvSpPr txBox="1"/>
+          <p:nvPr/>
+        </p:nvSpPr>
+        <p:spPr>
+          <a:xfrm>
+            <a:off x="457200" y="2091584"/>
+            <a:ext cx="609600" cy="307777"/>
+          </a:xfrm>
+          <a:prstGeom prst="rect">
+            <a:avLst/>
+          </a:prstGeom>
+          <a:grpFill/>
+          <a:ln>
+            <a:noFill/>
+          </a:ln>
+        </p:spPr>
+        <p:style>
+          <a:lnRef idx="2">
+            <a:schemeClr val="accent1">
+              <a:shade val="50000"/>
+            </a:schemeClr>
+          </a:lnRef>
+          <a:fillRef idx="1">
+            <a:schemeClr val="accent1"/>
+          </a:fillRef>
+          <a:effectRef idx="0">
+            <a:schemeClr val="accent1"/>
+          </a:effectRef>
+          <a:fontRef idx="minor">
+            <a:schemeClr val="lt1"/>
+          </a:fontRef>
+        </p:style>
+        <p:txBody>
+          <a:bodyPr rtlCol="0" anchor="t" anchorCtr="0"/>
+          <a:lstStyle>
+            <a:defPPr>
+              <a:defRPr lang="en-US"/>
+            </a:defPPr>
+            <a:lvl1pPr>
+              <a:defRPr sz="1400" b="1">
+                <a:solidFill>
+                  <a:srgbClr val="7030A0"/>
+                </a:solidFill>
+              </a:defRPr>
+            </a:lvl1pPr>
+            <a:lvl2pPr>
+              <a:defRPr>
+                <a:solidFill>
+                  <a:schemeClr val="lt1"/>
+                </a:solidFill>
+              </a:defRPr>
+            </a:lvl2pPr>
+            <a:lvl3pPr>
+              <a:defRPr>
+                <a:solidFill>
+                  <a:schemeClr val="lt1"/>
+                </a:solidFill>
+              </a:defRPr>
+            </a:lvl3pPr>
+            <a:lvl4pPr>
+              <a:defRPr>
+                <a:solidFill>
+                  <a:schemeClr val="lt1"/>
+                </a:solidFill>
+              </a:defRPr>
+            </a:lvl4pPr>
+            <a:lvl5pPr>
+              <a:defRPr>
+                <a:solidFill>
+                  <a:schemeClr val="lt1"/>
+                </a:solidFill>
+              </a:defRPr>
+            </a:lvl5pPr>
+            <a:lvl6pPr>
+              <a:defRPr>
+                <a:solidFill>
+                  <a:schemeClr val="lt1"/>
+                </a:solidFill>
+              </a:defRPr>
+            </a:lvl6pPr>
+            <a:lvl7pPr>
+              <a:defRPr>
+                <a:solidFill>
+                  <a:schemeClr val="lt1"/>
+                </a:solidFill>
+              </a:defRPr>
+            </a:lvl7pPr>
+            <a:lvl8pPr>
+              <a:defRPr>
+                <a:solidFill>
+                  <a:schemeClr val="lt1"/>
+                </a:solidFill>
+              </a:defRPr>
+            </a:lvl8pPr>
+            <a:lvl9pPr>
+              <a:defRPr>
+                <a:solidFill>
+                  <a:schemeClr val="lt1"/>
+                </a:solidFill>
+              </a:defRPr>
+            </a:lvl9pPr>
+          </a:lstStyle>
+          <a:p>
+            <a:pPr algn="r"/>
+            <a:r>
+              <a:rPr lang="en-US" dirty="0">
+                <a:solidFill>
+                  <a:schemeClr val="tx1"/>
+                </a:solidFill>
+              </a:rPr>
+              <a:t>UI</a:t>
+            </a:r>
+            <a:endParaRPr lang="en-SG" dirty="0">
+              <a:solidFill>
+                <a:schemeClr val="tx1"/>
+              </a:solidFill>
+            </a:endParaRPr>
+          </a:p>
+        </p:txBody>
+      </p:sp>
+      <p:sp>
+        <p:nvSpPr>
+          <p:cNvPr id="51" name="TextBox 50"/>
+          <p:cNvSpPr txBox="1"/>
+          <p:nvPr/>
+        </p:nvSpPr>
+        <p:spPr>
+          <a:xfrm>
+            <a:off x="152400" y="4191000"/>
+            <a:ext cx="937901" cy="307777"/>
+          </a:xfrm>
+          <a:prstGeom prst="rect">
+            <a:avLst/>
+          </a:prstGeom>
+          <a:grpFill/>
+          <a:ln>
+            <a:noFill/>
+          </a:ln>
+        </p:spPr>
+        <p:style>
+          <a:lnRef idx="2">
+            <a:schemeClr val="accent1">
+              <a:shade val="50000"/>
+            </a:schemeClr>
+          </a:lnRef>
+          <a:fillRef idx="1">
+            <a:schemeClr val="accent1"/>
+          </a:fillRef>
+          <a:effectRef idx="0">
+            <a:schemeClr val="accent1"/>
+          </a:effectRef>
+          <a:fontRef idx="minor">
+            <a:schemeClr val="lt1"/>
+          </a:fontRef>
+        </p:style>
+        <p:txBody>
+          <a:bodyPr rtlCol="0" anchor="t" anchorCtr="0"/>
+          <a:lstStyle>
+            <a:defPPr>
+              <a:defRPr lang="en-US"/>
+            </a:defPPr>
+            <a:lvl1pPr>
+              <a:defRPr sz="1400" b="1">
+                <a:solidFill>
+                  <a:srgbClr val="7030A0"/>
+                </a:solidFill>
+              </a:defRPr>
+            </a:lvl1pPr>
+            <a:lvl2pPr>
+              <a:defRPr>
+                <a:solidFill>
+                  <a:schemeClr val="lt1"/>
+                </a:solidFill>
+              </a:defRPr>
+            </a:lvl2pPr>
+            <a:lvl3pPr>
+              <a:defRPr>
+                <a:solidFill>
+                  <a:schemeClr val="lt1"/>
+                </a:solidFill>
+              </a:defRPr>
+            </a:lvl3pPr>
+            <a:lvl4pPr>
+              <a:defRPr>
+                <a:solidFill>
+                  <a:schemeClr val="lt1"/>
+                </a:solidFill>
+              </a:defRPr>
+            </a:lvl4pPr>
+            <a:lvl5pPr>
+              <a:defRPr>
+                <a:solidFill>
+                  <a:schemeClr val="lt1"/>
+                </a:solidFill>
+              </a:defRPr>
+            </a:lvl5pPr>
+            <a:lvl6pPr>
+              <a:defRPr>
+                <a:solidFill>
+                  <a:schemeClr val="lt1"/>
+                </a:solidFill>
+              </a:defRPr>
+            </a:lvl6pPr>
+            <a:lvl7pPr>
+              <a:defRPr>
+                <a:solidFill>
+                  <a:schemeClr val="lt1"/>
+                </a:solidFill>
+              </a:defRPr>
+            </a:lvl7pPr>
+            <a:lvl8pPr>
+              <a:defRPr>
+                <a:solidFill>
+                  <a:schemeClr val="lt1"/>
+                </a:solidFill>
+              </a:defRPr>
+            </a:lvl8pPr>
+            <a:lvl9pPr>
+              <a:defRPr>
+                <a:solidFill>
+                  <a:schemeClr val="lt1"/>
+                </a:solidFill>
+              </a:defRPr>
+            </a:lvl9pPr>
+          </a:lstStyle>
+          <a:p>
+            <a:pPr algn="r"/>
+            <a:r>
+              <a:rPr lang="en-US" dirty="0" smtClean="0">
+                <a:solidFill>
+                  <a:schemeClr val="tx1"/>
+                </a:solidFill>
+              </a:rPr>
+              <a:t>Test driver</a:t>
+            </a:r>
+            <a:endParaRPr lang="en-SG" dirty="0">
+              <a:solidFill>
+                <a:schemeClr val="tx1"/>
+              </a:solidFill>
+            </a:endParaRPr>
+          </a:p>
+        </p:txBody>
+      </p:sp>
+      <p:cxnSp>
+        <p:nvCxnSpPr>
+          <p:cNvPr id="52" name="Straight Arrow Connector 51"/>
+          <p:cNvCxnSpPr/>
+          <p:nvPr/>
+        </p:nvCxnSpPr>
+        <p:spPr>
+          <a:xfrm>
+            <a:off x="6477000" y="4406069"/>
+            <a:ext cx="1447800" cy="11394"/>
+          </a:xfrm>
+          <a:prstGeom prst="straightConnector1">
+            <a:avLst/>
+          </a:prstGeom>
+          <a:ln w="38100">
+            <a:solidFill>
+              <a:schemeClr val="tx1"/>
+            </a:solidFill>
+            <a:prstDash val="sysDash"/>
+            <a:tailEnd type="arrow"/>
+          </a:ln>
+        </p:spPr>
+        <p:style>
+          <a:lnRef idx="1">
+            <a:schemeClr val="accent1"/>
+          </a:lnRef>
+          <a:fillRef idx="0">
+            <a:schemeClr val="accent1"/>
+          </a:fillRef>
+          <a:effectRef idx="0">
+            <a:schemeClr val="accent1"/>
+          </a:effectRef>
+          <a:fontRef idx="minor">
+            <a:schemeClr val="tx1"/>
+          </a:fontRef>
+        </p:style>
+      </p:cxnSp>
+      <p:sp>
+        <p:nvSpPr>
+          <p:cNvPr id="54" name="Rounded Rectangle 53"/>
+          <p:cNvSpPr/>
+          <p:nvPr/>
+        </p:nvSpPr>
+        <p:spPr>
+          <a:xfrm>
+            <a:off x="7924800" y="34184"/>
+            <a:ext cx="914400" cy="6176114"/>
+          </a:xfrm>
+          <a:prstGeom prst="roundRect">
+            <a:avLst>
+              <a:gd name="adj" fmla="val 23209"/>
+            </a:avLst>
+          </a:prstGeom>
+          <a:solidFill>
+            <a:schemeClr val="bg1">
+              <a:lumMod val="85000"/>
+            </a:schemeClr>
+          </a:solidFill>
+          <a:ln>
+            <a:solidFill>
+              <a:schemeClr val="bg1">
+                <a:lumMod val="75000"/>
+              </a:schemeClr>
+            </a:solidFill>
+          </a:ln>
+        </p:spPr>
+        <p:style>
+          <a:lnRef idx="2">
+            <a:schemeClr val="accent1">
+              <a:shade val="50000"/>
+            </a:schemeClr>
+          </a:lnRef>
+          <a:fillRef idx="1">
+            <a:schemeClr val="accent1"/>
+          </a:fillRef>
+          <a:effectRef idx="0">
+            <a:schemeClr val="accent1"/>
+          </a:effectRef>
+          <a:fontRef idx="minor">
+            <a:schemeClr val="lt1"/>
+          </a:fontRef>
+        </p:style>
+        <p:txBody>
+          <a:bodyPr vert="vert270" rtlCol="0" anchor="t" anchorCtr="1"/>
+          <a:lstStyle/>
+          <a:p>
+            <a:pPr algn="r"/>
+            <a:r>
+              <a:rPr lang="en-US" sz="1600" b="1" dirty="0" smtClean="0"/>
+              <a:t>Storage</a:t>
+            </a:r>
+            <a:endParaRPr lang="en-SG" sz="1600" b="1" dirty="0"/>
+          </a:p>
+        </p:txBody>
+      </p:sp>
+      <p:sp>
+        <p:nvSpPr>
+          <p:cNvPr id="21" name="Rectangle 20"/>
+          <p:cNvSpPr/>
+          <p:nvPr/>
+        </p:nvSpPr>
+        <p:spPr>
+          <a:xfrm>
+            <a:off x="8382000" y="-381000"/>
+            <a:ext cx="609600" cy="7239000"/>
+          </a:xfrm>
+          <a:prstGeom prst="rect">
+            <a:avLst/>
+          </a:prstGeom>
+          <a:solidFill>
+            <a:schemeClr val="bg1"/>
+          </a:solidFill>
+          <a:ln>
+            <a:noFill/>
+          </a:ln>
+          <a:effectLst>
+            <a:softEdge rad="63500"/>
+          </a:effectLst>
+        </p:spPr>
+        <p:style>
+          <a:lnRef idx="2">
+            <a:schemeClr val="accent1">
+              <a:shade val="50000"/>
+            </a:schemeClr>
+          </a:lnRef>
+          <a:fillRef idx="1">
+            <a:schemeClr val="accent1"/>
+          </a:fillRef>
+          <a:effectRef idx="0">
+            <a:schemeClr val="accent1"/>
+          </a:effectRef>
+          <a:fontRef idx="minor">
+            <a:schemeClr val="lt1"/>
+          </a:fontRef>
+        </p:style>
+        <p:txBody>
+          <a:bodyPr rtlCol="0" anchor="ctr"/>
+          <a:lstStyle/>
+          <a:p>
+            <a:pPr algn="ctr"/>
+            <a:endParaRPr lang="en-SG"/>
+          </a:p>
+        </p:txBody>
+      </p:sp>
+      <p:cxnSp>
+        <p:nvCxnSpPr>
+          <p:cNvPr id="57" name="Straight Arrow Connector 56"/>
+          <p:cNvCxnSpPr/>
+          <p:nvPr/>
+        </p:nvCxnSpPr>
+        <p:spPr>
+          <a:xfrm>
+            <a:off x="7315200" y="1939184"/>
+            <a:ext cx="609600" cy="0"/>
+          </a:xfrm>
+          <a:prstGeom prst="straightConnector1">
+            <a:avLst/>
+          </a:prstGeom>
+          <a:ln w="38100">
+            <a:solidFill>
+              <a:schemeClr val="tx1"/>
+            </a:solidFill>
+            <a:prstDash val="sysDash"/>
+            <a:tailEnd type="arrow"/>
+          </a:ln>
+        </p:spPr>
+        <p:style>
+          <a:lnRef idx="1">
+            <a:schemeClr val="accent1"/>
+          </a:lnRef>
+          <a:fillRef idx="0">
+            <a:schemeClr val="accent1"/>
+          </a:fillRef>
+          <a:effectRef idx="0">
+            <a:schemeClr val="accent1"/>
+          </a:effectRef>
+          <a:fontRef idx="minor">
+            <a:schemeClr val="tx1"/>
+          </a:fontRef>
+        </p:style>
+      </p:cxnSp>
+      <p:sp>
+        <p:nvSpPr>
+          <p:cNvPr id="93" name="Isosceles Triangle 92"/>
+          <p:cNvSpPr/>
+          <p:nvPr/>
+        </p:nvSpPr>
+        <p:spPr>
+          <a:xfrm>
+            <a:off x="5667375" y="2354368"/>
+            <a:ext cx="276225" cy="228600"/>
+          </a:xfrm>
+          <a:prstGeom prst="triangle">
+            <a:avLst/>
+          </a:prstGeom>
+          <a:solidFill>
+            <a:schemeClr val="bg1">
+              <a:lumMod val="75000"/>
+            </a:schemeClr>
+          </a:solidFill>
+          <a:ln>
+            <a:solidFill>
+              <a:schemeClr val="bg1">
+                <a:lumMod val="65000"/>
+              </a:schemeClr>
+            </a:solidFill>
+          </a:ln>
+        </p:spPr>
+        <p:style>
+          <a:lnRef idx="2">
+            <a:schemeClr val="accent3">
+              <a:shade val="50000"/>
+            </a:schemeClr>
+          </a:lnRef>
+          <a:fillRef idx="1">
+            <a:schemeClr val="accent3"/>
+          </a:fillRef>
+          <a:effectRef idx="0">
+            <a:schemeClr val="accent3"/>
+          </a:effectRef>
+          <a:fontRef idx="minor">
+            <a:schemeClr val="lt1"/>
+          </a:fontRef>
+        </p:style>
+        <p:txBody>
+          <a:bodyPr rtlCol="0" anchor="ctr"/>
+          <a:lstStyle/>
+          <a:p>
+            <a:pPr algn="ctr"/>
+            <a:endParaRPr lang="en-SG"/>
+          </a:p>
+        </p:txBody>
+      </p:sp>
+      <p:cxnSp>
+        <p:nvCxnSpPr>
+          <p:cNvPr id="66" name="Straight Arrow Connector 65"/>
+          <p:cNvCxnSpPr/>
+          <p:nvPr/>
+        </p:nvCxnSpPr>
+        <p:spPr>
+          <a:xfrm>
+            <a:off x="4533900" y="1939184"/>
+            <a:ext cx="2571750" cy="0"/>
+          </a:xfrm>
+          <a:prstGeom prst="straightConnector1">
+            <a:avLst/>
+          </a:prstGeom>
+          <a:ln w="38100">
+            <a:solidFill>
+              <a:schemeClr val="tx1"/>
+            </a:solidFill>
+            <a:prstDash val="sysDash"/>
+            <a:headEnd type="none" w="med" len="med"/>
+            <a:tailEnd type="none" w="med" len="med"/>
+          </a:ln>
+        </p:spPr>
+        <p:style>
+          <a:lnRef idx="1">
+            <a:schemeClr val="accent1"/>
+          </a:lnRef>
+          <a:fillRef idx="0">
+            <a:schemeClr val="accent1"/>
+          </a:fillRef>
+          <a:effectRef idx="0">
+            <a:schemeClr val="accent1"/>
+          </a:effectRef>
+          <a:fontRef idx="minor">
+            <a:schemeClr val="tx1"/>
+          </a:fontRef>
+        </p:style>
+      </p:cxnSp>
+      <p:cxnSp>
+        <p:nvCxnSpPr>
+          <p:cNvPr id="79" name="Straight Arrow Connector 78"/>
+          <p:cNvCxnSpPr/>
+          <p:nvPr/>
+        </p:nvCxnSpPr>
+        <p:spPr>
+          <a:xfrm flipV="1">
+            <a:off x="4554908" y="6019800"/>
+            <a:ext cx="0" cy="381000"/>
+          </a:xfrm>
+          <a:prstGeom prst="straightConnector1">
+            <a:avLst/>
+          </a:prstGeom>
+          <a:ln w="38100">
+            <a:solidFill>
+              <a:schemeClr val="tx1"/>
+            </a:solidFill>
+            <a:prstDash val="sysDash"/>
+            <a:tailEnd type="arrow"/>
+          </a:ln>
+        </p:spPr>
+        <p:style>
+          <a:lnRef idx="1">
+            <a:schemeClr val="accent1"/>
+          </a:lnRef>
+          <a:fillRef idx="0">
+            <a:schemeClr val="accent1"/>
+          </a:fillRef>
+          <a:effectRef idx="0">
+            <a:schemeClr val="accent1"/>
+          </a:effectRef>
+          <a:fontRef idx="minor">
+            <a:schemeClr val="tx1"/>
+          </a:fontRef>
+        </p:style>
+      </p:cxnSp>
+      <p:sp>
+        <p:nvSpPr>
+          <p:cNvPr id="94" name="TextBox 93"/>
+          <p:cNvSpPr txBox="1"/>
+          <p:nvPr/>
+        </p:nvSpPr>
+        <p:spPr>
+          <a:xfrm>
+            <a:off x="3657600" y="6411482"/>
+            <a:ext cx="1816337" cy="307777"/>
+          </a:xfrm>
+          <a:prstGeom prst="rect">
+            <a:avLst/>
+          </a:prstGeom>
+          <a:grpFill/>
+          <a:ln>
+            <a:noFill/>
+          </a:ln>
+        </p:spPr>
+        <p:style>
+          <a:lnRef idx="2">
+            <a:schemeClr val="accent1">
+              <a:shade val="50000"/>
+            </a:schemeClr>
+          </a:lnRef>
+          <a:fillRef idx="1">
+            <a:schemeClr val="accent1"/>
+          </a:fillRef>
+          <a:effectRef idx="0">
+            <a:schemeClr val="accent1"/>
+          </a:effectRef>
+          <a:fontRef idx="minor">
+            <a:schemeClr val="lt1"/>
+          </a:fontRef>
+        </p:style>
+        <p:txBody>
+          <a:bodyPr rtlCol="0" anchor="t" anchorCtr="0"/>
+          <a:lstStyle>
+            <a:defPPr>
+              <a:defRPr lang="en-US"/>
+            </a:defPPr>
+            <a:lvl1pPr>
+              <a:defRPr sz="1400" b="1">
+                <a:solidFill>
+                  <a:srgbClr val="7030A0"/>
+                </a:solidFill>
+              </a:defRPr>
+            </a:lvl1pPr>
+            <a:lvl2pPr>
+              <a:defRPr>
+                <a:solidFill>
+                  <a:schemeClr val="lt1"/>
+                </a:solidFill>
+              </a:defRPr>
+            </a:lvl2pPr>
+            <a:lvl3pPr>
+              <a:defRPr>
+                <a:solidFill>
+                  <a:schemeClr val="lt1"/>
+                </a:solidFill>
+              </a:defRPr>
+            </a:lvl3pPr>
+            <a:lvl4pPr>
+              <a:defRPr>
+                <a:solidFill>
+                  <a:schemeClr val="lt1"/>
+                </a:solidFill>
+              </a:defRPr>
+            </a:lvl4pPr>
+            <a:lvl5pPr>
+              <a:defRPr>
+                <a:solidFill>
+                  <a:schemeClr val="lt1"/>
+                </a:solidFill>
+              </a:defRPr>
+            </a:lvl5pPr>
+            <a:lvl6pPr>
+              <a:defRPr>
+                <a:solidFill>
+                  <a:schemeClr val="lt1"/>
+                </a:solidFill>
+              </a:defRPr>
+            </a:lvl6pPr>
+            <a:lvl7pPr>
+              <a:defRPr>
+                <a:solidFill>
+                  <a:schemeClr val="lt1"/>
+                </a:solidFill>
+              </a:defRPr>
+            </a:lvl7pPr>
+            <a:lvl8pPr>
+              <a:defRPr>
+                <a:solidFill>
+                  <a:schemeClr val="lt1"/>
+                </a:solidFill>
+              </a:defRPr>
+            </a:lvl8pPr>
+            <a:lvl9pPr>
+              <a:defRPr>
+                <a:solidFill>
+                  <a:schemeClr val="lt1"/>
+                </a:solidFill>
+              </a:defRPr>
+            </a:lvl9pPr>
+          </a:lstStyle>
+          <a:p>
+            <a:pPr algn="r"/>
+            <a:r>
+              <a:rPr lang="en-US" dirty="0" smtClean="0">
+                <a:solidFill>
+                  <a:schemeClr val="tx1"/>
+                </a:solidFill>
+              </a:rPr>
+              <a:t>App engine </a:t>
+            </a:r>
+            <a:r>
+              <a:rPr lang="en-US" dirty="0" err="1" smtClean="0">
+                <a:solidFill>
+                  <a:schemeClr val="tx1"/>
+                </a:solidFill>
+              </a:rPr>
+              <a:t>cron</a:t>
+            </a:r>
+            <a:r>
+              <a:rPr lang="en-US" dirty="0" smtClean="0">
+                <a:solidFill>
+                  <a:schemeClr val="tx1"/>
+                </a:solidFill>
+              </a:rPr>
+              <a:t> jobs</a:t>
+            </a:r>
+            <a:endParaRPr lang="en-SG" dirty="0">
+              <a:solidFill>
+                <a:schemeClr val="tx1"/>
+              </a:solidFill>
+            </a:endParaRPr>
+          </a:p>
+        </p:txBody>
+      </p:sp>
     </p:spTree>
     <p:extLst>
       <p:ext uri="{BB962C8B-B14F-4D97-AF65-F5344CB8AC3E}">
@@ -4936,4 +6241,289 @@
   <a:objectDefaults/>
   <a:extraClrSchemeLst/>
 </a:theme>
+</file>
+
+<file path=ppt/theme/theme2.xml><?xml version="1.0" encoding="utf-8"?>
+<a:theme xmlns:a="http://schemas.openxmlformats.org/drawingml/2006/main" name="Office Theme">
+  <a:themeElements>
+    <a:clrScheme name="Office">
+      <a:dk1>
+        <a:sysClr val="windowText" lastClr="000000"/>
+      </a:dk1>
+      <a:lt1>
+        <a:sysClr val="window" lastClr="FFFFFF"/>
+      </a:lt1>
+      <a:dk2>
+        <a:srgbClr val="1F497D"/>
+      </a:dk2>
+      <a:lt2>
+        <a:srgbClr val="EEECE1"/>
+      </a:lt2>
+      <a:accent1>
+        <a:srgbClr val="4F81BD"/>
+      </a:accent1>
+      <a:accent2>
+        <a:srgbClr val="C0504D"/>
+      </a:accent2>
+      <a:accent3>
+        <a:srgbClr val="9BBB59"/>
+      </a:accent3>
+      <a:accent4>
+        <a:srgbClr val="8064A2"/>
+      </a:accent4>
+      <a:accent5>
+        <a:srgbClr val="4BACC6"/>
+      </a:accent5>
+      <a:accent6>
+        <a:srgbClr val="F79646"/>
+      </a:accent6>
+      <a:hlink>
+        <a:srgbClr val="0000FF"/>
+      </a:hlink>
+      <a:folHlink>
+        <a:srgbClr val="800080"/>
+      </a:folHlink>
+    </a:clrScheme>
+    <a:fontScheme name="Office">
+      <a:majorFont>
+        <a:latin typeface="Calibri"/>
+        <a:ea typeface=""/>
+        <a:cs typeface=""/>
+        <a:font script="Jpan" typeface="ＭＳ Ｐゴシック"/>
+        <a:font script="Hang" typeface="맑은 고딕"/>
+        <a:font script="Hans" typeface="宋体"/>
+        <a:font script="Hant" typeface="新細明體"/>
+        <a:font script="Arab" typeface="Times New Roman"/>
+        <a:font script="Hebr" typeface="Times New Roman"/>
+        <a:font script="Thai" typeface="Angsana New"/>
+        <a:font script="Ethi" typeface="Nyala"/>
+        <a:font script="Beng" typeface="Vrinda"/>
+        <a:font script="Gujr" typeface="Shruti"/>
+        <a:font script="Khmr" typeface="MoolBoran"/>
+        <a:font script="Knda" typeface="Tunga"/>
+        <a:font script="Guru" typeface="Raavi"/>
+        <a:font script="Cans" typeface="Euphemia"/>
+        <a:font script="Cher" typeface="Plantagenet Cherokee"/>
+        <a:font script="Yiii" typeface="Microsoft Yi Baiti"/>
+        <a:font script="Tibt" typeface="Microsoft Himalaya"/>
+        <a:font script="Thaa" typeface="MV Boli"/>
+        <a:font script="Deva" typeface="Mangal"/>
+        <a:font script="Telu" typeface="Gautami"/>
+        <a:font script="Taml" typeface="Latha"/>
+        <a:font script="Syrc" typeface="Estrangelo Edessa"/>
+        <a:font script="Orya" typeface="Kalinga"/>
+        <a:font script="Mlym" typeface="Kartika"/>
+        <a:font script="Laoo" typeface="DokChampa"/>
+        <a:font script="Sinh" typeface="Iskoola Pota"/>
+        <a:font script="Mong" typeface="Mongolian Baiti"/>
+        <a:font script="Viet" typeface="Times New Roman"/>
+        <a:font script="Uigh" typeface="Microsoft Uighur"/>
+        <a:font script="Geor" typeface="Sylfaen"/>
+      </a:majorFont>
+      <a:minorFont>
+        <a:latin typeface="Calibri"/>
+        <a:ea typeface=""/>
+        <a:cs typeface=""/>
+        <a:font script="Jpan" typeface="ＭＳ Ｐゴシック"/>
+        <a:font script="Hang" typeface="맑은 고딕"/>
+        <a:font script="Hans" typeface="宋体"/>
+        <a:font script="Hant" typeface="新細明體"/>
+        <a:font script="Arab" typeface="Arial"/>
+        <a:font script="Hebr" typeface="Arial"/>
+        <a:font script="Thai" typeface="Cordia New"/>
+        <a:font script="Ethi" typeface="Nyala"/>
+        <a:font script="Beng" typeface="Vrinda"/>
+        <a:font script="Gujr" typeface="Shruti"/>
+        <a:font script="Khmr" typeface="DaunPenh"/>
+        <a:font script="Knda" typeface="Tunga"/>
+        <a:font script="Guru" typeface="Raavi"/>
+        <a:font script="Cans" typeface="Euphemia"/>
+        <a:font script="Cher" typeface="Plantagenet Cherokee"/>
+        <a:font script="Yiii" typeface="Microsoft Yi Baiti"/>
+        <a:font script="Tibt" typeface="Microsoft Himalaya"/>
+        <a:font script="Thaa" typeface="MV Boli"/>
+        <a:font script="Deva" typeface="Mangal"/>
+        <a:font script="Telu" typeface="Gautami"/>
+        <a:font script="Taml" typeface="Latha"/>
+        <a:font script="Syrc" typeface="Estrangelo Edessa"/>
+        <a:font script="Orya" typeface="Kalinga"/>
+        <a:font script="Mlym" typeface="Kartika"/>
+        <a:font script="Laoo" typeface="DokChampa"/>
+        <a:font script="Sinh" typeface="Iskoola Pota"/>
+        <a:font script="Mong" typeface="Mongolian Baiti"/>
+        <a:font script="Viet" typeface="Arial"/>
+        <a:font script="Uigh" typeface="Microsoft Uighur"/>
+        <a:font script="Geor" typeface="Sylfaen"/>
+      </a:minorFont>
+    </a:fontScheme>
+    <a:fmtScheme name="Office">
+      <a:fillStyleLst>
+        <a:solidFill>
+          <a:schemeClr val="phClr"/>
+        </a:solidFill>
+        <a:gradFill rotWithShape="1">
+          <a:gsLst>
+            <a:gs pos="0">
+              <a:schemeClr val="phClr">
+                <a:tint val="50000"/>
+                <a:satMod val="300000"/>
+              </a:schemeClr>
+            </a:gs>
+            <a:gs pos="35000">
+              <a:schemeClr val="phClr">
+                <a:tint val="37000"/>
+                <a:satMod val="300000"/>
+              </a:schemeClr>
+            </a:gs>
+            <a:gs pos="100000">
+              <a:schemeClr val="phClr">
+                <a:tint val="15000"/>
+                <a:satMod val="350000"/>
+              </a:schemeClr>
+            </a:gs>
+          </a:gsLst>
+          <a:lin ang="16200000" scaled="1"/>
+        </a:gradFill>
+        <a:gradFill rotWithShape="1">
+          <a:gsLst>
+            <a:gs pos="0">
+              <a:schemeClr val="phClr">
+                <a:shade val="51000"/>
+                <a:satMod val="130000"/>
+              </a:schemeClr>
+            </a:gs>
+            <a:gs pos="80000">
+              <a:schemeClr val="phClr">
+                <a:shade val="93000"/>
+                <a:satMod val="130000"/>
+              </a:schemeClr>
+            </a:gs>
+            <a:gs pos="100000">
+              <a:schemeClr val="phClr">
+                <a:shade val="94000"/>
+                <a:satMod val="135000"/>
+              </a:schemeClr>
+            </a:gs>
+          </a:gsLst>
+          <a:lin ang="16200000" scaled="0"/>
+        </a:gradFill>
+      </a:fillStyleLst>
+      <a:lnStyleLst>
+        <a:ln w="9525" cap="flat" cmpd="sng" algn="ctr">
+          <a:solidFill>
+            <a:schemeClr val="phClr">
+              <a:shade val="95000"/>
+              <a:satMod val="105000"/>
+            </a:schemeClr>
+          </a:solidFill>
+          <a:prstDash val="solid"/>
+        </a:ln>
+        <a:ln w="25400" cap="flat" cmpd="sng" algn="ctr">
+          <a:solidFill>
+            <a:schemeClr val="phClr"/>
+          </a:solidFill>
+          <a:prstDash val="solid"/>
+        </a:ln>
+        <a:ln w="38100" cap="flat" cmpd="sng" algn="ctr">
+          <a:solidFill>
+            <a:schemeClr val="phClr"/>
+          </a:solidFill>
+          <a:prstDash val="solid"/>
+        </a:ln>
+      </a:lnStyleLst>
+      <a:effectStyleLst>
+        <a:effectStyle>
+          <a:effectLst>
+            <a:outerShdw blurRad="40000" dist="20000" dir="5400000" rotWithShape="0">
+              <a:srgbClr val="000000">
+                <a:alpha val="38000"/>
+              </a:srgbClr>
+            </a:outerShdw>
+          </a:effectLst>
+        </a:effectStyle>
+        <a:effectStyle>
+          <a:effectLst>
+            <a:outerShdw blurRad="40000" dist="23000" dir="5400000" rotWithShape="0">
+              <a:srgbClr val="000000">
+                <a:alpha val="35000"/>
+              </a:srgbClr>
+            </a:outerShdw>
+          </a:effectLst>
+        </a:effectStyle>
+        <a:effectStyle>
+          <a:effectLst>
+            <a:outerShdw blurRad="40000" dist="23000" dir="5400000" rotWithShape="0">
+              <a:srgbClr val="000000">
+                <a:alpha val="35000"/>
+              </a:srgbClr>
+            </a:outerShdw>
+          </a:effectLst>
+          <a:scene3d>
+            <a:camera prst="orthographicFront">
+              <a:rot lat="0" lon="0" rev="0"/>
+            </a:camera>
+            <a:lightRig rig="threePt" dir="t">
+              <a:rot lat="0" lon="0" rev="1200000"/>
+            </a:lightRig>
+          </a:scene3d>
+          <a:sp3d>
+            <a:bevelT w="63500" h="25400"/>
+          </a:sp3d>
+        </a:effectStyle>
+      </a:effectStyleLst>
+      <a:bgFillStyleLst>
+        <a:solidFill>
+          <a:schemeClr val="phClr"/>
+        </a:solidFill>
+        <a:gradFill rotWithShape="1">
+          <a:gsLst>
+            <a:gs pos="0">
+              <a:schemeClr val="phClr">
+                <a:tint val="40000"/>
+                <a:satMod val="350000"/>
+              </a:schemeClr>
+            </a:gs>
+            <a:gs pos="40000">
+              <a:schemeClr val="phClr">
+                <a:tint val="45000"/>
+                <a:shade val="99000"/>
+                <a:satMod val="350000"/>
+              </a:schemeClr>
+            </a:gs>
+            <a:gs pos="100000">
+              <a:schemeClr val="phClr">
+                <a:shade val="20000"/>
+                <a:satMod val="255000"/>
+              </a:schemeClr>
+            </a:gs>
+          </a:gsLst>
+          <a:path path="circle">
+            <a:fillToRect l="50000" t="-80000" r="50000" b="180000"/>
+          </a:path>
+        </a:gradFill>
+        <a:gradFill rotWithShape="1">
+          <a:gsLst>
+            <a:gs pos="0">
+              <a:schemeClr val="phClr">
+                <a:tint val="80000"/>
+                <a:satMod val="300000"/>
+              </a:schemeClr>
+            </a:gs>
+            <a:gs pos="100000">
+              <a:schemeClr val="phClr">
+                <a:shade val="30000"/>
+                <a:satMod val="200000"/>
+              </a:schemeClr>
+            </a:gs>
+          </a:gsLst>
+          <a:path path="circle">
+            <a:fillToRect l="50000" t="50000" r="50000" b="50000"/>
+          </a:path>
+        </a:gradFill>
+      </a:bgFillStyleLst>
+    </a:fmtScheme>
+  </a:themeElements>
+  <a:objectDefaults/>
+  <a:extraClrSchemeLst/>
+</a:theme>
 </file>
</xml_diff>

<commit_message>
renamed storage::manager to storage::api and *Manager.java to *Storage.java
</commit_message>
<xml_diff>
--- a/doc/diagrams/LogicComponent.pptx
+++ b/doc/diagrams/LogicComponent.pptx
@@ -192,7 +192,8 @@
           <a:p>
             <a:fld id="{AF301891-4E62-472A-98E9-95DBD40531A4}" type="datetimeFigureOut">
               <a:rPr lang="en-SG" smtClean="0"/>
-              <a:t>6/7/2012</a:t>
+              <a:pPr/>
+              <a:t>8/7/2012</a:t>
             </a:fld>
             <a:endParaRPr lang="en-SG"/>
           </a:p>
@@ -351,6 +352,7 @@
           <a:p>
             <a:fld id="{F5BE55D7-9F3A-4A65-A86C-A2B1968CD57D}" type="slidenum">
               <a:rPr lang="en-SG" smtClean="0"/>
+              <a:pPr/>
               <a:t>‹#›</a:t>
             </a:fld>
             <a:endParaRPr lang="en-SG"/>
@@ -360,7 +362,7 @@
     </p:spTree>
     <p:extLst>
       <p:ext uri="{BB962C8B-B14F-4D97-AF65-F5344CB8AC3E}">
-        <p14:creationId xmlns:p14="http://schemas.microsoft.com/office/powerpoint/2010/main" val="913918898"/>
+        <p14:creationId xmlns:p14="http://schemas.microsoft.com/office/powerpoint/2010/main" xmlns="" val="913918898"/>
       </p:ext>
     </p:extLst>
   </p:cSld>
@@ -525,6 +527,7 @@
           <a:p>
             <a:fld id="{F5BE55D7-9F3A-4A65-A86C-A2B1968CD57D}" type="slidenum">
               <a:rPr lang="en-SG" smtClean="0"/>
+              <a:pPr/>
               <a:t>1</a:t>
             </a:fld>
             <a:endParaRPr lang="en-SG"/>
@@ -534,7 +537,7 @@
     </p:spTree>
     <p:extLst>
       <p:ext uri="{BB962C8B-B14F-4D97-AF65-F5344CB8AC3E}">
-        <p14:creationId xmlns:p14="http://schemas.microsoft.com/office/powerpoint/2010/main" val="1998377649"/>
+        <p14:creationId xmlns:p14="http://schemas.microsoft.com/office/powerpoint/2010/main" xmlns="" val="1998377649"/>
       </p:ext>
     </p:extLst>
   </p:cSld>
@@ -726,7 +729,7 @@
             <a:fld id="{1D8BD707-D9CF-40AE-B4C6-C98DA3205C09}" type="datetimeFigureOut">
               <a:rPr lang="en-US" smtClean="0"/>
               <a:pPr/>
-              <a:t>7/6/2012</a:t>
+              <a:t>7/8/2012</a:t>
             </a:fld>
             <a:endParaRPr lang="en-US"/>
           </a:p>
@@ -893,7 +896,7 @@
             <a:fld id="{1D8BD707-D9CF-40AE-B4C6-C98DA3205C09}" type="datetimeFigureOut">
               <a:rPr lang="en-US" smtClean="0"/>
               <a:pPr/>
-              <a:t>7/6/2012</a:t>
+              <a:t>7/8/2012</a:t>
             </a:fld>
             <a:endParaRPr lang="en-US"/>
           </a:p>
@@ -1070,7 +1073,7 @@
             <a:fld id="{1D8BD707-D9CF-40AE-B4C6-C98DA3205C09}" type="datetimeFigureOut">
               <a:rPr lang="en-US" smtClean="0"/>
               <a:pPr/>
-              <a:t>7/6/2012</a:t>
+              <a:t>7/8/2012</a:t>
             </a:fld>
             <a:endParaRPr lang="en-US"/>
           </a:p>
@@ -1237,7 +1240,7 @@
             <a:fld id="{1D8BD707-D9CF-40AE-B4C6-C98DA3205C09}" type="datetimeFigureOut">
               <a:rPr lang="en-US" smtClean="0"/>
               <a:pPr/>
-              <a:t>7/6/2012</a:t>
+              <a:t>7/8/2012</a:t>
             </a:fld>
             <a:endParaRPr lang="en-US"/>
           </a:p>
@@ -1480,7 +1483,7 @@
             <a:fld id="{1D8BD707-D9CF-40AE-B4C6-C98DA3205C09}" type="datetimeFigureOut">
               <a:rPr lang="en-US" smtClean="0"/>
               <a:pPr/>
-              <a:t>7/6/2012</a:t>
+              <a:t>7/8/2012</a:t>
             </a:fld>
             <a:endParaRPr lang="en-US"/>
           </a:p>
@@ -1765,7 +1768,7 @@
             <a:fld id="{1D8BD707-D9CF-40AE-B4C6-C98DA3205C09}" type="datetimeFigureOut">
               <a:rPr lang="en-US" smtClean="0"/>
               <a:pPr/>
-              <a:t>7/6/2012</a:t>
+              <a:t>7/8/2012</a:t>
             </a:fld>
             <a:endParaRPr lang="en-US"/>
           </a:p>
@@ -2184,7 +2187,7 @@
             <a:fld id="{1D8BD707-D9CF-40AE-B4C6-C98DA3205C09}" type="datetimeFigureOut">
               <a:rPr lang="en-US" smtClean="0"/>
               <a:pPr/>
-              <a:t>7/6/2012</a:t>
+              <a:t>7/8/2012</a:t>
             </a:fld>
             <a:endParaRPr lang="en-US"/>
           </a:p>
@@ -2299,7 +2302,7 @@
             <a:fld id="{1D8BD707-D9CF-40AE-B4C6-C98DA3205C09}" type="datetimeFigureOut">
               <a:rPr lang="en-US" smtClean="0"/>
               <a:pPr/>
-              <a:t>7/6/2012</a:t>
+              <a:t>7/8/2012</a:t>
             </a:fld>
             <a:endParaRPr lang="en-US"/>
           </a:p>
@@ -2391,7 +2394,7 @@
             <a:fld id="{1D8BD707-D9CF-40AE-B4C6-C98DA3205C09}" type="datetimeFigureOut">
               <a:rPr lang="en-US" smtClean="0"/>
               <a:pPr/>
-              <a:t>7/6/2012</a:t>
+              <a:t>7/8/2012</a:t>
             </a:fld>
             <a:endParaRPr lang="en-US"/>
           </a:p>
@@ -2665,7 +2668,7 @@
             <a:fld id="{1D8BD707-D9CF-40AE-B4C6-C98DA3205C09}" type="datetimeFigureOut">
               <a:rPr lang="en-US" smtClean="0"/>
               <a:pPr/>
-              <a:t>7/6/2012</a:t>
+              <a:t>7/8/2012</a:t>
             </a:fld>
             <a:endParaRPr lang="en-US"/>
           </a:p>
@@ -2915,7 +2918,7 @@
             <a:fld id="{1D8BD707-D9CF-40AE-B4C6-C98DA3205C09}" type="datetimeFigureOut">
               <a:rPr lang="en-US" smtClean="0"/>
               <a:pPr/>
-              <a:t>7/6/2012</a:t>
+              <a:t>7/8/2012</a:t>
             </a:fld>
             <a:endParaRPr lang="en-US"/>
           </a:p>
@@ -3125,7 +3128,7 @@
             <a:fld id="{1D8BD707-D9CF-40AE-B4C6-C98DA3205C09}" type="datetimeFigureOut">
               <a:rPr lang="en-US" smtClean="0"/>
               <a:pPr/>
-              <a:t>7/6/2012</a:t>
+              <a:t>7/8/2012</a:t>
             </a:fld>
             <a:endParaRPr lang="en-US"/>
           </a:p>
@@ -3564,9 +3567,9 @@
         <p:grpSpPr>
           <a:xfrm>
             <a:off x="2133600" y="1524000"/>
-            <a:ext cx="4800600" cy="1447800"/>
-            <a:chOff x="-3657600" y="1447800"/>
-            <a:chExt cx="4800600" cy="1447800"/>
+            <a:ext cx="2590800" cy="1447800"/>
+            <a:chOff x="-1447800" y="1447800"/>
+            <a:chExt cx="2590800" cy="1447800"/>
           </a:xfrm>
           <a:solidFill>
             <a:schemeClr val="bg1"/>
@@ -3580,8 +3583,8 @@
           </p:nvSpPr>
           <p:spPr>
             <a:xfrm>
-              <a:off x="-3657600" y="1524000"/>
-              <a:ext cx="4800600" cy="1371600"/>
+              <a:off x="-1447800" y="1524000"/>
+              <a:ext cx="2590800" cy="1371600"/>
             </a:xfrm>
             <a:prstGeom prst="rect">
               <a:avLst/>
@@ -4297,14 +4300,13 @@
           <p:cNvPr id="102" name="Elbow Connector 101"/>
           <p:cNvCxnSpPr>
             <a:stCxn id="100" idx="3"/>
-            <a:endCxn id="98" idx="0"/>
           </p:cNvCxnSpPr>
           <p:nvPr/>
         </p:nvCxnSpPr>
         <p:spPr>
           <a:xfrm rot="16200000" flipH="1">
-            <a:off x="4186662" y="2403349"/>
-            <a:ext cx="1259079" cy="1854748"/>
+            <a:off x="3866505" y="2723505"/>
+            <a:ext cx="1261218" cy="1216575"/>
           </a:xfrm>
           <a:prstGeom prst="bentConnector3">
             <a:avLst>
@@ -4653,13 +4655,15 @@
       <p:cxnSp>
         <p:nvCxnSpPr>
           <p:cNvPr id="110" name="Straight Arrow Connector 109"/>
-          <p:cNvCxnSpPr/>
+          <p:cNvCxnSpPr>
+            <a:endCxn id="98" idx="2"/>
+          </p:cNvCxnSpPr>
           <p:nvPr/>
         </p:nvCxnSpPr>
         <p:spPr>
           <a:xfrm flipV="1">
-            <a:off x="4533900" y="4722264"/>
-            <a:ext cx="1028700" cy="687936"/>
+            <a:off x="4533900" y="4569863"/>
+            <a:ext cx="1209675" cy="840337"/>
           </a:xfrm>
           <a:prstGeom prst="straightConnector1">
             <a:avLst/>
@@ -4689,13 +4693,15 @@
       <p:cxnSp>
         <p:nvCxnSpPr>
           <p:cNvPr id="113" name="Straight Arrow Connector 112"/>
-          <p:cNvCxnSpPr/>
+          <p:cNvCxnSpPr>
+            <a:endCxn id="98" idx="2"/>
+          </p:cNvCxnSpPr>
           <p:nvPr/>
         </p:nvCxnSpPr>
         <p:spPr>
           <a:xfrm flipH="1" flipV="1">
-            <a:off x="5848350" y="4722264"/>
-            <a:ext cx="400050" cy="687936"/>
+            <a:off x="5743575" y="4569863"/>
+            <a:ext cx="504825" cy="840337"/>
           </a:xfrm>
           <a:prstGeom prst="straightConnector1">
             <a:avLst/>
@@ -4853,96 +4859,6 @@
       </p:cxnSp>
       <p:sp>
         <p:nvSpPr>
-          <p:cNvPr id="10" name="Freeform 9"/>
-          <p:cNvSpPr/>
-          <p:nvPr/>
-        </p:nvSpPr>
-        <p:spPr>
-          <a:xfrm>
-            <a:off x="6118788" y="1062528"/>
-            <a:ext cx="1082111" cy="2897736"/>
-          </a:xfrm>
-          <a:custGeom>
-            <a:avLst/>
-            <a:gdLst>
-              <a:gd name="connsiteX0" fmla="*/ 0 w 982766"/>
-              <a:gd name="connsiteY0" fmla="*/ 3042303 h 3042303"/>
-              <a:gd name="connsiteX1" fmla="*/ 0 w 982766"/>
-              <a:gd name="connsiteY1" fmla="*/ 2452643 h 3042303"/>
-              <a:gd name="connsiteX2" fmla="*/ 982766 w 982766"/>
-              <a:gd name="connsiteY2" fmla="*/ 2452643 h 3042303"/>
-              <a:gd name="connsiteX3" fmla="*/ 974220 w 982766"/>
-              <a:gd name="connsiteY3" fmla="*/ 0 h 3042303"/>
-            </a:gdLst>
-            <a:ahLst/>
-            <a:cxnLst>
-              <a:cxn ang="0">
-                <a:pos x="connsiteX0" y="connsiteY0"/>
-              </a:cxn>
-              <a:cxn ang="0">
-                <a:pos x="connsiteX1" y="connsiteY1"/>
-              </a:cxn>
-              <a:cxn ang="0">
-                <a:pos x="connsiteX2" y="connsiteY2"/>
-              </a:cxn>
-              <a:cxn ang="0">
-                <a:pos x="connsiteX3" y="connsiteY3"/>
-              </a:cxn>
-            </a:cxnLst>
-            <a:rect l="l" t="t" r="r" b="b"/>
-            <a:pathLst>
-              <a:path w="982766" h="3042303">
-                <a:moveTo>
-                  <a:pt x="0" y="3042303"/>
-                </a:moveTo>
-                <a:lnTo>
-                  <a:pt x="0" y="2452643"/>
-                </a:lnTo>
-                <a:lnTo>
-                  <a:pt x="982766" y="2452643"/>
-                </a:lnTo>
-                <a:cubicBezTo>
-                  <a:pt x="979917" y="1635095"/>
-                  <a:pt x="977069" y="817548"/>
-                  <a:pt x="974220" y="0"/>
-                </a:cubicBezTo>
-              </a:path>
-            </a:pathLst>
-          </a:custGeom>
-          <a:noFill/>
-          <a:ln>
-            <a:prstDash val="sysDot"/>
-            <a:headEnd type="none" w="med" len="med"/>
-            <a:tailEnd type="arrow" w="med" len="med"/>
-          </a:ln>
-        </p:spPr>
-        <p:style>
-          <a:lnRef idx="2">
-            <a:schemeClr val="accent2">
-              <a:shade val="50000"/>
-            </a:schemeClr>
-          </a:lnRef>
-          <a:fillRef idx="1">
-            <a:schemeClr val="accent2"/>
-          </a:fillRef>
-          <a:effectRef idx="0">
-            <a:schemeClr val="accent2"/>
-          </a:effectRef>
-          <a:fontRef idx="minor">
-            <a:schemeClr val="lt1"/>
-          </a:fontRef>
-        </p:style>
-        <p:txBody>
-          <a:bodyPr rtlCol="0" anchor="ctr"/>
-          <a:lstStyle/>
-          <a:p>
-            <a:pPr algn="ctr"/>
-            <a:endParaRPr lang="en-SG"/>
-          </a:p>
-        </p:txBody>
-      </p:sp>
-      <p:sp>
-        <p:nvSpPr>
           <p:cNvPr id="19" name="TextBox 18"/>
           <p:cNvSpPr txBox="1"/>
           <p:nvPr/>
@@ -5339,8 +5255,8 @@
         </p:nvCxnSpPr>
         <p:spPr>
           <a:xfrm>
-            <a:off x="7315200" y="2209800"/>
-            <a:ext cx="609600" cy="0"/>
+            <a:off x="4572000" y="2209800"/>
+            <a:ext cx="3352800" cy="0"/>
           </a:xfrm>
           <a:prstGeom prst="straightConnector1">
             <a:avLst/>
@@ -5351,44 +5267,6 @@
             </a:solidFill>
             <a:prstDash val="sysDash"/>
             <a:tailEnd type="arrow"/>
-          </a:ln>
-        </p:spPr>
-        <p:style>
-          <a:lnRef idx="1">
-            <a:schemeClr val="accent1"/>
-          </a:lnRef>
-          <a:fillRef idx="0">
-            <a:schemeClr val="accent1"/>
-          </a:fillRef>
-          <a:effectRef idx="0">
-            <a:schemeClr val="accent1"/>
-          </a:effectRef>
-          <a:fontRef idx="minor">
-            <a:schemeClr val="tx1"/>
-          </a:fontRef>
-        </p:style>
-      </p:cxnSp>
-      <p:cxnSp>
-        <p:nvCxnSpPr>
-          <p:cNvPr id="66" name="Straight Arrow Connector 65"/>
-          <p:cNvCxnSpPr/>
-          <p:nvPr/>
-        </p:nvCxnSpPr>
-        <p:spPr>
-          <a:xfrm>
-            <a:off x="4533900" y="2209800"/>
-            <a:ext cx="2571750" cy="0"/>
-          </a:xfrm>
-          <a:prstGeom prst="straightConnector1">
-            <a:avLst/>
-          </a:prstGeom>
-          <a:ln w="38100">
-            <a:solidFill>
-              <a:schemeClr val="tx1"/>
-            </a:solidFill>
-            <a:prstDash val="sysDash"/>
-            <a:headEnd type="none" w="med" len="med"/>
-            <a:tailEnd type="none" w="med" len="med"/>
           </a:ln>
         </p:spPr>
         <p:style>
@@ -5582,10 +5460,90 @@
           </a:p>
         </p:txBody>
       </p:sp>
+      <p:cxnSp>
+        <p:nvCxnSpPr>
+          <p:cNvPr id="48" name="Straight Arrow Connector 47"/>
+          <p:cNvCxnSpPr>
+            <a:stCxn id="116" idx="2"/>
+            <a:endCxn id="98" idx="0"/>
+          </p:cNvCxnSpPr>
+          <p:nvPr/>
+        </p:nvCxnSpPr>
+        <p:spPr>
+          <a:xfrm>
+            <a:off x="4747011" y="1043299"/>
+            <a:ext cx="996564" cy="2916964"/>
+          </a:xfrm>
+          <a:prstGeom prst="straightConnector1">
+            <a:avLst/>
+          </a:prstGeom>
+          <a:ln>
+            <a:prstDash val="sysDot"/>
+            <a:headEnd type="arrow" w="med" len="med"/>
+            <a:tailEnd type="none" w="med" len="med"/>
+          </a:ln>
+        </p:spPr>
+        <p:style>
+          <a:lnRef idx="2">
+            <a:schemeClr val="accent2">
+              <a:shade val="50000"/>
+            </a:schemeClr>
+          </a:lnRef>
+          <a:fillRef idx="1">
+            <a:schemeClr val="accent2"/>
+          </a:fillRef>
+          <a:effectRef idx="0">
+            <a:schemeClr val="accent2"/>
+          </a:effectRef>
+          <a:fontRef idx="minor">
+            <a:schemeClr val="lt1"/>
+          </a:fontRef>
+        </p:style>
+      </p:cxnSp>
+      <p:cxnSp>
+        <p:nvCxnSpPr>
+          <p:cNvPr id="50" name="Straight Arrow Connector 49"/>
+          <p:cNvCxnSpPr>
+            <a:stCxn id="85" idx="2"/>
+            <a:endCxn id="98" idx="0"/>
+          </p:cNvCxnSpPr>
+          <p:nvPr/>
+        </p:nvCxnSpPr>
+        <p:spPr>
+          <a:xfrm flipH="1">
+            <a:off x="5743575" y="1043299"/>
+            <a:ext cx="676275" cy="2916964"/>
+          </a:xfrm>
+          <a:prstGeom prst="straightConnector1">
+            <a:avLst/>
+          </a:prstGeom>
+          <a:ln>
+            <a:prstDash val="sysDot"/>
+            <a:headEnd type="arrow" w="med" len="med"/>
+            <a:tailEnd type="none" w="med" len="med"/>
+          </a:ln>
+        </p:spPr>
+        <p:style>
+          <a:lnRef idx="2">
+            <a:schemeClr val="accent2">
+              <a:shade val="50000"/>
+            </a:schemeClr>
+          </a:lnRef>
+          <a:fillRef idx="1">
+            <a:schemeClr val="accent2"/>
+          </a:fillRef>
+          <a:effectRef idx="0">
+            <a:schemeClr val="accent2"/>
+          </a:effectRef>
+          <a:fontRef idx="minor">
+            <a:schemeClr val="lt1"/>
+          </a:fontRef>
+        </p:style>
+      </p:cxnSp>
     </p:spTree>
     <p:extLst>
       <p:ext uri="{BB962C8B-B14F-4D97-AF65-F5344CB8AC3E}">
-        <p14:creationId xmlns:p14="http://schemas.microsoft.com/office/powerpoint/2010/main" val="2312643091"/>
+        <p14:creationId xmlns:p14="http://schemas.microsoft.com/office/powerpoint/2010/main" xmlns="" val="2312643091"/>
       </p:ext>
     </p:extLst>
   </p:cSld>

</xml_diff>

<commit_message>
Handled Issue 409 [Rename *Storage classes to *Logic.] Update Issue 409 Renamed the classes and updated DevMan accordingly. Did a minor tweak for Issue 388 (CourseDbTest.java)
</commit_message>
<xml_diff>
--- a/doc/diagrams/LogicComponent.pptx
+++ b/doc/diagrams/LogicComponent.pptx
@@ -193,7 +193,7 @@
             <a:fld id="{AF301891-4E62-472A-98E9-95DBD40531A4}" type="datetimeFigureOut">
               <a:rPr lang="en-SG" smtClean="0"/>
               <a:pPr/>
-              <a:t>27/10/12</a:t>
+              <a:t>1/12/2012</a:t>
             </a:fld>
             <a:endParaRPr lang="en-SG"/>
           </a:p>
@@ -729,7 +729,7 @@
             <a:fld id="{1D8BD707-D9CF-40AE-B4C6-C98DA3205C09}" type="datetimeFigureOut">
               <a:rPr lang="en-US" smtClean="0"/>
               <a:pPr/>
-              <a:t>27/10/12</a:t>
+              <a:t>12/1/2012</a:t>
             </a:fld>
             <a:endParaRPr lang="en-US"/>
           </a:p>
@@ -896,7 +896,7 @@
             <a:fld id="{1D8BD707-D9CF-40AE-B4C6-C98DA3205C09}" type="datetimeFigureOut">
               <a:rPr lang="en-US" smtClean="0"/>
               <a:pPr/>
-              <a:t>27/10/12</a:t>
+              <a:t>12/1/2012</a:t>
             </a:fld>
             <a:endParaRPr lang="en-US"/>
           </a:p>
@@ -1073,7 +1073,7 @@
             <a:fld id="{1D8BD707-D9CF-40AE-B4C6-C98DA3205C09}" type="datetimeFigureOut">
               <a:rPr lang="en-US" smtClean="0"/>
               <a:pPr/>
-              <a:t>27/10/12</a:t>
+              <a:t>12/1/2012</a:t>
             </a:fld>
             <a:endParaRPr lang="en-US"/>
           </a:p>
@@ -1240,7 +1240,7 @@
             <a:fld id="{1D8BD707-D9CF-40AE-B4C6-C98DA3205C09}" type="datetimeFigureOut">
               <a:rPr lang="en-US" smtClean="0"/>
               <a:pPr/>
-              <a:t>27/10/12</a:t>
+              <a:t>12/1/2012</a:t>
             </a:fld>
             <a:endParaRPr lang="en-US"/>
           </a:p>
@@ -1483,7 +1483,7 @@
             <a:fld id="{1D8BD707-D9CF-40AE-B4C6-C98DA3205C09}" type="datetimeFigureOut">
               <a:rPr lang="en-US" smtClean="0"/>
               <a:pPr/>
-              <a:t>27/10/12</a:t>
+              <a:t>12/1/2012</a:t>
             </a:fld>
             <a:endParaRPr lang="en-US"/>
           </a:p>
@@ -1768,7 +1768,7 @@
             <a:fld id="{1D8BD707-D9CF-40AE-B4C6-C98DA3205C09}" type="datetimeFigureOut">
               <a:rPr lang="en-US" smtClean="0"/>
               <a:pPr/>
-              <a:t>27/10/12</a:t>
+              <a:t>12/1/2012</a:t>
             </a:fld>
             <a:endParaRPr lang="en-US"/>
           </a:p>
@@ -2187,7 +2187,7 @@
             <a:fld id="{1D8BD707-D9CF-40AE-B4C6-C98DA3205C09}" type="datetimeFigureOut">
               <a:rPr lang="en-US" smtClean="0"/>
               <a:pPr/>
-              <a:t>27/10/12</a:t>
+              <a:t>12/1/2012</a:t>
             </a:fld>
             <a:endParaRPr lang="en-US"/>
           </a:p>
@@ -2302,7 +2302,7 @@
             <a:fld id="{1D8BD707-D9CF-40AE-B4C6-C98DA3205C09}" type="datetimeFigureOut">
               <a:rPr lang="en-US" smtClean="0"/>
               <a:pPr/>
-              <a:t>27/10/12</a:t>
+              <a:t>12/1/2012</a:t>
             </a:fld>
             <a:endParaRPr lang="en-US"/>
           </a:p>
@@ -2394,7 +2394,7 @@
             <a:fld id="{1D8BD707-D9CF-40AE-B4C6-C98DA3205C09}" type="datetimeFigureOut">
               <a:rPr lang="en-US" smtClean="0"/>
               <a:pPr/>
-              <a:t>27/10/12</a:t>
+              <a:t>12/1/2012</a:t>
             </a:fld>
             <a:endParaRPr lang="en-US"/>
           </a:p>
@@ -2668,7 +2668,7 @@
             <a:fld id="{1D8BD707-D9CF-40AE-B4C6-C98DA3205C09}" type="datetimeFigureOut">
               <a:rPr lang="en-US" smtClean="0"/>
               <a:pPr/>
-              <a:t>27/10/12</a:t>
+              <a:t>12/1/2012</a:t>
             </a:fld>
             <a:endParaRPr lang="en-US"/>
           </a:p>
@@ -2918,7 +2918,7 @@
             <a:fld id="{1D8BD707-D9CF-40AE-B4C6-C98DA3205C09}" type="datetimeFigureOut">
               <a:rPr lang="en-US" smtClean="0"/>
               <a:pPr/>
-              <a:t>27/10/12</a:t>
+              <a:t>12/1/2012</a:t>
             </a:fld>
             <a:endParaRPr lang="en-US"/>
           </a:p>
@@ -3128,7 +3128,7 @@
             <a:fld id="{1D8BD707-D9CF-40AE-B4C6-C98DA3205C09}" type="datetimeFigureOut">
               <a:rPr lang="en-US" smtClean="0"/>
               <a:pPr/>
-              <a:t>27/10/12</a:t>
+              <a:t>12/1/2012</a:t>
             </a:fld>
             <a:endParaRPr lang="en-US"/>
           </a:p>
@@ -3507,7 +3507,7 @@
         </p:nvSpPr>
         <p:spPr>
           <a:xfrm>
-            <a:off x="1295400" y="34183"/>
+            <a:off x="1295400" y="110383"/>
             <a:ext cx="6400800" cy="6176115"/>
           </a:xfrm>
           <a:prstGeom prst="roundRect">
@@ -3566,10 +3566,10 @@
         </p:nvGrpSpPr>
         <p:grpSpPr>
           <a:xfrm>
-            <a:off x="2133600" y="1524000"/>
-            <a:ext cx="3505200" cy="1447800"/>
-            <a:chOff x="-1447800" y="1447800"/>
-            <a:chExt cx="2590800" cy="1447800"/>
+            <a:off x="2131864" y="338912"/>
+            <a:ext cx="2258240" cy="2236150"/>
+            <a:chOff x="-828261" y="1447800"/>
+            <a:chExt cx="1971261" cy="2497536"/>
           </a:xfrm>
           <a:solidFill>
             <a:schemeClr val="bg1"/>
@@ -3583,8 +3583,8 @@
           </p:nvSpPr>
           <p:spPr>
             <a:xfrm>
-              <a:off x="-1447800" y="1524000"/>
-              <a:ext cx="2590800" cy="1371600"/>
+              <a:off x="-828261" y="1524001"/>
+              <a:ext cx="1971261" cy="2421335"/>
             </a:xfrm>
             <a:prstGeom prst="rect">
               <a:avLst/>
@@ -3705,10 +3705,10 @@
         </p:nvGrpSpPr>
         <p:grpSpPr>
           <a:xfrm>
-            <a:off x="2131864" y="152400"/>
-            <a:ext cx="5259536" cy="1066800"/>
-            <a:chOff x="-4116536" y="1447800"/>
-            <a:chExt cx="5259536" cy="1066800"/>
+            <a:off x="4814665" y="304800"/>
+            <a:ext cx="2576735" cy="4637306"/>
+            <a:chOff x="-1433735" y="1447800"/>
+            <a:chExt cx="2576735" cy="4637306"/>
           </a:xfrm>
           <a:solidFill>
             <a:schemeClr val="bg1"/>
@@ -3722,8 +3722,8 @@
           </p:nvSpPr>
           <p:spPr>
             <a:xfrm>
-              <a:off x="-4116536" y="1524000"/>
-              <a:ext cx="5259536" cy="990600"/>
+              <a:off x="-1433735" y="1523999"/>
+              <a:ext cx="2576734" cy="4561107"/>
             </a:xfrm>
             <a:prstGeom prst="rect">
               <a:avLst/>
@@ -3831,13 +3831,15 @@
       <p:cxnSp>
         <p:nvCxnSpPr>
           <p:cNvPr id="42" name="Straight Arrow Connector 41"/>
-          <p:cNvCxnSpPr/>
+          <p:cNvCxnSpPr>
+            <a:endCxn id="84" idx="0"/>
+          </p:cNvCxnSpPr>
           <p:nvPr/>
         </p:nvCxnSpPr>
         <p:spPr>
-          <a:xfrm>
-            <a:off x="1090301" y="2243984"/>
-            <a:ext cx="2186299" cy="0"/>
+          <a:xfrm flipV="1">
+            <a:off x="1143000" y="1600200"/>
+            <a:ext cx="1295402" cy="9626"/>
           </a:xfrm>
           <a:prstGeom prst="straightConnector1">
             <a:avLst/>
@@ -3873,10 +3875,10 @@
         </p:nvGrpSpPr>
         <p:grpSpPr>
           <a:xfrm>
-            <a:off x="2131864" y="3581400"/>
-            <a:ext cx="5221436" cy="1177184"/>
-            <a:chOff x="-4078436" y="1447800"/>
-            <a:chExt cx="5221436" cy="1177184"/>
+            <a:off x="2131862" y="2667000"/>
+            <a:ext cx="2258241" cy="2275106"/>
+            <a:chOff x="-613964" y="1447800"/>
+            <a:chExt cx="1756964" cy="2275106"/>
           </a:xfrm>
           <a:solidFill>
             <a:schemeClr val="bg1"/>
@@ -3890,8 +3892,8 @@
           </p:nvSpPr>
           <p:spPr>
             <a:xfrm>
-              <a:off x="-4078436" y="1524000"/>
-              <a:ext cx="5221436" cy="1100984"/>
+              <a:off x="-613964" y="1523999"/>
+              <a:ext cx="1756963" cy="2198907"/>
             </a:xfrm>
             <a:prstGeom prst="rect">
               <a:avLst/>
@@ -3996,45 +3998,6 @@
           </p:txBody>
         </p:sp>
       </p:grpSp>
-      <p:cxnSp>
-        <p:nvCxnSpPr>
-          <p:cNvPr id="72" name="Straight Arrow Connector 71"/>
-          <p:cNvCxnSpPr>
-            <a:stCxn id="86" idx="2"/>
-          </p:cNvCxnSpPr>
-          <p:nvPr/>
-        </p:nvCxnSpPr>
-        <p:spPr>
-          <a:xfrm>
-            <a:off x="3162300" y="990600"/>
-            <a:ext cx="726528" cy="1055048"/>
-          </a:xfrm>
-          <a:prstGeom prst="straightConnector1">
-            <a:avLst/>
-          </a:prstGeom>
-          <a:ln>
-            <a:prstDash val="sysDot"/>
-            <a:headEnd type="arrow" w="med" len="med"/>
-            <a:tailEnd type="none" w="med" len="med"/>
-          </a:ln>
-        </p:spPr>
-        <p:style>
-          <a:lnRef idx="2">
-            <a:schemeClr val="accent2">
-              <a:shade val="50000"/>
-            </a:schemeClr>
-          </a:lnRef>
-          <a:fillRef idx="1">
-            <a:schemeClr val="accent2"/>
-          </a:fillRef>
-          <a:effectRef idx="0">
-            <a:schemeClr val="accent2"/>
-          </a:effectRef>
-          <a:fontRef idx="minor">
-            <a:schemeClr val="lt1"/>
-          </a:fontRef>
-        </p:style>
-      </p:cxnSp>
       <p:sp>
         <p:nvSpPr>
           <p:cNvPr id="84" name="Rectangle 83"/>
@@ -4042,9 +4005,9 @@
           <p:nvPr/>
         </p:nvSpPr>
         <p:spPr>
-          <a:xfrm>
-            <a:off x="3276600" y="1862984"/>
-            <a:ext cx="2209800" cy="609600"/>
+          <a:xfrm rot="16200000">
+            <a:off x="2262339" y="938062"/>
+            <a:ext cx="1676400" cy="1324275"/>
           </a:xfrm>
           <a:prstGeom prst="rect">
             <a:avLst/>
@@ -4087,12 +4050,18 @@
         </p:nvSpPr>
         <p:spPr>
           <a:xfrm>
-            <a:off x="2362200" y="586099"/>
-            <a:ext cx="1600200" cy="404501"/>
+            <a:off x="5486400" y="3352800"/>
+            <a:ext cx="1676400" cy="304800"/>
           </a:xfrm>
           <a:prstGeom prst="rect">
             <a:avLst/>
           </a:prstGeom>
+          <a:solidFill>
+            <a:schemeClr val="accent4">
+              <a:lumMod val="60000"/>
+              <a:lumOff val="40000"/>
+            </a:schemeClr>
+          </a:solidFill>
         </p:spPr>
         <p:style>
           <a:lnRef idx="2">
@@ -4130,13 +4099,19 @@
           <p:nvPr/>
         </p:nvSpPr>
         <p:spPr>
-          <a:xfrm>
-            <a:off x="5010150" y="3960263"/>
-            <a:ext cx="1466850" cy="609600"/>
+          <a:xfrm rot="16200000">
+            <a:off x="2696519" y="3710076"/>
+            <a:ext cx="1619498" cy="455063"/>
           </a:xfrm>
           <a:prstGeom prst="rect">
             <a:avLst/>
           </a:prstGeom>
+          <a:solidFill>
+            <a:schemeClr val="accent2">
+              <a:lumMod val="60000"/>
+              <a:lumOff val="40000"/>
+            </a:schemeClr>
+          </a:solidFill>
         </p:spPr>
         <p:style>
           <a:lnRef idx="2">
@@ -4174,13 +4149,19 @@
           <p:nvPr/>
         </p:nvSpPr>
         <p:spPr>
-          <a:xfrm>
-            <a:off x="2739728" y="3960263"/>
-            <a:ext cx="1724025" cy="609600"/>
+          <a:xfrm rot="16200000">
+            <a:off x="1824774" y="3728533"/>
+            <a:ext cx="1645397" cy="418146"/>
           </a:xfrm>
           <a:prstGeom prst="rect">
             <a:avLst/>
           </a:prstGeom>
+          <a:solidFill>
+            <a:schemeClr val="accent2">
+              <a:lumMod val="60000"/>
+              <a:lumOff val="40000"/>
+            </a:schemeClr>
+          </a:solidFill>
         </p:spPr>
         <p:style>
           <a:lnRef idx="2">
@@ -4219,7 +4200,7 @@
         </p:nvSpPr>
         <p:spPr>
           <a:xfrm>
-            <a:off x="3750714" y="2472584"/>
+            <a:off x="3368156" y="2438400"/>
             <a:ext cx="276225" cy="228600"/>
           </a:xfrm>
           <a:prstGeom prst="triangle">
@@ -4256,20 +4237,21 @@
           <p:cNvPr id="102" name="Elbow Connector 101"/>
           <p:cNvCxnSpPr>
             <a:stCxn id="100" idx="3"/>
+            <a:endCxn id="98" idx="3"/>
           </p:cNvCxnSpPr>
           <p:nvPr/>
         </p:nvCxnSpPr>
         <p:spPr>
-          <a:xfrm rot="16200000" flipH="1">
-            <a:off x="3866505" y="2723505"/>
-            <a:ext cx="1261218" cy="1216575"/>
+          <a:xfrm rot="5400000">
+            <a:off x="3275840" y="2897429"/>
+            <a:ext cx="460859" cy="1"/>
           </a:xfrm>
           <a:prstGeom prst="bentConnector3">
             <a:avLst>
               <a:gd name="adj1" fmla="val 50000"/>
             </a:avLst>
           </a:prstGeom>
-          <a:ln w="19050">
+          <a:ln w="28575">
             <a:headEnd type="none" w="med" len="med"/>
             <a:tailEnd type="none" w="med" len="med"/>
           </a:ln>
@@ -4295,15 +4277,14 @@
         <p:nvCxnSpPr>
           <p:cNvPr id="105" name="Straight Arrow Connector 104"/>
           <p:cNvCxnSpPr>
-            <a:stCxn id="99" idx="3"/>
-            <a:endCxn id="98" idx="1"/>
+            <a:endCxn id="98" idx="0"/>
           </p:cNvCxnSpPr>
           <p:nvPr/>
         </p:nvCxnSpPr>
         <p:spPr>
-          <a:xfrm>
-            <a:off x="4463753" y="4265063"/>
-            <a:ext cx="546397" cy="0"/>
+          <a:xfrm flipV="1">
+            <a:off x="2895600" y="3937608"/>
+            <a:ext cx="383137" cy="1"/>
           </a:xfrm>
           <a:prstGeom prst="straightConnector1">
             <a:avLst/>
@@ -4333,13 +4314,15 @@
       <p:cxnSp>
         <p:nvCxnSpPr>
           <p:cNvPr id="44" name="Straight Arrow Connector 43"/>
-          <p:cNvCxnSpPr/>
+          <p:cNvCxnSpPr>
+            <a:endCxn id="99" idx="0"/>
+          </p:cNvCxnSpPr>
           <p:nvPr/>
         </p:nvCxnSpPr>
         <p:spPr>
-          <a:xfrm>
-            <a:off x="1143000" y="4267200"/>
-            <a:ext cx="1596728" cy="0"/>
+          <a:xfrm flipV="1">
+            <a:off x="1143000" y="3937606"/>
+            <a:ext cx="1295400" cy="4"/>
           </a:xfrm>
           <a:prstGeom prst="straightConnector1">
             <a:avLst/>
@@ -4375,7 +4358,7 @@
         </p:nvGrpSpPr>
         <p:grpSpPr>
           <a:xfrm>
-            <a:off x="2131864" y="5029199"/>
+            <a:off x="2131864" y="5105399"/>
             <a:ext cx="5259536" cy="990600"/>
             <a:chOff x="-4116536" y="1451133"/>
             <a:chExt cx="5259536" cy="903358"/>
@@ -4506,7 +4489,7 @@
         </p:nvSpPr>
         <p:spPr>
           <a:xfrm>
-            <a:off x="2514600" y="5410200"/>
+            <a:off x="2514600" y="5486400"/>
             <a:ext cx="2300065" cy="533400"/>
           </a:xfrm>
           <a:prstGeom prst="rect">
@@ -4561,7 +4544,7 @@
         </p:nvSpPr>
         <p:spPr>
           <a:xfrm>
-            <a:off x="4969914" y="5410200"/>
+            <a:off x="4969914" y="5486400"/>
             <a:ext cx="2300065" cy="533400"/>
           </a:xfrm>
           <a:prstGeom prst="rect">
@@ -4611,15 +4594,13 @@
       <p:cxnSp>
         <p:nvCxnSpPr>
           <p:cNvPr id="110" name="Straight Arrow Connector 109"/>
-          <p:cNvCxnSpPr>
-            <a:endCxn id="98" idx="2"/>
-          </p:cNvCxnSpPr>
+          <p:cNvCxnSpPr/>
           <p:nvPr/>
         </p:nvCxnSpPr>
         <p:spPr>
-          <a:xfrm flipV="1">
-            <a:off x="4533900" y="4569863"/>
-            <a:ext cx="1209675" cy="840337"/>
+          <a:xfrm flipH="1" flipV="1">
+            <a:off x="3762677" y="4572000"/>
+            <a:ext cx="1495125" cy="914402"/>
           </a:xfrm>
           <a:prstGeom prst="straightConnector1">
             <a:avLst/>
@@ -4649,15 +4630,13 @@
       <p:cxnSp>
         <p:nvCxnSpPr>
           <p:cNvPr id="113" name="Straight Arrow Connector 112"/>
-          <p:cNvCxnSpPr>
-            <a:endCxn id="98" idx="2"/>
-          </p:cNvCxnSpPr>
+          <p:cNvCxnSpPr/>
           <p:nvPr/>
         </p:nvCxnSpPr>
         <p:spPr>
-          <a:xfrm flipH="1" flipV="1">
-            <a:off x="5743575" y="4569863"/>
-            <a:ext cx="504825" cy="840337"/>
+          <a:xfrm flipV="1">
+            <a:off x="3659317" y="4747357"/>
+            <a:ext cx="0" cy="751994"/>
           </a:xfrm>
           <a:prstGeom prst="straightConnector1">
             <a:avLst/>
@@ -4692,12 +4671,18 @@
         </p:nvSpPr>
         <p:spPr>
           <a:xfrm>
-            <a:off x="4038600" y="609600"/>
-            <a:ext cx="762000" cy="381000"/>
+            <a:off x="5473936" y="3810000"/>
+            <a:ext cx="1688863" cy="303312"/>
           </a:xfrm>
           <a:prstGeom prst="rect">
             <a:avLst/>
           </a:prstGeom>
+          <a:solidFill>
+            <a:schemeClr val="accent4">
+              <a:lumMod val="60000"/>
+              <a:lumOff val="40000"/>
+            </a:schemeClr>
+          </a:solidFill>
         </p:spPr>
         <p:style>
           <a:lnRef idx="2">
@@ -4731,16 +4716,13 @@
       <p:cxnSp>
         <p:nvCxnSpPr>
           <p:cNvPr id="118" name="Straight Arrow Connector 117"/>
-          <p:cNvCxnSpPr>
-            <a:stCxn id="116" idx="2"/>
-            <a:endCxn id="84" idx="0"/>
-          </p:cNvCxnSpPr>
+          <p:cNvCxnSpPr/>
           <p:nvPr/>
         </p:nvCxnSpPr>
         <p:spPr>
           <a:xfrm flipH="1">
-            <a:off x="4381500" y="990600"/>
-            <a:ext cx="38100" cy="872384"/>
+            <a:off x="3762675" y="1614992"/>
+            <a:ext cx="1077092" cy="0"/>
           </a:xfrm>
           <a:prstGeom prst="straightConnector1">
             <a:avLst/>
@@ -4776,7 +4758,7 @@
         </p:nvSpPr>
         <p:spPr>
           <a:xfrm>
-            <a:off x="457200" y="2091584"/>
+            <a:off x="523775" y="1447800"/>
             <a:ext cx="609600" cy="307777"/>
           </a:xfrm>
           <a:prstGeom prst="rect">
@@ -4899,7 +4881,7 @@
         </p:nvSpPr>
         <p:spPr>
           <a:xfrm>
-            <a:off x="152400" y="4038600"/>
+            <a:off x="152400" y="3733800"/>
             <a:ext cx="937901" cy="307777"/>
           </a:xfrm>
           <a:prstGeom prst="rect">
@@ -5022,8 +5004,8 @@
         </p:nvCxnSpPr>
         <p:spPr>
           <a:xfrm>
-            <a:off x="6477000" y="4253669"/>
-            <a:ext cx="1447800" cy="11394"/>
+            <a:off x="3753490" y="4419600"/>
+            <a:ext cx="4171310" cy="0"/>
           </a:xfrm>
           <a:prstGeom prst="straightConnector1">
             <a:avLst/>
@@ -5059,7 +5041,7 @@
         </p:nvSpPr>
         <p:spPr>
           <a:xfrm>
-            <a:off x="7924800" y="34184"/>
+            <a:off x="7924800" y="110384"/>
             <a:ext cx="914400" cy="6176114"/>
           </a:xfrm>
           <a:prstGeom prst="roundRect">
@@ -5117,8 +5099,8 @@
         </p:nvSpPr>
         <p:spPr>
           <a:xfrm>
-            <a:off x="8382000" y="-76200"/>
-            <a:ext cx="609600" cy="6934200"/>
+            <a:off x="8382000" y="-228600"/>
+            <a:ext cx="609600" cy="7162800"/>
           </a:xfrm>
           <a:prstGeom prst="rect">
             <a:avLst/>
@@ -5166,8 +5148,8 @@
         </p:nvCxnSpPr>
         <p:spPr>
           <a:xfrm>
-            <a:off x="5486400" y="2209800"/>
-            <a:ext cx="2438400" cy="0"/>
+            <a:off x="3762675" y="937901"/>
+            <a:ext cx="4162125" cy="0"/>
           </a:xfrm>
           <a:prstGeom prst="straightConnector1">
             <a:avLst/>
@@ -5203,7 +5185,7 @@
         </p:nvCxnSpPr>
         <p:spPr>
           <a:xfrm flipV="1">
-            <a:off x="4554908" y="6019800"/>
+            <a:off x="4554908" y="6096000"/>
             <a:ext cx="0" cy="381000"/>
           </a:xfrm>
           <a:prstGeom prst="straightConnector1">
@@ -5240,7 +5222,7 @@
         </p:nvSpPr>
         <p:spPr>
           <a:xfrm>
-            <a:off x="3657600" y="6411482"/>
+            <a:off x="3657600" y="6487682"/>
             <a:ext cx="1816337" cy="307777"/>
           </a:xfrm>
           <a:prstGeom prst="rect">
@@ -5375,15 +5357,14 @@
         <p:nvCxnSpPr>
           <p:cNvPr id="48" name="Straight Arrow Connector 47"/>
           <p:cNvCxnSpPr>
-            <a:stCxn id="116" idx="2"/>
-            <a:endCxn id="98" idx="0"/>
+            <a:stCxn id="116" idx="1"/>
           </p:cNvCxnSpPr>
           <p:nvPr/>
         </p:nvCxnSpPr>
         <p:spPr>
-          <a:xfrm>
-            <a:off x="4419600" y="990600"/>
-            <a:ext cx="1323975" cy="2969663"/>
+          <a:xfrm flipH="1">
+            <a:off x="3753490" y="3961656"/>
+            <a:ext cx="1720446" cy="2233"/>
           </a:xfrm>
           <a:prstGeom prst="straightConnector1">
             <a:avLst/>
@@ -5419,8 +5400,8 @@
         </p:nvSpPr>
         <p:spPr>
           <a:xfrm>
-            <a:off x="4648200" y="304800"/>
-            <a:ext cx="1600200" cy="228600"/>
+            <a:off x="5486400" y="1143000"/>
+            <a:ext cx="1676400" cy="609600"/>
           </a:xfrm>
           <a:prstGeom prst="rect">
             <a:avLst/>
@@ -5449,7 +5430,7 @@
             <a:pPr algn="ctr"/>
             <a:r>
               <a:rPr lang="en-US" sz="1600" b="1" dirty="0" err="1" smtClean="0"/>
-              <a:t>AccountsStorage</a:t>
+              <a:t>AccountsLogic</a:t>
             </a:r>
             <a:endParaRPr lang="en-SG" sz="1600" b="1" dirty="0"/>
           </a:p>
@@ -5463,8 +5444,8 @@
         </p:nvSpPr>
         <p:spPr>
           <a:xfrm>
-            <a:off x="5105400" y="609600"/>
-            <a:ext cx="1600200" cy="228600"/>
+            <a:off x="5486400" y="1828800"/>
+            <a:ext cx="1676400" cy="609600"/>
           </a:xfrm>
           <a:prstGeom prst="rect">
             <a:avLst/>
@@ -5493,7 +5474,7 @@
             <a:pPr algn="ctr"/>
             <a:r>
               <a:rPr lang="en-US" sz="1600" b="1" dirty="0" err="1" smtClean="0"/>
-              <a:t>CoursesStorage</a:t>
+              <a:t>CoursesLogic</a:t>
             </a:r>
             <a:endParaRPr lang="en-SG" sz="1600" b="1" dirty="0"/>
           </a:p>
@@ -5507,8 +5488,8 @@
         </p:nvSpPr>
         <p:spPr>
           <a:xfrm>
-            <a:off x="5486400" y="914400"/>
-            <a:ext cx="1828800" cy="228600"/>
+            <a:off x="5486400" y="2514600"/>
+            <a:ext cx="1676400" cy="609600"/>
           </a:xfrm>
           <a:prstGeom prst="rect">
             <a:avLst/>
@@ -5537,7 +5518,7 @@
             <a:pPr algn="ctr"/>
             <a:r>
               <a:rPr lang="en-US" sz="1600" b="1" dirty="0" err="1" smtClean="0"/>
-              <a:t>EvaluationsStorage</a:t>
+              <a:t>EvaluationsLogic</a:t>
             </a:r>
             <a:endParaRPr lang="en-SG" sz="1600" b="1" dirty="0"/>
           </a:p>
@@ -5545,127 +5526,14 @@
       </p:sp>
       <p:cxnSp>
         <p:nvCxnSpPr>
-          <p:cNvPr id="60" name="Straight Arrow Connector 59"/>
+          <p:cNvPr id="68" name="Straight Arrow Connector 67"/>
           <p:cNvCxnSpPr/>
           <p:nvPr/>
         </p:nvCxnSpPr>
         <p:spPr>
           <a:xfrm>
-            <a:off x="4953000" y="533400"/>
-            <a:ext cx="0" cy="1329584"/>
-          </a:xfrm>
-          <a:prstGeom prst="straightConnector1">
-            <a:avLst/>
-          </a:prstGeom>
-          <a:ln>
-            <a:prstDash val="sysDot"/>
-            <a:headEnd type="arrow" w="med" len="med"/>
-            <a:tailEnd type="none" w="med" len="med"/>
-          </a:ln>
-        </p:spPr>
-        <p:style>
-          <a:lnRef idx="2">
-            <a:schemeClr val="accent2">
-              <a:shade val="50000"/>
-            </a:schemeClr>
-          </a:lnRef>
-          <a:fillRef idx="1">
-            <a:schemeClr val="accent2"/>
-          </a:fillRef>
-          <a:effectRef idx="0">
-            <a:schemeClr val="accent2"/>
-          </a:effectRef>
-          <a:fontRef idx="minor">
-            <a:schemeClr val="lt1"/>
-          </a:fontRef>
-        </p:style>
-      </p:cxnSp>
-      <p:cxnSp>
-        <p:nvCxnSpPr>
-          <p:cNvPr id="62" name="Straight Arrow Connector 61"/>
-          <p:cNvCxnSpPr/>
-          <p:nvPr/>
-        </p:nvCxnSpPr>
-        <p:spPr>
-          <a:xfrm flipH="1">
-            <a:off x="4953000" y="838200"/>
-            <a:ext cx="381000" cy="990600"/>
-          </a:xfrm>
-          <a:prstGeom prst="straightConnector1">
-            <a:avLst/>
-          </a:prstGeom>
-          <a:ln>
-            <a:prstDash val="sysDot"/>
-            <a:headEnd type="arrow" w="med" len="med"/>
-            <a:tailEnd type="none" w="med" len="med"/>
-          </a:ln>
-        </p:spPr>
-        <p:style>
-          <a:lnRef idx="2">
-            <a:schemeClr val="accent2">
-              <a:shade val="50000"/>
-            </a:schemeClr>
-          </a:lnRef>
-          <a:fillRef idx="1">
-            <a:schemeClr val="accent2"/>
-          </a:fillRef>
-          <a:effectRef idx="0">
-            <a:schemeClr val="accent2"/>
-          </a:effectRef>
-          <a:fontRef idx="minor">
-            <a:schemeClr val="lt1"/>
-          </a:fontRef>
-        </p:style>
-      </p:cxnSp>
-      <p:cxnSp>
-        <p:nvCxnSpPr>
-          <p:cNvPr id="65" name="Straight Arrow Connector 64"/>
-          <p:cNvCxnSpPr/>
-          <p:nvPr/>
-        </p:nvCxnSpPr>
-        <p:spPr>
-          <a:xfrm flipH="1">
-            <a:off x="4953000" y="1143000"/>
-            <a:ext cx="838200" cy="685800"/>
-          </a:xfrm>
-          <a:prstGeom prst="straightConnector1">
-            <a:avLst/>
-          </a:prstGeom>
-          <a:ln>
-            <a:prstDash val="sysDot"/>
-            <a:headEnd type="arrow" w="med" len="med"/>
-            <a:tailEnd type="none" w="med" len="med"/>
-          </a:ln>
-        </p:spPr>
-        <p:style>
-          <a:lnRef idx="2">
-            <a:schemeClr val="accent2">
-              <a:shade val="50000"/>
-            </a:schemeClr>
-          </a:lnRef>
-          <a:fillRef idx="1">
-            <a:schemeClr val="accent2"/>
-          </a:fillRef>
-          <a:effectRef idx="0">
-            <a:schemeClr val="accent2"/>
-          </a:effectRef>
-          <a:fontRef idx="minor">
-            <a:schemeClr val="lt1"/>
-          </a:fontRef>
-        </p:style>
-      </p:cxnSp>
-      <p:cxnSp>
-        <p:nvCxnSpPr>
-          <p:cNvPr id="68" name="Straight Arrow Connector 67"/>
-          <p:cNvCxnSpPr>
-            <a:stCxn id="56" idx="3"/>
-          </p:cNvCxnSpPr>
-          <p:nvPr/>
-        </p:nvCxnSpPr>
-        <p:spPr>
-          <a:xfrm>
-            <a:off x="6705600" y="723900"/>
-            <a:ext cx="1447800" cy="38100"/>
+            <a:off x="7200900" y="2133600"/>
+            <a:ext cx="723900" cy="0"/>
           </a:xfrm>
           <a:prstGeom prst="straightConnector1">
             <a:avLst/>
@@ -5696,15 +5564,13 @@
       <p:cxnSp>
         <p:nvCxnSpPr>
           <p:cNvPr id="80" name="Straight Arrow Connector 79"/>
-          <p:cNvCxnSpPr>
-            <a:stCxn id="58" idx="3"/>
-          </p:cNvCxnSpPr>
+          <p:cNvCxnSpPr/>
           <p:nvPr/>
         </p:nvCxnSpPr>
         <p:spPr>
-          <a:xfrm flipV="1">
-            <a:off x="7315200" y="990600"/>
-            <a:ext cx="838200" cy="38100"/>
+          <a:xfrm>
+            <a:off x="7189069" y="2818838"/>
+            <a:ext cx="762000" cy="0"/>
           </a:xfrm>
           <a:prstGeom prst="straightConnector1">
             <a:avLst/>
@@ -5742,8 +5608,8 @@
         </p:nvCxnSpPr>
         <p:spPr>
           <a:xfrm>
-            <a:off x="6248400" y="419100"/>
-            <a:ext cx="1905000" cy="38100"/>
+            <a:off x="7162800" y="1447800"/>
+            <a:ext cx="762000" cy="0"/>
           </a:xfrm>
           <a:prstGeom prst="straightConnector1">
             <a:avLst/>
@@ -5771,6 +5637,108 @@
           </a:fontRef>
         </p:style>
       </p:cxnSp>
+      <p:sp>
+        <p:nvSpPr>
+          <p:cNvPr id="140" name="Rounded Rectangle 139"/>
+          <p:cNvSpPr/>
+          <p:nvPr/>
+        </p:nvSpPr>
+        <p:spPr>
+          <a:xfrm>
+            <a:off x="4814665" y="832826"/>
+            <a:ext cx="2576734" cy="233974"/>
+          </a:xfrm>
+          <a:prstGeom prst="roundRect">
+            <a:avLst/>
+          </a:prstGeom>
+          <a:solidFill>
+            <a:schemeClr val="bg1">
+              <a:alpha val="81000"/>
+            </a:schemeClr>
+          </a:solidFill>
+          <a:ln>
+            <a:noFill/>
+          </a:ln>
+          <a:effectLst>
+            <a:softEdge rad="31750"/>
+          </a:effectLst>
+        </p:spPr>
+        <p:style>
+          <a:lnRef idx="2">
+            <a:schemeClr val="accent1">
+              <a:shade val="50000"/>
+            </a:schemeClr>
+          </a:lnRef>
+          <a:fillRef idx="1">
+            <a:schemeClr val="accent1"/>
+          </a:fillRef>
+          <a:effectRef idx="0">
+            <a:schemeClr val="accent1"/>
+          </a:effectRef>
+          <a:fontRef idx="minor">
+            <a:schemeClr val="lt1"/>
+          </a:fontRef>
+        </p:style>
+        <p:txBody>
+          <a:bodyPr rtlCol="0" anchor="ctr"/>
+          <a:lstStyle/>
+          <a:p>
+            <a:pPr algn="ctr"/>
+            <a:endParaRPr lang="en-SG"/>
+          </a:p>
+        </p:txBody>
+      </p:sp>
+      <p:sp>
+        <p:nvSpPr>
+          <p:cNvPr id="161" name="Rounded Rectangle 160"/>
+          <p:cNvSpPr/>
+          <p:nvPr/>
+        </p:nvSpPr>
+        <p:spPr>
+          <a:xfrm>
+            <a:off x="4825619" y="4302613"/>
+            <a:ext cx="2576734" cy="233974"/>
+          </a:xfrm>
+          <a:prstGeom prst="roundRect">
+            <a:avLst/>
+          </a:prstGeom>
+          <a:solidFill>
+            <a:schemeClr val="bg1">
+              <a:alpha val="81000"/>
+            </a:schemeClr>
+          </a:solidFill>
+          <a:ln>
+            <a:noFill/>
+          </a:ln>
+          <a:effectLst>
+            <a:softEdge rad="31750"/>
+          </a:effectLst>
+        </p:spPr>
+        <p:style>
+          <a:lnRef idx="2">
+            <a:schemeClr val="accent1">
+              <a:shade val="50000"/>
+            </a:schemeClr>
+          </a:lnRef>
+          <a:fillRef idx="1">
+            <a:schemeClr val="accent1"/>
+          </a:fillRef>
+          <a:effectRef idx="0">
+            <a:schemeClr val="accent1"/>
+          </a:effectRef>
+          <a:fontRef idx="minor">
+            <a:schemeClr val="lt1"/>
+          </a:fontRef>
+        </p:style>
+        <p:txBody>
+          <a:bodyPr rtlCol="0" anchor="ctr"/>
+          <a:lstStyle/>
+          <a:p>
+            <a:pPr algn="ctr"/>
+            <a:endParaRPr lang="en-SG"/>
+          </a:p>
+        </p:txBody>
+      </p:sp>
     </p:spTree>
     <p:extLst>
       <p:ext uri="{BB962C8B-B14F-4D97-AF65-F5344CB8AC3E}">
@@ -5784,7 +5752,7 @@
   <p:timing>
     <p:tnLst>
       <p:par>
-        <p:cTn xmlns:p14="http://schemas.microsoft.com/office/powerpoint/2010/main" id="1" dur="indefinite" restart="never" nodeType="tmRoot"/>
+        <p:cTn id="1" dur="indefinite" restart="never" nodeType="tmRoot"/>
       </p:par>
     </p:tnLst>
   </p:timing>

</xml_diff>

<commit_message>
Continuing Issue724 [Update DevMan diagrams to match changes to design] Update Issue 724 Tweaked some diagrams.
</commit_message>
<xml_diff>
--- a/doc/diagrams/LogicComponent.pptx
+++ b/doc/diagrams/LogicComponent.pptx
@@ -362,7 +362,7 @@
     </p:spTree>
     <p:extLst>
       <p:ext uri="{BB962C8B-B14F-4D97-AF65-F5344CB8AC3E}">
-        <p14:creationId xmlns:p14="http://schemas.microsoft.com/office/powerpoint/2010/main" xmlns="" val="913918898"/>
+        <p14:creationId xmlns:p14="http://schemas.microsoft.com/office/powerpoint/2010/main" val="913918898"/>
       </p:ext>
     </p:extLst>
   </p:cSld>
@@ -537,7 +537,7 @@
     </p:spTree>
     <p:extLst>
       <p:ext uri="{BB962C8B-B14F-4D97-AF65-F5344CB8AC3E}">
-        <p14:creationId xmlns:p14="http://schemas.microsoft.com/office/powerpoint/2010/main" xmlns="" val="1998377649"/>
+        <p14:creationId xmlns:p14="http://schemas.microsoft.com/office/powerpoint/2010/main" val="1998377649"/>
       </p:ext>
     </p:extLst>
   </p:cSld>
@@ -4050,7 +4050,7 @@
         </p:nvSpPr>
         <p:spPr>
           <a:xfrm>
-            <a:off x="5486400" y="3581400"/>
+            <a:off x="5486400" y="3505200"/>
             <a:ext cx="1676400" cy="304800"/>
           </a:xfrm>
           <a:prstGeom prst="rect">
@@ -4671,7 +4671,7 @@
         </p:nvSpPr>
         <p:spPr>
           <a:xfrm>
-            <a:off x="5473936" y="4040088"/>
+            <a:off x="5473936" y="3963888"/>
             <a:ext cx="1688863" cy="303312"/>
           </a:xfrm>
           <a:prstGeom prst="rect">
@@ -5004,7 +5004,7 @@
         </p:nvCxnSpPr>
         <p:spPr>
           <a:xfrm>
-            <a:off x="3753490" y="4419600"/>
+            <a:off x="3753490" y="4455013"/>
             <a:ext cx="4171310" cy="0"/>
           </a:xfrm>
           <a:prstGeom prst="straightConnector1">
@@ -5148,7 +5148,7 @@
         </p:nvCxnSpPr>
         <p:spPr>
           <a:xfrm>
-            <a:off x="3762675" y="937901"/>
+            <a:off x="3762675" y="1371600"/>
             <a:ext cx="4162125" cy="0"/>
           </a:xfrm>
           <a:prstGeom prst="straightConnector1">
@@ -5356,14 +5356,12 @@
       <p:cxnSp>
         <p:nvCxnSpPr>
           <p:cNvPr id="48" name="Straight Arrow Connector 47"/>
-          <p:cNvCxnSpPr>
-            <a:stCxn id="116" idx="1"/>
-          </p:cNvCxnSpPr>
+          <p:cNvCxnSpPr/>
           <p:nvPr/>
         </p:nvCxnSpPr>
         <p:spPr>
           <a:xfrm flipH="1">
-            <a:off x="3753490" y="4191744"/>
+            <a:off x="3753490" y="4114800"/>
             <a:ext cx="1720446" cy="2233"/>
           </a:xfrm>
           <a:prstGeom prst="straightConnector1">
@@ -5645,7 +5643,7 @@
         </p:nvSpPr>
         <p:spPr>
           <a:xfrm>
-            <a:off x="4814665" y="832826"/>
+            <a:off x="4814665" y="1290026"/>
             <a:ext cx="2576734" cy="233974"/>
           </a:xfrm>
           <a:prstGeom prst="roundRect">
@@ -5696,7 +5694,7 @@
         </p:nvSpPr>
         <p:spPr>
           <a:xfrm>
-            <a:off x="4825619" y="4302613"/>
+            <a:off x="4825619" y="4338026"/>
             <a:ext cx="2576734" cy="233974"/>
           </a:xfrm>
           <a:prstGeom prst="roundRect">
@@ -5747,12 +5745,17 @@
         </p:nvSpPr>
         <p:spPr>
           <a:xfrm>
-            <a:off x="5486400" y="1295400"/>
+            <a:off x="5486400" y="762000"/>
             <a:ext cx="1676400" cy="457200"/>
           </a:xfrm>
           <a:prstGeom prst="rect">
             <a:avLst/>
           </a:prstGeom>
+          <a:solidFill>
+            <a:schemeClr val="accent4">
+              <a:lumMod val="75000"/>
+            </a:schemeClr>
+          </a:solidFill>
         </p:spPr>
         <p:style>
           <a:lnRef idx="2">
@@ -5793,7 +5796,7 @@
         </p:nvCxnSpPr>
         <p:spPr>
           <a:xfrm>
-            <a:off x="7162800" y="1524000"/>
+            <a:off x="7162800" y="990600"/>
             <a:ext cx="762000" cy="0"/>
           </a:xfrm>
           <a:prstGeom prst="straightConnector1">
@@ -5825,7 +5828,7 @@
     </p:spTree>
     <p:extLst>
       <p:ext uri="{BB962C8B-B14F-4D97-AF65-F5344CB8AC3E}">
-        <p14:creationId xmlns:p14="http://schemas.microsoft.com/office/powerpoint/2010/main" xmlns="" val="2312643091"/>
+        <p14:creationId xmlns:p14="http://schemas.microsoft.com/office/powerpoint/2010/main" val="2312643091"/>
       </p:ext>
     </p:extLst>
   </p:cSld>

</xml_diff>

<commit_message>
Issue 1431: Update devman classdiagrams for V4.79 Update Issue 1431
</commit_message>
<xml_diff>
--- a/doc/diagrams/LogicComponent.pptx
+++ b/doc/diagrams/LogicComponent.pptx
@@ -10,7 +10,7 @@
   <p:sldIdLst>
     <p:sldId id="256" r:id="rId2"/>
   </p:sldIdLst>
-  <p:sldSz cx="9144000" cy="6858000" type="screen4x3"/>
+  <p:sldSz cx="9144000" cy="7315200"/>
   <p:notesSz cx="6858000" cy="9144000"/>
   <p:defaultTextStyle>
     <a:defPPr>
@@ -193,7 +193,7 @@
             <a:fld id="{AF301891-4E62-472A-98E9-95DBD40531A4}" type="datetimeFigureOut">
               <a:rPr lang="en-SG" smtClean="0"/>
               <a:pPr/>
-              <a:t>5/7/2013</a:t>
+              <a:t>4/1/2014</a:t>
             </a:fld>
             <a:endParaRPr lang="en-SG"/>
           </a:p>
@@ -211,8 +211,8 @@
         </p:nvSpPr>
         <p:spPr>
           <a:xfrm>
-            <a:off x="1143000" y="685800"/>
-            <a:ext cx="4572000" cy="3429000"/>
+            <a:off x="1285875" y="685800"/>
+            <a:ext cx="4286250" cy="3429000"/>
           </a:xfrm>
           <a:prstGeom prst="rect">
             <a:avLst/>
@@ -491,8 +491,8 @@
         </p:nvSpPr>
         <p:spPr>
           <a:xfrm>
-            <a:off x="1143000" y="685800"/>
-            <a:ext cx="4572000" cy="3429000"/>
+            <a:off x="1285875" y="685800"/>
+            <a:ext cx="4286250" cy="3429000"/>
           </a:xfrm>
         </p:spPr>
       </p:sp>
@@ -581,8 +581,8 @@
         </p:nvSpPr>
         <p:spPr>
           <a:xfrm>
-            <a:off x="685800" y="2130426"/>
-            <a:ext cx="7772400" cy="1470025"/>
+            <a:off x="685800" y="2272455"/>
+            <a:ext cx="7772400" cy="1568027"/>
           </a:xfrm>
           <a:prstGeom prst="rect">
             <a:avLst/>
@@ -612,8 +612,8 @@
         </p:nvSpPr>
         <p:spPr>
           <a:xfrm>
-            <a:off x="1371600" y="3886201"/>
-            <a:ext cx="6400800" cy="1752600"/>
+            <a:off x="1371600" y="4145281"/>
+            <a:ext cx="6400800" cy="1869440"/>
           </a:xfrm>
           <a:prstGeom prst="rect">
             <a:avLst/>
@@ -734,8 +734,8 @@
         </p:nvSpPr>
         <p:spPr>
           <a:xfrm>
-            <a:off x="457200" y="6356351"/>
-            <a:ext cx="2133600" cy="365125"/>
+            <a:off x="457200" y="6780108"/>
+            <a:ext cx="2133600" cy="389467"/>
           </a:xfrm>
           <a:prstGeom prst="rect">
             <a:avLst/>
@@ -748,7 +748,7 @@
             <a:fld id="{1D8BD707-D9CF-40AE-B4C6-C98DA3205C09}" type="datetimeFigureOut">
               <a:rPr lang="en-US" smtClean="0"/>
               <a:pPr/>
-              <a:t>7/5/2013</a:t>
+              <a:t>1/4/2014</a:t>
             </a:fld>
             <a:endParaRPr lang="en-US"/>
           </a:p>
@@ -766,8 +766,8 @@
         </p:nvSpPr>
         <p:spPr>
           <a:xfrm>
-            <a:off x="3124200" y="6356351"/>
-            <a:ext cx="2895600" cy="365125"/>
+            <a:off x="3124200" y="6780108"/>
+            <a:ext cx="2895600" cy="389467"/>
           </a:xfrm>
           <a:prstGeom prst="rect">
             <a:avLst/>
@@ -793,8 +793,8 @@
         </p:nvSpPr>
         <p:spPr>
           <a:xfrm>
-            <a:off x="6553200" y="6356351"/>
-            <a:ext cx="2133600" cy="365125"/>
+            <a:off x="6553200" y="6780108"/>
+            <a:ext cx="2133600" cy="389467"/>
           </a:xfrm>
           <a:prstGeom prst="rect">
             <a:avLst/>
@@ -857,8 +857,8 @@
         </p:nvSpPr>
         <p:spPr>
           <a:xfrm>
-            <a:off x="457200" y="274639"/>
-            <a:ext cx="8229600" cy="1143000"/>
+            <a:off x="457200" y="292948"/>
+            <a:ext cx="8229600" cy="1219200"/>
           </a:xfrm>
           <a:prstGeom prst="rect">
             <a:avLst/>
@@ -888,8 +888,8 @@
         </p:nvSpPr>
         <p:spPr>
           <a:xfrm>
-            <a:off x="457200" y="1600200"/>
-            <a:ext cx="8229600" cy="4525963"/>
+            <a:off x="457200" y="1706880"/>
+            <a:ext cx="8229600" cy="4827694"/>
           </a:xfrm>
           <a:prstGeom prst="rect">
             <a:avLst/>
@@ -948,8 +948,8 @@
         </p:nvSpPr>
         <p:spPr>
           <a:xfrm>
-            <a:off x="457200" y="6356351"/>
-            <a:ext cx="2133600" cy="365125"/>
+            <a:off x="457200" y="6780108"/>
+            <a:ext cx="2133600" cy="389467"/>
           </a:xfrm>
           <a:prstGeom prst="rect">
             <a:avLst/>
@@ -962,7 +962,7 @@
             <a:fld id="{1D8BD707-D9CF-40AE-B4C6-C98DA3205C09}" type="datetimeFigureOut">
               <a:rPr lang="en-US" smtClean="0"/>
               <a:pPr/>
-              <a:t>7/5/2013</a:t>
+              <a:t>1/4/2014</a:t>
             </a:fld>
             <a:endParaRPr lang="en-US"/>
           </a:p>
@@ -980,8 +980,8 @@
         </p:nvSpPr>
         <p:spPr>
           <a:xfrm>
-            <a:off x="3124200" y="6356351"/>
-            <a:ext cx="2895600" cy="365125"/>
+            <a:off x="3124200" y="6780108"/>
+            <a:ext cx="2895600" cy="389467"/>
           </a:xfrm>
           <a:prstGeom prst="rect">
             <a:avLst/>
@@ -1007,8 +1007,8 @@
         </p:nvSpPr>
         <p:spPr>
           <a:xfrm>
-            <a:off x="6553200" y="6356351"/>
-            <a:ext cx="2133600" cy="365125"/>
+            <a:off x="6553200" y="6780108"/>
+            <a:ext cx="2133600" cy="389467"/>
           </a:xfrm>
           <a:prstGeom prst="rect">
             <a:avLst/>
@@ -1064,8 +1064,8 @@
         </p:nvSpPr>
         <p:spPr>
           <a:xfrm>
-            <a:off x="6629400" y="274639"/>
-            <a:ext cx="2057400" cy="5851525"/>
+            <a:off x="6629400" y="292949"/>
+            <a:ext cx="2057400" cy="6241627"/>
           </a:xfrm>
           <a:prstGeom prst="rect">
             <a:avLst/>
@@ -1095,8 +1095,8 @@
         </p:nvSpPr>
         <p:spPr>
           <a:xfrm>
-            <a:off x="457200" y="274639"/>
-            <a:ext cx="6019800" cy="5851525"/>
+            <a:off x="457200" y="292949"/>
+            <a:ext cx="6019800" cy="6241627"/>
           </a:xfrm>
           <a:prstGeom prst="rect">
             <a:avLst/>
@@ -1155,8 +1155,8 @@
         </p:nvSpPr>
         <p:spPr>
           <a:xfrm>
-            <a:off x="457200" y="6356351"/>
-            <a:ext cx="2133600" cy="365125"/>
+            <a:off x="457200" y="6780108"/>
+            <a:ext cx="2133600" cy="389467"/>
           </a:xfrm>
           <a:prstGeom prst="rect">
             <a:avLst/>
@@ -1169,7 +1169,7 @@
             <a:fld id="{1D8BD707-D9CF-40AE-B4C6-C98DA3205C09}" type="datetimeFigureOut">
               <a:rPr lang="en-US" smtClean="0"/>
               <a:pPr/>
-              <a:t>7/5/2013</a:t>
+              <a:t>1/4/2014</a:t>
             </a:fld>
             <a:endParaRPr lang="en-US"/>
           </a:p>
@@ -1187,8 +1187,8 @@
         </p:nvSpPr>
         <p:spPr>
           <a:xfrm>
-            <a:off x="3124200" y="6356351"/>
-            <a:ext cx="2895600" cy="365125"/>
+            <a:off x="3124200" y="6780108"/>
+            <a:ext cx="2895600" cy="389467"/>
           </a:xfrm>
           <a:prstGeom prst="rect">
             <a:avLst/>
@@ -1214,8 +1214,8 @@
         </p:nvSpPr>
         <p:spPr>
           <a:xfrm>
-            <a:off x="6553200" y="6356351"/>
-            <a:ext cx="2133600" cy="365125"/>
+            <a:off x="6553200" y="6780108"/>
+            <a:ext cx="2133600" cy="389467"/>
           </a:xfrm>
           <a:prstGeom prst="rect">
             <a:avLst/>
@@ -1271,8 +1271,8 @@
         </p:nvSpPr>
         <p:spPr>
           <a:xfrm>
-            <a:off x="457200" y="274639"/>
-            <a:ext cx="8229600" cy="1143000"/>
+            <a:off x="457200" y="292948"/>
+            <a:ext cx="8229600" cy="1219200"/>
           </a:xfrm>
           <a:prstGeom prst="rect">
             <a:avLst/>
@@ -1302,8 +1302,8 @@
         </p:nvSpPr>
         <p:spPr>
           <a:xfrm>
-            <a:off x="457200" y="1600200"/>
-            <a:ext cx="8229600" cy="4525963"/>
+            <a:off x="457200" y="1706880"/>
+            <a:ext cx="8229600" cy="4827694"/>
           </a:xfrm>
           <a:prstGeom prst="rect">
             <a:avLst/>
@@ -1362,8 +1362,8 @@
         </p:nvSpPr>
         <p:spPr>
           <a:xfrm>
-            <a:off x="457200" y="6356351"/>
-            <a:ext cx="2133600" cy="365125"/>
+            <a:off x="457200" y="6780108"/>
+            <a:ext cx="2133600" cy="389467"/>
           </a:xfrm>
           <a:prstGeom prst="rect">
             <a:avLst/>
@@ -1376,7 +1376,7 @@
             <a:fld id="{1D8BD707-D9CF-40AE-B4C6-C98DA3205C09}" type="datetimeFigureOut">
               <a:rPr lang="en-US" smtClean="0"/>
               <a:pPr/>
-              <a:t>7/5/2013</a:t>
+              <a:t>1/4/2014</a:t>
             </a:fld>
             <a:endParaRPr lang="en-US"/>
           </a:p>
@@ -1394,8 +1394,8 @@
         </p:nvSpPr>
         <p:spPr>
           <a:xfrm>
-            <a:off x="3124200" y="6356351"/>
-            <a:ext cx="2895600" cy="365125"/>
+            <a:off x="3124200" y="6780108"/>
+            <a:ext cx="2895600" cy="389467"/>
           </a:xfrm>
           <a:prstGeom prst="rect">
             <a:avLst/>
@@ -1421,8 +1421,8 @@
         </p:nvSpPr>
         <p:spPr>
           <a:xfrm>
-            <a:off x="6553200" y="6356351"/>
-            <a:ext cx="2133600" cy="365125"/>
+            <a:off x="6553200" y="6780108"/>
+            <a:ext cx="2133600" cy="389467"/>
           </a:xfrm>
           <a:prstGeom prst="rect">
             <a:avLst/>
@@ -1478,8 +1478,8 @@
         </p:nvSpPr>
         <p:spPr>
           <a:xfrm>
-            <a:off x="722313" y="4406901"/>
-            <a:ext cx="7772400" cy="1362075"/>
+            <a:off x="722313" y="4700695"/>
+            <a:ext cx="7772400" cy="1452880"/>
           </a:xfrm>
           <a:prstGeom prst="rect">
             <a:avLst/>
@@ -1513,8 +1513,8 @@
         </p:nvSpPr>
         <p:spPr>
           <a:xfrm>
-            <a:off x="722313" y="2906713"/>
-            <a:ext cx="7772400" cy="1500187"/>
+            <a:off x="722313" y="3100495"/>
+            <a:ext cx="7772400" cy="1600199"/>
           </a:xfrm>
           <a:prstGeom prst="rect">
             <a:avLst/>
@@ -1635,8 +1635,8 @@
         </p:nvSpPr>
         <p:spPr>
           <a:xfrm>
-            <a:off x="457200" y="6356351"/>
-            <a:ext cx="2133600" cy="365125"/>
+            <a:off x="457200" y="6780108"/>
+            <a:ext cx="2133600" cy="389467"/>
           </a:xfrm>
           <a:prstGeom prst="rect">
             <a:avLst/>
@@ -1649,7 +1649,7 @@
             <a:fld id="{1D8BD707-D9CF-40AE-B4C6-C98DA3205C09}" type="datetimeFigureOut">
               <a:rPr lang="en-US" smtClean="0"/>
               <a:pPr/>
-              <a:t>7/5/2013</a:t>
+              <a:t>1/4/2014</a:t>
             </a:fld>
             <a:endParaRPr lang="en-US"/>
           </a:p>
@@ -1667,8 +1667,8 @@
         </p:nvSpPr>
         <p:spPr>
           <a:xfrm>
-            <a:off x="3124200" y="6356351"/>
-            <a:ext cx="2895600" cy="365125"/>
+            <a:off x="3124200" y="6780108"/>
+            <a:ext cx="2895600" cy="389467"/>
           </a:xfrm>
           <a:prstGeom prst="rect">
             <a:avLst/>
@@ -1694,8 +1694,8 @@
         </p:nvSpPr>
         <p:spPr>
           <a:xfrm>
-            <a:off x="6553200" y="6356351"/>
-            <a:ext cx="2133600" cy="365125"/>
+            <a:off x="6553200" y="6780108"/>
+            <a:ext cx="2133600" cy="389467"/>
           </a:xfrm>
           <a:prstGeom prst="rect">
             <a:avLst/>
@@ -1751,8 +1751,8 @@
         </p:nvSpPr>
         <p:spPr>
           <a:xfrm>
-            <a:off x="457200" y="274639"/>
-            <a:ext cx="8229600" cy="1143000"/>
+            <a:off x="457200" y="292948"/>
+            <a:ext cx="8229600" cy="1219200"/>
           </a:xfrm>
           <a:prstGeom prst="rect">
             <a:avLst/>
@@ -1782,8 +1782,8 @@
         </p:nvSpPr>
         <p:spPr>
           <a:xfrm>
-            <a:off x="457200" y="1600200"/>
-            <a:ext cx="4038600" cy="4525963"/>
+            <a:off x="457200" y="1706880"/>
+            <a:ext cx="4038600" cy="4827694"/>
           </a:xfrm>
           <a:prstGeom prst="rect">
             <a:avLst/>
@@ -1870,8 +1870,8 @@
         </p:nvSpPr>
         <p:spPr>
           <a:xfrm>
-            <a:off x="4648200" y="1600200"/>
-            <a:ext cx="4038600" cy="4525963"/>
+            <a:off x="4648200" y="1706880"/>
+            <a:ext cx="4038600" cy="4827694"/>
           </a:xfrm>
           <a:prstGeom prst="rect">
             <a:avLst/>
@@ -1958,8 +1958,8 @@
         </p:nvSpPr>
         <p:spPr>
           <a:xfrm>
-            <a:off x="457200" y="6356351"/>
-            <a:ext cx="2133600" cy="365125"/>
+            <a:off x="457200" y="6780108"/>
+            <a:ext cx="2133600" cy="389467"/>
           </a:xfrm>
           <a:prstGeom prst="rect">
             <a:avLst/>
@@ -1972,7 +1972,7 @@
             <a:fld id="{1D8BD707-D9CF-40AE-B4C6-C98DA3205C09}" type="datetimeFigureOut">
               <a:rPr lang="en-US" smtClean="0"/>
               <a:pPr/>
-              <a:t>7/5/2013</a:t>
+              <a:t>1/4/2014</a:t>
             </a:fld>
             <a:endParaRPr lang="en-US"/>
           </a:p>
@@ -1990,8 +1990,8 @@
         </p:nvSpPr>
         <p:spPr>
           <a:xfrm>
-            <a:off x="3124200" y="6356351"/>
-            <a:ext cx="2895600" cy="365125"/>
+            <a:off x="3124200" y="6780108"/>
+            <a:ext cx="2895600" cy="389467"/>
           </a:xfrm>
           <a:prstGeom prst="rect">
             <a:avLst/>
@@ -2017,8 +2017,8 @@
         </p:nvSpPr>
         <p:spPr>
           <a:xfrm>
-            <a:off x="6553200" y="6356351"/>
-            <a:ext cx="2133600" cy="365125"/>
+            <a:off x="6553200" y="6780108"/>
+            <a:ext cx="2133600" cy="389467"/>
           </a:xfrm>
           <a:prstGeom prst="rect">
             <a:avLst/>
@@ -2074,8 +2074,8 @@
         </p:nvSpPr>
         <p:spPr>
           <a:xfrm>
-            <a:off x="457200" y="274639"/>
-            <a:ext cx="8229600" cy="1143000"/>
+            <a:off x="457200" y="292948"/>
+            <a:ext cx="8229600" cy="1219200"/>
           </a:xfrm>
           <a:prstGeom prst="rect">
             <a:avLst/>
@@ -2109,8 +2109,8 @@
         </p:nvSpPr>
         <p:spPr>
           <a:xfrm>
-            <a:off x="457200" y="1535113"/>
-            <a:ext cx="4040188" cy="639762"/>
+            <a:off x="457200" y="1637454"/>
+            <a:ext cx="4040188" cy="682413"/>
           </a:xfrm>
           <a:prstGeom prst="rect">
             <a:avLst/>
@@ -2177,8 +2177,8 @@
         </p:nvSpPr>
         <p:spPr>
           <a:xfrm>
-            <a:off x="457200" y="2174875"/>
-            <a:ext cx="4040188" cy="3951288"/>
+            <a:off x="457200" y="2319867"/>
+            <a:ext cx="4040188" cy="4214707"/>
           </a:xfrm>
           <a:prstGeom prst="rect">
             <a:avLst/>
@@ -2265,8 +2265,8 @@
         </p:nvSpPr>
         <p:spPr>
           <a:xfrm>
-            <a:off x="4645027" y="1535113"/>
-            <a:ext cx="4041775" cy="639762"/>
+            <a:off x="4645028" y="1637454"/>
+            <a:ext cx="4041775" cy="682413"/>
           </a:xfrm>
           <a:prstGeom prst="rect">
             <a:avLst/>
@@ -2333,8 +2333,8 @@
         </p:nvSpPr>
         <p:spPr>
           <a:xfrm>
-            <a:off x="4645027" y="2174875"/>
-            <a:ext cx="4041775" cy="3951288"/>
+            <a:off x="4645028" y="2319867"/>
+            <a:ext cx="4041775" cy="4214707"/>
           </a:xfrm>
           <a:prstGeom prst="rect">
             <a:avLst/>
@@ -2421,8 +2421,8 @@
         </p:nvSpPr>
         <p:spPr>
           <a:xfrm>
-            <a:off x="457200" y="6356351"/>
-            <a:ext cx="2133600" cy="365125"/>
+            <a:off x="457200" y="6780108"/>
+            <a:ext cx="2133600" cy="389467"/>
           </a:xfrm>
           <a:prstGeom prst="rect">
             <a:avLst/>
@@ -2435,7 +2435,7 @@
             <a:fld id="{1D8BD707-D9CF-40AE-B4C6-C98DA3205C09}" type="datetimeFigureOut">
               <a:rPr lang="en-US" smtClean="0"/>
               <a:pPr/>
-              <a:t>7/5/2013</a:t>
+              <a:t>1/4/2014</a:t>
             </a:fld>
             <a:endParaRPr lang="en-US"/>
           </a:p>
@@ -2453,8 +2453,8 @@
         </p:nvSpPr>
         <p:spPr>
           <a:xfrm>
-            <a:off x="3124200" y="6356351"/>
-            <a:ext cx="2895600" cy="365125"/>
+            <a:off x="3124200" y="6780108"/>
+            <a:ext cx="2895600" cy="389467"/>
           </a:xfrm>
           <a:prstGeom prst="rect">
             <a:avLst/>
@@ -2480,8 +2480,8 @@
         </p:nvSpPr>
         <p:spPr>
           <a:xfrm>
-            <a:off x="6553200" y="6356351"/>
-            <a:ext cx="2133600" cy="365125"/>
+            <a:off x="6553200" y="6780108"/>
+            <a:ext cx="2133600" cy="389467"/>
           </a:xfrm>
           <a:prstGeom prst="rect">
             <a:avLst/>
@@ -2537,8 +2537,8 @@
         </p:nvSpPr>
         <p:spPr>
           <a:xfrm>
-            <a:off x="457200" y="274639"/>
-            <a:ext cx="8229600" cy="1143000"/>
+            <a:off x="457200" y="292948"/>
+            <a:ext cx="8229600" cy="1219200"/>
           </a:xfrm>
           <a:prstGeom prst="rect">
             <a:avLst/>
@@ -2568,8 +2568,8 @@
         </p:nvSpPr>
         <p:spPr>
           <a:xfrm>
-            <a:off x="457200" y="6356351"/>
-            <a:ext cx="2133600" cy="365125"/>
+            <a:off x="457200" y="6780108"/>
+            <a:ext cx="2133600" cy="389467"/>
           </a:xfrm>
           <a:prstGeom prst="rect">
             <a:avLst/>
@@ -2582,7 +2582,7 @@
             <a:fld id="{1D8BD707-D9CF-40AE-B4C6-C98DA3205C09}" type="datetimeFigureOut">
               <a:rPr lang="en-US" smtClean="0"/>
               <a:pPr/>
-              <a:t>7/5/2013</a:t>
+              <a:t>1/4/2014</a:t>
             </a:fld>
             <a:endParaRPr lang="en-US"/>
           </a:p>
@@ -2600,8 +2600,8 @@
         </p:nvSpPr>
         <p:spPr>
           <a:xfrm>
-            <a:off x="3124200" y="6356351"/>
-            <a:ext cx="2895600" cy="365125"/>
+            <a:off x="3124200" y="6780108"/>
+            <a:ext cx="2895600" cy="389467"/>
           </a:xfrm>
           <a:prstGeom prst="rect">
             <a:avLst/>
@@ -2627,8 +2627,8 @@
         </p:nvSpPr>
         <p:spPr>
           <a:xfrm>
-            <a:off x="6553200" y="6356351"/>
-            <a:ext cx="2133600" cy="365125"/>
+            <a:off x="6553200" y="6780108"/>
+            <a:ext cx="2133600" cy="389467"/>
           </a:xfrm>
           <a:prstGeom prst="rect">
             <a:avLst/>
@@ -2684,8 +2684,8 @@
         </p:nvSpPr>
         <p:spPr>
           <a:xfrm>
-            <a:off x="457200" y="6356351"/>
-            <a:ext cx="2133600" cy="365125"/>
+            <a:off x="457200" y="6780108"/>
+            <a:ext cx="2133600" cy="389467"/>
           </a:xfrm>
           <a:prstGeom prst="rect">
             <a:avLst/>
@@ -2698,7 +2698,7 @@
             <a:fld id="{1D8BD707-D9CF-40AE-B4C6-C98DA3205C09}" type="datetimeFigureOut">
               <a:rPr lang="en-US" smtClean="0"/>
               <a:pPr/>
-              <a:t>7/5/2013</a:t>
+              <a:t>1/4/2014</a:t>
             </a:fld>
             <a:endParaRPr lang="en-US"/>
           </a:p>
@@ -2716,8 +2716,8 @@
         </p:nvSpPr>
         <p:spPr>
           <a:xfrm>
-            <a:off x="3124200" y="6356351"/>
-            <a:ext cx="2895600" cy="365125"/>
+            <a:off x="3124200" y="6780108"/>
+            <a:ext cx="2895600" cy="389467"/>
           </a:xfrm>
           <a:prstGeom prst="rect">
             <a:avLst/>
@@ -2743,8 +2743,8 @@
         </p:nvSpPr>
         <p:spPr>
           <a:xfrm>
-            <a:off x="6553200" y="6356351"/>
-            <a:ext cx="2133600" cy="365125"/>
+            <a:off x="6553200" y="6780108"/>
+            <a:ext cx="2133600" cy="389467"/>
           </a:xfrm>
           <a:prstGeom prst="rect">
             <a:avLst/>
@@ -2800,8 +2800,8 @@
         </p:nvSpPr>
         <p:spPr>
           <a:xfrm>
-            <a:off x="457202" y="273050"/>
-            <a:ext cx="3008313" cy="1162050"/>
+            <a:off x="457202" y="291253"/>
+            <a:ext cx="3008313" cy="1239520"/>
           </a:xfrm>
           <a:prstGeom prst="rect">
             <a:avLst/>
@@ -2835,8 +2835,8 @@
         </p:nvSpPr>
         <p:spPr>
           <a:xfrm>
-            <a:off x="3575050" y="273050"/>
-            <a:ext cx="5111750" cy="5853113"/>
+            <a:off x="3575050" y="291254"/>
+            <a:ext cx="5111750" cy="6243321"/>
           </a:xfrm>
           <a:prstGeom prst="rect">
             <a:avLst/>
@@ -2923,8 +2923,8 @@
         </p:nvSpPr>
         <p:spPr>
           <a:xfrm>
-            <a:off x="457202" y="1435100"/>
-            <a:ext cx="3008313" cy="4691063"/>
+            <a:off x="457202" y="1530774"/>
+            <a:ext cx="3008313" cy="5003801"/>
           </a:xfrm>
           <a:prstGeom prst="rect">
             <a:avLst/>
@@ -2991,8 +2991,8 @@
         </p:nvSpPr>
         <p:spPr>
           <a:xfrm>
-            <a:off x="457200" y="6356351"/>
-            <a:ext cx="2133600" cy="365125"/>
+            <a:off x="457200" y="6780108"/>
+            <a:ext cx="2133600" cy="389467"/>
           </a:xfrm>
           <a:prstGeom prst="rect">
             <a:avLst/>
@@ -3005,7 +3005,7 @@
             <a:fld id="{1D8BD707-D9CF-40AE-B4C6-C98DA3205C09}" type="datetimeFigureOut">
               <a:rPr lang="en-US" smtClean="0"/>
               <a:pPr/>
-              <a:t>7/5/2013</a:t>
+              <a:t>1/4/2014</a:t>
             </a:fld>
             <a:endParaRPr lang="en-US"/>
           </a:p>
@@ -3023,8 +3023,8 @@
         </p:nvSpPr>
         <p:spPr>
           <a:xfrm>
-            <a:off x="3124200" y="6356351"/>
-            <a:ext cx="2895600" cy="365125"/>
+            <a:off x="3124200" y="6780108"/>
+            <a:ext cx="2895600" cy="389467"/>
           </a:xfrm>
           <a:prstGeom prst="rect">
             <a:avLst/>
@@ -3050,8 +3050,8 @@
         </p:nvSpPr>
         <p:spPr>
           <a:xfrm>
-            <a:off x="6553200" y="6356351"/>
-            <a:ext cx="2133600" cy="365125"/>
+            <a:off x="6553200" y="6780108"/>
+            <a:ext cx="2133600" cy="389467"/>
           </a:xfrm>
           <a:prstGeom prst="rect">
             <a:avLst/>
@@ -3107,8 +3107,8 @@
         </p:nvSpPr>
         <p:spPr>
           <a:xfrm>
-            <a:off x="1792288" y="4800600"/>
-            <a:ext cx="5486400" cy="566738"/>
+            <a:off x="1792288" y="5120640"/>
+            <a:ext cx="5486400" cy="604521"/>
           </a:xfrm>
           <a:prstGeom prst="rect">
             <a:avLst/>
@@ -3142,8 +3142,8 @@
         </p:nvSpPr>
         <p:spPr>
           <a:xfrm>
-            <a:off x="1792288" y="612775"/>
-            <a:ext cx="5486400" cy="4114800"/>
+            <a:off x="1792288" y="653627"/>
+            <a:ext cx="5486400" cy="4389120"/>
           </a:xfrm>
           <a:prstGeom prst="rect">
             <a:avLst/>
@@ -3206,8 +3206,8 @@
         </p:nvSpPr>
         <p:spPr>
           <a:xfrm>
-            <a:off x="1792288" y="5367338"/>
-            <a:ext cx="5486400" cy="804862"/>
+            <a:off x="1792288" y="5725161"/>
+            <a:ext cx="5486400" cy="858519"/>
           </a:xfrm>
           <a:prstGeom prst="rect">
             <a:avLst/>
@@ -3274,8 +3274,8 @@
         </p:nvSpPr>
         <p:spPr>
           <a:xfrm>
-            <a:off x="457200" y="6356351"/>
-            <a:ext cx="2133600" cy="365125"/>
+            <a:off x="457200" y="6780108"/>
+            <a:ext cx="2133600" cy="389467"/>
           </a:xfrm>
           <a:prstGeom prst="rect">
             <a:avLst/>
@@ -3288,7 +3288,7 @@
             <a:fld id="{1D8BD707-D9CF-40AE-B4C6-C98DA3205C09}" type="datetimeFigureOut">
               <a:rPr lang="en-US" smtClean="0"/>
               <a:pPr/>
-              <a:t>7/5/2013</a:t>
+              <a:t>1/4/2014</a:t>
             </a:fld>
             <a:endParaRPr lang="en-US"/>
           </a:p>
@@ -3306,8 +3306,8 @@
         </p:nvSpPr>
         <p:spPr>
           <a:xfrm>
-            <a:off x="3124200" y="6356351"/>
-            <a:ext cx="2895600" cy="365125"/>
+            <a:off x="3124200" y="6780108"/>
+            <a:ext cx="2895600" cy="389467"/>
           </a:xfrm>
           <a:prstGeom prst="rect">
             <a:avLst/>
@@ -3333,8 +3333,8 @@
         </p:nvSpPr>
         <p:spPr>
           <a:xfrm>
-            <a:off x="6553200" y="6356351"/>
-            <a:ext cx="2133600" cy="365125"/>
+            <a:off x="6553200" y="6780108"/>
+            <a:ext cx="2133600" cy="389467"/>
           </a:xfrm>
           <a:prstGeom prst="rect">
             <a:avLst/>
@@ -3391,8 +3391,8 @@
         </p:nvSpPr>
         <p:spPr>
           <a:xfrm>
-            <a:off x="1295400" y="110384"/>
-            <a:ext cx="6400800" cy="6176115"/>
+            <a:off x="1295400" y="117742"/>
+            <a:ext cx="6400800" cy="6740257"/>
           </a:xfrm>
           <a:prstGeom prst="roundRect">
             <a:avLst>
@@ -3450,10 +3450,10 @@
         </p:nvGrpSpPr>
         <p:grpSpPr>
           <a:xfrm>
-            <a:off x="2131864" y="338912"/>
-            <a:ext cx="2258240" cy="2236150"/>
+            <a:off x="2131864" y="188786"/>
+            <a:ext cx="2258240" cy="2153095"/>
             <a:chOff x="-828261" y="1447800"/>
-            <a:chExt cx="1971261" cy="2497536"/>
+            <a:chExt cx="1971261" cy="2254474"/>
           </a:xfrm>
           <a:solidFill>
             <a:schemeClr val="bg1"/>
@@ -3467,8 +3467,8 @@
           </p:nvSpPr>
           <p:spPr>
             <a:xfrm>
-              <a:off x="-828261" y="1524001"/>
-              <a:ext cx="1971261" cy="2421335"/>
+              <a:off x="-828261" y="1524002"/>
+              <a:ext cx="1971261" cy="2178272"/>
             </a:xfrm>
             <a:prstGeom prst="rect">
               <a:avLst/>
@@ -3589,10 +3589,10 @@
         </p:nvGrpSpPr>
         <p:grpSpPr>
           <a:xfrm>
-            <a:off x="4814666" y="304800"/>
-            <a:ext cx="2576735" cy="4637306"/>
+            <a:off x="4814666" y="152400"/>
+            <a:ext cx="2576735" cy="4475480"/>
             <a:chOff x="-1433735" y="1447800"/>
-            <a:chExt cx="2576735" cy="4637306"/>
+            <a:chExt cx="2576735" cy="4195762"/>
           </a:xfrm>
           <a:solidFill>
             <a:schemeClr val="bg1"/>
@@ -3607,7 +3607,7 @@
           <p:spPr>
             <a:xfrm>
               <a:off x="-1433735" y="1523999"/>
-              <a:ext cx="2576734" cy="4561107"/>
+              <a:ext cx="2576734" cy="4119563"/>
             </a:xfrm>
             <a:prstGeom prst="rect">
               <a:avLst/>
@@ -3720,10 +3720,10 @@
         </p:nvGrpSpPr>
         <p:grpSpPr>
           <a:xfrm>
-            <a:off x="2131864" y="2667000"/>
-            <a:ext cx="2258241" cy="2275106"/>
+            <a:off x="2131865" y="2418080"/>
+            <a:ext cx="2258241" cy="2209800"/>
             <a:chOff x="-613964" y="1447800"/>
-            <a:chExt cx="1756964" cy="2275106"/>
+            <a:chExt cx="1756964" cy="2071687"/>
           </a:xfrm>
           <a:solidFill>
             <a:schemeClr val="bg1"/>
@@ -3738,7 +3738,7 @@
           <p:spPr>
             <a:xfrm>
               <a:off x="-613964" y="1523999"/>
-              <a:ext cx="1756963" cy="2198907"/>
+              <a:ext cx="1756963" cy="1995488"/>
             </a:xfrm>
             <a:prstGeom prst="rect">
               <a:avLst/>
@@ -3851,10 +3851,10 @@
         </p:nvGrpSpPr>
         <p:grpSpPr>
           <a:xfrm>
-            <a:off x="2131864" y="5105399"/>
-            <a:ext cx="5259536" cy="990600"/>
-            <a:chOff x="-4116536" y="1451133"/>
-            <a:chExt cx="5259536" cy="903358"/>
+            <a:off x="1371600" y="4724400"/>
+            <a:ext cx="6019800" cy="1905000"/>
+            <a:chOff x="-4876800" y="1451133"/>
+            <a:chExt cx="6019800" cy="1628650"/>
           </a:xfrm>
           <a:solidFill>
             <a:schemeClr val="bg1"/>
@@ -3868,8 +3868,8 @@
           </p:nvSpPr>
           <p:spPr>
             <a:xfrm>
-              <a:off x="-4116536" y="1524000"/>
-              <a:ext cx="5259536" cy="830491"/>
+              <a:off x="-4876800" y="1524000"/>
+              <a:ext cx="6019800" cy="1555783"/>
             </a:xfrm>
             <a:prstGeom prst="rect">
               <a:avLst/>
@@ -3982,8 +3982,8 @@
         </p:nvSpPr>
         <p:spPr>
           <a:xfrm>
-            <a:off x="7924800" y="110384"/>
-            <a:ext cx="914400" cy="6176114"/>
+            <a:off x="7924800" y="117743"/>
+            <a:ext cx="914400" cy="6740256"/>
           </a:xfrm>
           <a:prstGeom prst="roundRect">
             <a:avLst>
@@ -4040,8 +4040,8 @@
         </p:nvSpPr>
         <p:spPr>
           <a:xfrm>
-            <a:off x="8382000" y="-228600"/>
-            <a:ext cx="609600" cy="7162800"/>
+            <a:off x="8382000" y="-243840"/>
+            <a:ext cx="609600" cy="7640320"/>
           </a:xfrm>
           <a:prstGeom prst="rect">
             <a:avLst/>
@@ -4367,146 +4367,15 @@
           <a:chExt cx="0" cy="0"/>
         </a:xfrm>
       </p:grpSpPr>
-      <p:grpSp>
-        <p:nvGrpSpPr>
-          <p:cNvPr id="128" name="Group 127"/>
-          <p:cNvGrpSpPr/>
-          <p:nvPr/>
-        </p:nvGrpSpPr>
-        <p:grpSpPr>
-          <a:xfrm>
-            <a:off x="4814665" y="304800"/>
-            <a:ext cx="2576735" cy="4637306"/>
-            <a:chOff x="-1433735" y="1447800"/>
-            <a:chExt cx="2576735" cy="4637306"/>
-          </a:xfrm>
-          <a:solidFill>
-            <a:schemeClr val="bg1"/>
-          </a:solidFill>
-        </p:grpSpPr>
-        <p:sp>
-          <p:nvSpPr>
-            <p:cNvPr id="129" name="Rectangle 128"/>
-            <p:cNvSpPr/>
-            <p:nvPr/>
-          </p:nvSpPr>
-          <p:spPr>
-            <a:xfrm>
-              <a:off x="-1433735" y="1523999"/>
-              <a:ext cx="2576734" cy="4561107"/>
-            </a:xfrm>
-            <a:prstGeom prst="rect">
-              <a:avLst/>
-            </a:prstGeom>
-            <a:grpFill/>
-            <a:ln>
-              <a:solidFill>
-                <a:schemeClr val="accent4">
-                  <a:lumMod val="60000"/>
-                  <a:lumOff val="40000"/>
-                </a:schemeClr>
-              </a:solidFill>
-            </a:ln>
-          </p:spPr>
-          <p:style>
-            <a:lnRef idx="2">
-              <a:schemeClr val="accent1">
-                <a:shade val="50000"/>
-              </a:schemeClr>
-            </a:lnRef>
-            <a:fillRef idx="1">
-              <a:schemeClr val="accent1"/>
-            </a:fillRef>
-            <a:effectRef idx="0">
-              <a:schemeClr val="accent1"/>
-            </a:effectRef>
-            <a:fontRef idx="minor">
-              <a:schemeClr val="lt1"/>
-            </a:fontRef>
-          </p:style>
-          <p:txBody>
-            <a:bodyPr rtlCol="0" anchor="t" anchorCtr="0"/>
-            <a:lstStyle/>
-            <a:p>
-              <a:r>
-                <a:rPr lang="en-US" sz="1400" b="1" smtClean="0">
-                  <a:solidFill>
-                    <a:srgbClr val="7030A0"/>
-                  </a:solidFill>
-                </a:rPr>
-                <a:t>logic::core</a:t>
-              </a:r>
-              <a:endParaRPr lang="en-SG" sz="1400" b="1" dirty="0">
-                <a:solidFill>
-                  <a:srgbClr val="7030A0"/>
-                </a:solidFill>
-              </a:endParaRPr>
-            </a:p>
-          </p:txBody>
-        </p:sp>
-        <p:sp>
-          <p:nvSpPr>
-            <p:cNvPr id="130" name="Rectangle 129"/>
-            <p:cNvSpPr/>
-            <p:nvPr/>
-          </p:nvSpPr>
-          <p:spPr>
-            <a:xfrm>
-              <a:off x="647700" y="1447800"/>
-              <a:ext cx="495300" cy="76200"/>
-            </a:xfrm>
-            <a:prstGeom prst="rect">
-              <a:avLst/>
-            </a:prstGeom>
-            <a:grpFill/>
-            <a:ln>
-              <a:solidFill>
-                <a:schemeClr val="accent4">
-                  <a:lumMod val="60000"/>
-                  <a:lumOff val="40000"/>
-                </a:schemeClr>
-              </a:solidFill>
-            </a:ln>
-          </p:spPr>
-          <p:style>
-            <a:lnRef idx="2">
-              <a:schemeClr val="accent1">
-                <a:shade val="50000"/>
-              </a:schemeClr>
-            </a:lnRef>
-            <a:fillRef idx="1">
-              <a:schemeClr val="accent1"/>
-            </a:fillRef>
-            <a:effectRef idx="0">
-              <a:schemeClr val="accent1"/>
-            </a:effectRef>
-            <a:fontRef idx="minor">
-              <a:schemeClr val="lt1"/>
-            </a:fontRef>
-          </p:style>
-          <p:txBody>
-            <a:bodyPr rtlCol="0" anchor="t" anchorCtr="0"/>
-            <a:lstStyle/>
-            <a:p>
-              <a:pPr algn="ctr"/>
-              <a:endParaRPr lang="en-SG" sz="1400" b="1">
-                <a:solidFill>
-                  <a:srgbClr val="7030A0"/>
-                </a:solidFill>
-              </a:endParaRPr>
-            </a:p>
-          </p:txBody>
-        </p:sp>
-      </p:grpSp>
       <p:cxnSp>
         <p:nvCxnSpPr>
-          <p:cNvPr id="131" name="Straight Arrow Connector 130"/>
+          <p:cNvPr id="48" name="Straight Arrow Connector 47"/>
           <p:cNvCxnSpPr/>
           <p:nvPr/>
         </p:nvCxnSpPr>
         <p:spPr>
           <a:xfrm flipV="1">
-            <a:off x="1143000" y="1600199"/>
+            <a:off x="1143000" y="1382618"/>
             <a:ext cx="990600" cy="9627"/>
           </a:xfrm>
           <a:prstGeom prst="straightConnector1">
@@ -4537,13 +4406,13 @@
       </p:cxnSp>
       <p:sp>
         <p:nvSpPr>
-          <p:cNvPr id="132" name="Rectangle 131"/>
+          <p:cNvPr id="49" name="Rectangle 48"/>
           <p:cNvSpPr/>
           <p:nvPr/>
         </p:nvSpPr>
         <p:spPr>
           <a:xfrm>
-            <a:off x="2388853" y="1600200"/>
+            <a:off x="2388853" y="1382619"/>
             <a:ext cx="1676400" cy="506760"/>
           </a:xfrm>
           <a:prstGeom prst="rect">
@@ -4581,13 +4450,13 @@
       </p:sp>
       <p:sp>
         <p:nvSpPr>
-          <p:cNvPr id="133" name="Rectangle 132"/>
+          <p:cNvPr id="50" name="Rectangle 49"/>
           <p:cNvSpPr/>
           <p:nvPr/>
         </p:nvSpPr>
         <p:spPr>
           <a:xfrm>
-            <a:off x="5486400" y="3429000"/>
+            <a:off x="5486400" y="3211419"/>
             <a:ext cx="1676400" cy="304800"/>
           </a:xfrm>
           <a:prstGeom prst="rect">
@@ -4631,13 +4500,13 @@
       </p:sp>
       <p:sp>
         <p:nvSpPr>
-          <p:cNvPr id="134" name="Rectangle 133"/>
+          <p:cNvPr id="51" name="Rectangle 50"/>
           <p:cNvSpPr/>
           <p:nvPr/>
         </p:nvSpPr>
         <p:spPr>
           <a:xfrm rot="16200000">
-            <a:off x="2696519" y="3710076"/>
+            <a:off x="2696519" y="3418755"/>
             <a:ext cx="1619498" cy="455063"/>
           </a:xfrm>
           <a:prstGeom prst="rect">
@@ -4681,13 +4550,13 @@
       </p:sp>
       <p:sp>
         <p:nvSpPr>
-          <p:cNvPr id="135" name="Rectangle 134"/>
+          <p:cNvPr id="52" name="Rectangle 51"/>
           <p:cNvSpPr/>
           <p:nvPr/>
         </p:nvSpPr>
         <p:spPr>
           <a:xfrm rot="16200000">
-            <a:off x="1824774" y="3728533"/>
+            <a:off x="1824774" y="3437212"/>
             <a:ext cx="1645397" cy="418146"/>
           </a:xfrm>
           <a:prstGeom prst="rect">
@@ -4731,13 +4600,13 @@
       </p:sp>
       <p:sp>
         <p:nvSpPr>
-          <p:cNvPr id="136" name="Isosceles Triangle 135"/>
+          <p:cNvPr id="53" name="Isosceles Triangle 52"/>
           <p:cNvSpPr/>
           <p:nvPr/>
         </p:nvSpPr>
         <p:spPr>
           <a:xfrm>
-            <a:off x="3368156" y="2133600"/>
+            <a:off x="3368156" y="1916019"/>
             <a:ext cx="276225" cy="228600"/>
           </a:xfrm>
           <a:prstGeom prst="triangle">
@@ -4771,17 +4640,17 @@
       </p:sp>
       <p:cxnSp>
         <p:nvCxnSpPr>
-          <p:cNvPr id="137" name="Elbow Connector 136"/>
+          <p:cNvPr id="54" name="Elbow Connector 53"/>
           <p:cNvCxnSpPr>
-            <a:stCxn id="136" idx="3"/>
-            <a:endCxn id="134" idx="3"/>
+            <a:stCxn id="53" idx="3"/>
+            <a:endCxn id="51" idx="3"/>
           </p:cNvCxnSpPr>
           <p:nvPr/>
         </p:nvCxnSpPr>
         <p:spPr>
           <a:xfrm rot="5400000">
-            <a:off x="3123440" y="2745029"/>
-            <a:ext cx="765659" cy="1"/>
+            <a:off x="3160310" y="2490578"/>
+            <a:ext cx="691919" cy="1"/>
           </a:xfrm>
           <a:prstGeom prst="bentConnector3">
             <a:avLst>
@@ -4812,15 +4681,15 @@
       </p:cxnSp>
       <p:cxnSp>
         <p:nvCxnSpPr>
-          <p:cNvPr id="138" name="Straight Arrow Connector 137"/>
+          <p:cNvPr id="55" name="Straight Arrow Connector 54"/>
           <p:cNvCxnSpPr>
-            <a:endCxn id="134" idx="0"/>
+            <a:endCxn id="51" idx="0"/>
           </p:cNvCxnSpPr>
           <p:nvPr/>
         </p:nvCxnSpPr>
         <p:spPr>
           <a:xfrm flipV="1">
-            <a:off x="2895600" y="3937608"/>
+            <a:off x="2895600" y="3646287"/>
             <a:ext cx="383137" cy="1"/>
           </a:xfrm>
           <a:prstGeom prst="straightConnector1">
@@ -4850,15 +4719,15 @@
       </p:cxnSp>
       <p:cxnSp>
         <p:nvCxnSpPr>
-          <p:cNvPr id="139" name="Straight Arrow Connector 138"/>
+          <p:cNvPr id="56" name="Straight Arrow Connector 55"/>
           <p:cNvCxnSpPr>
-            <a:endCxn id="135" idx="0"/>
+            <a:endCxn id="52" idx="0"/>
           </p:cNvCxnSpPr>
           <p:nvPr/>
         </p:nvCxnSpPr>
         <p:spPr>
           <a:xfrm flipV="1">
-            <a:off x="1143000" y="3937606"/>
+            <a:off x="1143000" y="3646285"/>
             <a:ext cx="1295400" cy="4"/>
           </a:xfrm>
           <a:prstGeom prst="straightConnector1">
@@ -4889,13 +4758,13 @@
       </p:cxnSp>
       <p:sp>
         <p:nvSpPr>
-          <p:cNvPr id="141" name="Rectangle 140"/>
+          <p:cNvPr id="57" name="Rectangle 56"/>
           <p:cNvSpPr/>
           <p:nvPr/>
         </p:nvSpPr>
         <p:spPr>
           <a:xfrm>
-            <a:off x="2362200" y="5486400"/>
+            <a:off x="5241634" y="5024280"/>
             <a:ext cx="1905000" cy="533400"/>
           </a:xfrm>
           <a:prstGeom prst="rect">
@@ -4904,15 +4773,15 @@
         </p:spPr>
         <p:style>
           <a:lnRef idx="2">
-            <a:schemeClr val="accent5">
+            <a:schemeClr val="accent6">
               <a:shade val="50000"/>
             </a:schemeClr>
           </a:lnRef>
           <a:fillRef idx="1">
-            <a:schemeClr val="accent5"/>
+            <a:schemeClr val="accent6"/>
           </a:fillRef>
           <a:effectRef idx="0">
-            <a:schemeClr val="accent5"/>
+            <a:schemeClr val="accent6"/>
           </a:effectRef>
           <a:fontRef idx="minor">
             <a:schemeClr val="lt1"/>
@@ -4924,19 +4793,8 @@
           <a:p>
             <a:pPr algn="ctr"/>
             <a:r>
-              <a:rPr lang="en-US" sz="1600" b="1" dirty="0" smtClean="0"/>
-              <a:t>Automated</a:t>
-            </a:r>
-            <a:r>
-              <a:rPr lang="en-US" sz="1600" b="1" dirty="0" smtClean="0"/>
-              <a:t/>
-            </a:r>
-            <a:br>
-              <a:rPr lang="en-US" sz="1600" b="1" dirty="0" smtClean="0"/>
-            </a:br>
-            <a:r>
               <a:rPr lang="en-US" sz="1600" b="1" dirty="0" err="1" smtClean="0"/>
-              <a:t>RemindersServlet</a:t>
+              <a:t>EmailAction</a:t>
             </a:r>
             <a:endParaRPr lang="en-SG" sz="1600" b="1" dirty="0"/>
           </a:p>
@@ -4944,13 +4802,13 @@
       </p:sp>
       <p:sp>
         <p:nvSpPr>
-          <p:cNvPr id="142" name="Rectangle 141"/>
+          <p:cNvPr id="58" name="Rectangle 57"/>
           <p:cNvSpPr/>
           <p:nvPr/>
         </p:nvSpPr>
         <p:spPr>
           <a:xfrm>
-            <a:off x="5231051" y="5334000"/>
+            <a:off x="5231051" y="5881624"/>
             <a:ext cx="2038928" cy="533400"/>
           </a:xfrm>
           <a:prstGeom prst="rect">
@@ -4959,15 +4817,15 @@
         </p:spPr>
         <p:style>
           <a:lnRef idx="2">
-            <a:schemeClr val="accent5">
+            <a:schemeClr val="accent6">
               <a:shade val="50000"/>
             </a:schemeClr>
           </a:lnRef>
           <a:fillRef idx="1">
-            <a:schemeClr val="accent5"/>
+            <a:schemeClr val="accent6"/>
           </a:fillRef>
           <a:effectRef idx="0">
-            <a:schemeClr val="accent5"/>
+            <a:schemeClr val="accent6"/>
           </a:effectRef>
           <a:fontRef idx="minor">
             <a:schemeClr val="lt1"/>
@@ -4999,15 +4857,13 @@
       </p:sp>
       <p:cxnSp>
         <p:nvCxnSpPr>
-          <p:cNvPr id="143" name="Straight Arrow Connector 142"/>
-          <p:cNvCxnSpPr>
-            <a:endCxn id="129" idx="2"/>
-          </p:cNvCxnSpPr>
+          <p:cNvPr id="59" name="Straight Arrow Connector 58"/>
+          <p:cNvCxnSpPr/>
           <p:nvPr/>
         </p:nvCxnSpPr>
         <p:spPr>
           <a:xfrm flipV="1">
-            <a:off x="6103032" y="4942106"/>
+            <a:off x="6103032" y="4561106"/>
             <a:ext cx="0" cy="239494"/>
           </a:xfrm>
           <a:prstGeom prst="straightConnector1">
@@ -5037,13 +4893,13 @@
       </p:cxnSp>
       <p:sp>
         <p:nvSpPr>
-          <p:cNvPr id="145" name="Rectangle 144"/>
+          <p:cNvPr id="60" name="Rectangle 59"/>
           <p:cNvSpPr/>
           <p:nvPr/>
         </p:nvSpPr>
         <p:spPr>
           <a:xfrm>
-            <a:off x="5473936" y="3811488"/>
+            <a:off x="5473936" y="3593907"/>
             <a:ext cx="1688863" cy="303312"/>
           </a:xfrm>
           <a:prstGeom prst="rect">
@@ -5087,13 +4943,13 @@
       </p:sp>
       <p:cxnSp>
         <p:nvCxnSpPr>
-          <p:cNvPr id="146" name="Straight Arrow Connector 145"/>
+          <p:cNvPr id="61" name="Straight Arrow Connector 60"/>
           <p:cNvCxnSpPr/>
           <p:nvPr/>
         </p:nvCxnSpPr>
         <p:spPr>
           <a:xfrm flipH="1">
-            <a:off x="4419600" y="1614992"/>
+            <a:off x="4419600" y="1397411"/>
             <a:ext cx="420167" cy="0"/>
           </a:xfrm>
           <a:prstGeom prst="straightConnector1">
@@ -5124,13 +4980,13 @@
       </p:cxnSp>
       <p:sp>
         <p:nvSpPr>
-          <p:cNvPr id="147" name="TextBox 146"/>
+          <p:cNvPr id="62" name="TextBox 61"/>
           <p:cNvSpPr txBox="1"/>
           <p:nvPr/>
         </p:nvSpPr>
         <p:spPr>
           <a:xfrm>
-            <a:off x="523775" y="1447800"/>
+            <a:off x="523775" y="1230219"/>
             <a:ext cx="609600" cy="307777"/>
           </a:xfrm>
           <a:prstGeom prst="rect">
@@ -5247,13 +5103,13 @@
       </p:sp>
       <p:sp>
         <p:nvSpPr>
-          <p:cNvPr id="148" name="TextBox 147"/>
+          <p:cNvPr id="63" name="TextBox 62"/>
           <p:cNvSpPr txBox="1"/>
           <p:nvPr/>
         </p:nvSpPr>
         <p:spPr>
           <a:xfrm>
-            <a:off x="152400" y="3733800"/>
+            <a:off x="152400" y="3442479"/>
             <a:ext cx="937901" cy="307777"/>
           </a:xfrm>
           <a:prstGeom prst="rect">
@@ -5370,13 +5226,13 @@
       </p:sp>
       <p:cxnSp>
         <p:nvCxnSpPr>
-          <p:cNvPr id="149" name="Straight Arrow Connector 148"/>
+          <p:cNvPr id="64" name="Straight Arrow Connector 63"/>
           <p:cNvCxnSpPr/>
           <p:nvPr/>
         </p:nvCxnSpPr>
         <p:spPr>
           <a:xfrm>
-            <a:off x="3753490" y="4455013"/>
+            <a:off x="3753490" y="4237432"/>
             <a:ext cx="4171310" cy="0"/>
           </a:xfrm>
           <a:prstGeom prst="straightConnector1">
@@ -5407,13 +5263,13 @@
       </p:cxnSp>
       <p:cxnSp>
         <p:nvCxnSpPr>
-          <p:cNvPr id="150" name="Straight Arrow Connector 149"/>
+          <p:cNvPr id="65" name="Straight Arrow Connector 64"/>
           <p:cNvCxnSpPr/>
           <p:nvPr/>
         </p:nvCxnSpPr>
         <p:spPr>
           <a:xfrm flipV="1">
-            <a:off x="4554908" y="6096000"/>
+            <a:off x="3386411" y="6521244"/>
             <a:ext cx="0" cy="381000"/>
           </a:xfrm>
           <a:prstGeom prst="straightConnector1">
@@ -5444,13 +5300,13 @@
       </p:cxnSp>
       <p:sp>
         <p:nvSpPr>
-          <p:cNvPr id="151" name="TextBox 150"/>
+          <p:cNvPr id="66" name="TextBox 65"/>
           <p:cNvSpPr txBox="1"/>
           <p:nvPr/>
         </p:nvSpPr>
         <p:spPr>
           <a:xfrm>
-            <a:off x="3657600" y="6487682"/>
+            <a:off x="2489103" y="6823067"/>
             <a:ext cx="1816337" cy="307777"/>
           </a:xfrm>
           <a:prstGeom prst="rect">
@@ -5583,13 +5439,13 @@
       </p:sp>
       <p:cxnSp>
         <p:nvCxnSpPr>
-          <p:cNvPr id="152" name="Straight Arrow Connector 151"/>
+          <p:cNvPr id="67" name="Straight Arrow Connector 66"/>
           <p:cNvCxnSpPr/>
           <p:nvPr/>
         </p:nvCxnSpPr>
         <p:spPr>
           <a:xfrm flipH="1">
-            <a:off x="3753490" y="3962400"/>
+            <a:off x="3753490" y="3744819"/>
             <a:ext cx="1720446" cy="2233"/>
           </a:xfrm>
           <a:prstGeom prst="straightConnector1">
@@ -5620,13 +5476,13 @@
       </p:cxnSp>
       <p:sp>
         <p:nvSpPr>
-          <p:cNvPr id="153" name="Rectangle 152"/>
+          <p:cNvPr id="68" name="Rectangle 67"/>
           <p:cNvSpPr/>
           <p:nvPr/>
         </p:nvSpPr>
         <p:spPr>
           <a:xfrm>
-            <a:off x="5476875" y="1019172"/>
+            <a:off x="5476875" y="801591"/>
             <a:ext cx="1676400" cy="274320"/>
           </a:xfrm>
           <a:prstGeom prst="rect">
@@ -5664,13 +5520,13 @@
       </p:sp>
       <p:sp>
         <p:nvSpPr>
-          <p:cNvPr id="154" name="Rectangle 153"/>
+          <p:cNvPr id="69" name="Rectangle 68"/>
           <p:cNvSpPr/>
           <p:nvPr/>
         </p:nvSpPr>
         <p:spPr>
           <a:xfrm>
-            <a:off x="5476875" y="1365138"/>
+            <a:off x="5476875" y="1147557"/>
             <a:ext cx="1676400" cy="274320"/>
           </a:xfrm>
           <a:prstGeom prst="rect">
@@ -5708,13 +5564,13 @@
       </p:sp>
       <p:sp>
         <p:nvSpPr>
-          <p:cNvPr id="155" name="Rectangle 154"/>
+          <p:cNvPr id="70" name="Rectangle 69"/>
           <p:cNvSpPr/>
           <p:nvPr/>
         </p:nvSpPr>
         <p:spPr>
           <a:xfrm>
-            <a:off x="5476875" y="2057069"/>
+            <a:off x="5476875" y="1839488"/>
             <a:ext cx="1676400" cy="274320"/>
           </a:xfrm>
           <a:prstGeom prst="rect">
@@ -5752,13 +5608,13 @@
       </p:sp>
       <p:cxnSp>
         <p:nvCxnSpPr>
-          <p:cNvPr id="156" name="Straight Arrow Connector 155"/>
+          <p:cNvPr id="71" name="Straight Arrow Connector 70"/>
           <p:cNvCxnSpPr/>
           <p:nvPr/>
         </p:nvCxnSpPr>
         <p:spPr>
           <a:xfrm>
-            <a:off x="7153275" y="1490030"/>
+            <a:off x="7153275" y="1272449"/>
             <a:ext cx="723900" cy="0"/>
           </a:xfrm>
           <a:prstGeom prst="straightConnector1">
@@ -5789,13 +5645,13 @@
       </p:cxnSp>
       <p:cxnSp>
         <p:nvCxnSpPr>
-          <p:cNvPr id="157" name="Straight Arrow Connector 156"/>
+          <p:cNvPr id="72" name="Straight Arrow Connector 71"/>
           <p:cNvCxnSpPr/>
           <p:nvPr/>
         </p:nvCxnSpPr>
         <p:spPr>
           <a:xfrm>
-            <a:off x="7162800" y="1123675"/>
+            <a:off x="7162800" y="906094"/>
             <a:ext cx="771525" cy="0"/>
           </a:xfrm>
           <a:prstGeom prst="straightConnector1">
@@ -5826,13 +5682,13 @@
       </p:cxnSp>
       <p:sp>
         <p:nvSpPr>
-          <p:cNvPr id="158" name="Rounded Rectangle 157"/>
+          <p:cNvPr id="73" name="Rounded Rectangle 72"/>
           <p:cNvSpPr/>
           <p:nvPr/>
         </p:nvSpPr>
         <p:spPr>
           <a:xfrm>
-            <a:off x="4825619" y="4338026"/>
+            <a:off x="4825619" y="4120445"/>
             <a:ext cx="2576734" cy="233974"/>
           </a:xfrm>
           <a:prstGeom prst="roundRect">
@@ -5877,13 +5733,13 @@
       </p:sp>
       <p:sp>
         <p:nvSpPr>
-          <p:cNvPr id="159" name="Rectangle 158"/>
+          <p:cNvPr id="74" name="Rectangle 73"/>
           <p:cNvSpPr/>
           <p:nvPr/>
         </p:nvSpPr>
         <p:spPr>
           <a:xfrm>
-            <a:off x="5476875" y="674781"/>
+            <a:off x="5476875" y="457200"/>
             <a:ext cx="1676400" cy="274320"/>
           </a:xfrm>
           <a:prstGeom prst="rect">
@@ -5921,13 +5777,13 @@
       </p:sp>
       <p:sp>
         <p:nvSpPr>
-          <p:cNvPr id="160" name="Rectangle 159"/>
+          <p:cNvPr id="75" name="Rectangle 74"/>
           <p:cNvSpPr/>
           <p:nvPr/>
         </p:nvSpPr>
         <p:spPr>
           <a:xfrm>
-            <a:off x="5476875" y="1711104"/>
+            <a:off x="5476875" y="1493523"/>
             <a:ext cx="1676400" cy="274320"/>
           </a:xfrm>
           <a:prstGeom prst="rect">
@@ -5965,13 +5821,13 @@
       </p:sp>
       <p:cxnSp>
         <p:nvCxnSpPr>
-          <p:cNvPr id="162" name="Straight Arrow Connector 161"/>
+          <p:cNvPr id="76" name="Straight Arrow Connector 75"/>
           <p:cNvCxnSpPr/>
           <p:nvPr/>
         </p:nvCxnSpPr>
         <p:spPr>
           <a:xfrm>
-            <a:off x="7153275" y="811941"/>
+            <a:off x="7153275" y="594360"/>
             <a:ext cx="745256" cy="0"/>
           </a:xfrm>
           <a:prstGeom prst="straightConnector1">
@@ -6002,13 +5858,13 @@
       </p:cxnSp>
       <p:cxnSp>
         <p:nvCxnSpPr>
-          <p:cNvPr id="163" name="Straight Arrow Connector 162"/>
+          <p:cNvPr id="77" name="Straight Arrow Connector 76"/>
           <p:cNvCxnSpPr/>
           <p:nvPr/>
         </p:nvCxnSpPr>
         <p:spPr>
           <a:xfrm>
-            <a:off x="7153275" y="1829862"/>
+            <a:off x="7153275" y="1612281"/>
             <a:ext cx="762000" cy="0"/>
           </a:xfrm>
           <a:prstGeom prst="straightConnector1">
@@ -6039,13 +5895,13 @@
       </p:cxnSp>
       <p:cxnSp>
         <p:nvCxnSpPr>
-          <p:cNvPr id="164" name="Straight Arrow Connector 163"/>
+          <p:cNvPr id="78" name="Straight Arrow Connector 77"/>
           <p:cNvCxnSpPr/>
           <p:nvPr/>
         </p:nvCxnSpPr>
         <p:spPr>
           <a:xfrm flipV="1">
-            <a:off x="7153275" y="2169696"/>
+            <a:off x="7153275" y="1952115"/>
             <a:ext cx="771525" cy="4542"/>
           </a:xfrm>
           <a:prstGeom prst="straightConnector1">
@@ -6076,13 +5932,13 @@
       </p:cxnSp>
       <p:sp>
         <p:nvSpPr>
-          <p:cNvPr id="165" name="Rectangle 164"/>
+          <p:cNvPr id="79" name="Rectangle 78"/>
           <p:cNvSpPr/>
           <p:nvPr/>
         </p:nvSpPr>
         <p:spPr>
           <a:xfrm>
-            <a:off x="5476875" y="2422829"/>
+            <a:off x="5476875" y="2205248"/>
             <a:ext cx="1676400" cy="274320"/>
           </a:xfrm>
           <a:prstGeom prst="rect">
@@ -6120,13 +5976,13 @@
       </p:sp>
       <p:cxnSp>
         <p:nvCxnSpPr>
-          <p:cNvPr id="166" name="Straight Arrow Connector 165"/>
+          <p:cNvPr id="80" name="Straight Arrow Connector 79"/>
           <p:cNvCxnSpPr/>
           <p:nvPr/>
         </p:nvCxnSpPr>
         <p:spPr>
           <a:xfrm flipV="1">
-            <a:off x="7153275" y="2535456"/>
+            <a:off x="7153275" y="2317875"/>
             <a:ext cx="771525" cy="4542"/>
           </a:xfrm>
           <a:prstGeom prst="straightConnector1">
@@ -6157,13 +6013,13 @@
       </p:cxnSp>
       <p:sp>
         <p:nvSpPr>
-          <p:cNvPr id="167" name="Rectangle 166"/>
+          <p:cNvPr id="81" name="Rectangle 80"/>
           <p:cNvSpPr/>
           <p:nvPr/>
         </p:nvSpPr>
         <p:spPr>
           <a:xfrm>
-            <a:off x="2388853" y="838200"/>
+            <a:off x="2388853" y="620619"/>
             <a:ext cx="1676400" cy="506760"/>
           </a:xfrm>
           <a:prstGeom prst="rect">
@@ -6201,13 +6057,13 @@
       </p:sp>
       <p:sp>
         <p:nvSpPr>
-          <p:cNvPr id="168" name="Rectangle 167"/>
+          <p:cNvPr id="82" name="Rectangle 81"/>
           <p:cNvSpPr/>
           <p:nvPr/>
         </p:nvSpPr>
         <p:spPr>
           <a:xfrm>
-            <a:off x="5486399" y="2773680"/>
+            <a:off x="5486399" y="2556099"/>
             <a:ext cx="1676400" cy="274320"/>
           </a:xfrm>
           <a:prstGeom prst="rect">
@@ -6245,13 +6101,13 @@
       </p:sp>
       <p:cxnSp>
         <p:nvCxnSpPr>
-          <p:cNvPr id="169" name="Straight Arrow Connector 168"/>
+          <p:cNvPr id="83" name="Straight Arrow Connector 82"/>
           <p:cNvCxnSpPr/>
           <p:nvPr/>
         </p:nvCxnSpPr>
         <p:spPr>
           <a:xfrm flipV="1">
-            <a:off x="7162800" y="2892611"/>
+            <a:off x="7162800" y="2675030"/>
             <a:ext cx="771525" cy="4542"/>
           </a:xfrm>
           <a:prstGeom prst="straightConnector1">
@@ -6282,14 +6138,192 @@
       </p:cxnSp>
       <p:sp>
         <p:nvSpPr>
-          <p:cNvPr id="170" name="Rectangle 169"/>
+          <p:cNvPr id="84" name="Rectangle 83"/>
           <p:cNvSpPr/>
           <p:nvPr/>
         </p:nvSpPr>
         <p:spPr>
           <a:xfrm>
-            <a:off x="5174670" y="5394036"/>
+            <a:off x="5174670" y="5941660"/>
             <a:ext cx="2038928" cy="533400"/>
+          </a:xfrm>
+          <a:prstGeom prst="rect">
+            <a:avLst/>
+          </a:prstGeom>
+        </p:spPr>
+        <p:style>
+          <a:lnRef idx="2">
+            <a:schemeClr val="accent6">
+              <a:shade val="50000"/>
+            </a:schemeClr>
+          </a:lnRef>
+          <a:fillRef idx="1">
+            <a:schemeClr val="accent6"/>
+          </a:fillRef>
+          <a:effectRef idx="0">
+            <a:schemeClr val="accent6"/>
+          </a:effectRef>
+          <a:fontRef idx="minor">
+            <a:schemeClr val="lt1"/>
+          </a:fontRef>
+        </p:style>
+        <p:txBody>
+          <a:bodyPr rtlCol="0" anchor="ctr"/>
+          <a:lstStyle/>
+          <a:p>
+            <a:pPr algn="ctr"/>
+            <a:r>
+              <a:rPr lang="en-US" sz="1600" b="1" dirty="0" err="1" smtClean="0"/>
+              <a:t>EvaluationClosing</a:t>
+            </a:r>
+            <a:r>
+              <a:rPr lang="en-US" sz="1600" b="1" dirty="0" smtClean="0"/>
+              <a:t/>
+            </a:r>
+            <a:br>
+              <a:rPr lang="en-US" sz="1600" b="1" dirty="0" smtClean="0"/>
+            </a:br>
+            <a:r>
+              <a:rPr lang="en-US" sz="1600" b="1" dirty="0" err="1" smtClean="0"/>
+              <a:t>RemindersServlet</a:t>
+            </a:r>
+            <a:endParaRPr lang="en-SG" sz="1600" b="1" dirty="0"/>
+          </a:p>
+        </p:txBody>
+      </p:sp>
+      <p:sp>
+        <p:nvSpPr>
+          <p:cNvPr id="85" name="Rectangle 84"/>
+          <p:cNvSpPr/>
+          <p:nvPr/>
+        </p:nvSpPr>
+        <p:spPr>
+          <a:xfrm>
+            <a:off x="5105400" y="5987844"/>
+            <a:ext cx="2038928" cy="533400"/>
+          </a:xfrm>
+          <a:prstGeom prst="rect">
+            <a:avLst/>
+          </a:prstGeom>
+        </p:spPr>
+        <p:style>
+          <a:lnRef idx="2">
+            <a:schemeClr val="accent6">
+              <a:shade val="50000"/>
+            </a:schemeClr>
+          </a:lnRef>
+          <a:fillRef idx="1">
+            <a:schemeClr val="accent6"/>
+          </a:fillRef>
+          <a:effectRef idx="0">
+            <a:schemeClr val="accent6"/>
+          </a:effectRef>
+          <a:fontRef idx="minor">
+            <a:schemeClr val="lt1"/>
+          </a:fontRef>
+        </p:style>
+        <p:txBody>
+          <a:bodyPr rtlCol="0" anchor="ctr"/>
+          <a:lstStyle/>
+          <a:p>
+            <a:pPr algn="ctr"/>
+            <a:r>
+              <a:rPr lang="en-US" sz="1600" b="1" dirty="0" smtClean="0"/>
+              <a:t>…..</a:t>
+            </a:r>
+            <a:r>
+              <a:rPr lang="en-US" sz="1600" b="1" dirty="0" err="1" smtClean="0"/>
+              <a:t>MailAction</a:t>
+            </a:r>
+            <a:endParaRPr lang="en-SG" sz="1600" b="1" dirty="0"/>
+          </a:p>
+        </p:txBody>
+      </p:sp>
+      <p:sp>
+        <p:nvSpPr>
+          <p:cNvPr id="86" name="Isosceles Triangle 85"/>
+          <p:cNvSpPr/>
+          <p:nvPr/>
+        </p:nvSpPr>
+        <p:spPr>
+          <a:xfrm>
+            <a:off x="5986751" y="5553915"/>
+            <a:ext cx="276225" cy="228600"/>
+          </a:xfrm>
+          <a:prstGeom prst="triangle">
+            <a:avLst/>
+          </a:prstGeom>
+        </p:spPr>
+        <p:style>
+          <a:lnRef idx="2">
+            <a:schemeClr val="accent6">
+              <a:shade val="50000"/>
+            </a:schemeClr>
+          </a:lnRef>
+          <a:fillRef idx="1">
+            <a:schemeClr val="accent6"/>
+          </a:fillRef>
+          <a:effectRef idx="0">
+            <a:schemeClr val="accent6"/>
+          </a:effectRef>
+          <a:fontRef idx="minor">
+            <a:schemeClr val="lt1"/>
+          </a:fontRef>
+        </p:style>
+        <p:txBody>
+          <a:bodyPr rtlCol="0" anchor="ctr"/>
+          <a:lstStyle/>
+          <a:p>
+            <a:pPr algn="ctr"/>
+            <a:endParaRPr lang="en-SG" sz="1600" b="1"/>
+          </a:p>
+        </p:txBody>
+      </p:sp>
+      <p:cxnSp>
+        <p:nvCxnSpPr>
+          <p:cNvPr id="87" name="Straight Connector 86"/>
+          <p:cNvCxnSpPr>
+            <a:stCxn id="86" idx="3"/>
+            <a:endCxn id="85" idx="0"/>
+          </p:cNvCxnSpPr>
+          <p:nvPr/>
+        </p:nvCxnSpPr>
+        <p:spPr>
+          <a:xfrm>
+            <a:off x="6124864" y="5782515"/>
+            <a:ext cx="0" cy="205329"/>
+          </a:xfrm>
+          <a:prstGeom prst="line">
+            <a:avLst/>
+          </a:prstGeom>
+        </p:spPr>
+        <p:style>
+          <a:lnRef idx="2">
+            <a:schemeClr val="accent6">
+              <a:shade val="50000"/>
+            </a:schemeClr>
+          </a:lnRef>
+          <a:fillRef idx="1">
+            <a:schemeClr val="accent6"/>
+          </a:fillRef>
+          <a:effectRef idx="0">
+            <a:schemeClr val="accent6"/>
+          </a:effectRef>
+          <a:fontRef idx="minor">
+            <a:schemeClr val="lt1"/>
+          </a:fontRef>
+        </p:style>
+      </p:cxnSp>
+      <p:sp>
+        <p:nvSpPr>
+          <p:cNvPr id="90" name="Rectangle 89"/>
+          <p:cNvSpPr/>
+          <p:nvPr/>
+        </p:nvSpPr>
+        <p:spPr>
+          <a:xfrm>
+            <a:off x="2332551" y="5068524"/>
+            <a:ext cx="1905000" cy="533400"/>
           </a:xfrm>
           <a:prstGeom prst="rect">
             <a:avLst/>
@@ -6317,12 +6351,8 @@
           <a:p>
             <a:pPr algn="ctr"/>
             <a:r>
-              <a:rPr lang="en-US" sz="1600" b="1" dirty="0" err="1" smtClean="0"/>
-              <a:t>EvaluationClosing</a:t>
-            </a:r>
-            <a:r>
               <a:rPr lang="en-US" sz="1600" b="1" dirty="0" smtClean="0"/>
-              <a:t/>
+              <a:t>Automated</a:t>
             </a:r>
             <a:br>
               <a:rPr lang="en-US" sz="1600" b="1" dirty="0" smtClean="0"/>
@@ -6337,13 +6367,13 @@
       </p:sp>
       <p:sp>
         <p:nvSpPr>
-          <p:cNvPr id="171" name="Rectangle 170"/>
+          <p:cNvPr id="91" name="Rectangle 90"/>
           <p:cNvSpPr/>
           <p:nvPr/>
         </p:nvSpPr>
         <p:spPr>
           <a:xfrm>
-            <a:off x="5105400" y="5440220"/>
+            <a:off x="2321968" y="5896372"/>
             <a:ext cx="2038928" cy="533400"/>
           </a:xfrm>
           <a:prstGeom prst="rect">
@@ -6392,16 +6422,16 @@
       </p:sp>
       <p:sp>
         <p:nvSpPr>
-          <p:cNvPr id="172" name="Isosceles Triangle 171"/>
+          <p:cNvPr id="92" name="Rectangle 91"/>
           <p:cNvSpPr/>
           <p:nvPr/>
         </p:nvSpPr>
         <p:spPr>
-          <a:xfrm rot="16200000">
-            <a:off x="4278524" y="5631871"/>
-            <a:ext cx="276225" cy="228600"/>
-          </a:xfrm>
-          <a:prstGeom prst="triangle">
+          <a:xfrm>
+            <a:off x="2265587" y="5956408"/>
+            <a:ext cx="2038928" cy="533400"/>
+          </a:xfrm>
+          <a:prstGeom prst="rect">
             <a:avLst/>
           </a:prstGeom>
         </p:spPr>
@@ -6426,24 +6456,37 @@
           <a:lstStyle/>
           <a:p>
             <a:pPr algn="ctr"/>
-            <a:endParaRPr lang="en-SG" sz="1600" b="1"/>
-          </a:p>
-        </p:txBody>
-      </p:sp>
-      <p:cxnSp>
-        <p:nvCxnSpPr>
-          <p:cNvPr id="12" name="Straight Connector 11"/>
-          <p:cNvCxnSpPr>
-            <a:stCxn id="172" idx="3"/>
-          </p:cNvCxnSpPr>
+            <a:r>
+              <a:rPr lang="en-US" sz="1600" b="1" dirty="0" err="1" smtClean="0"/>
+              <a:t>EvaluationClosing</a:t>
+            </a:r>
+            <a:r>
+              <a:rPr lang="en-US" sz="1600" b="1" dirty="0" smtClean="0"/>
+              <a:t/>
+            </a:r>
+            <a:br>
+              <a:rPr lang="en-US" sz="1600" b="1" dirty="0" smtClean="0"/>
+            </a:br>
+            <a:r>
+              <a:rPr lang="en-US" sz="1600" b="1" dirty="0" err="1" smtClean="0"/>
+              <a:t>RemindersServlet</a:t>
+            </a:r>
+            <a:endParaRPr lang="en-SG" sz="1600" b="1" dirty="0"/>
+          </a:p>
+        </p:txBody>
+      </p:sp>
+      <p:sp>
+        <p:nvSpPr>
+          <p:cNvPr id="93" name="Rectangle 92"/>
+          <p:cNvSpPr/>
           <p:nvPr/>
-        </p:nvCxnSpPr>
-        <p:spPr>
-          <a:xfrm>
-            <a:off x="4530937" y="5746171"/>
-            <a:ext cx="574463" cy="0"/>
-          </a:xfrm>
-          <a:prstGeom prst="line">
+        </p:nvSpPr>
+        <p:spPr>
+          <a:xfrm>
+            <a:off x="2196317" y="6002592"/>
+            <a:ext cx="2038928" cy="533400"/>
+          </a:xfrm>
+          <a:prstGeom prst="rect">
             <a:avLst/>
           </a:prstGeom>
         </p:spPr>
@@ -6458,6 +6501,316 @@
           </a:fillRef>
           <a:effectRef idx="0">
             <a:schemeClr val="accent5"/>
+          </a:effectRef>
+          <a:fontRef idx="minor">
+            <a:schemeClr val="lt1"/>
+          </a:fontRef>
+        </p:style>
+        <p:txBody>
+          <a:bodyPr rtlCol="0" anchor="ctr"/>
+          <a:lstStyle/>
+          <a:p>
+            <a:pPr algn="ctr"/>
+            <a:r>
+              <a:rPr lang="en-US" sz="1600" b="1" dirty="0" err="1" smtClean="0"/>
+              <a:t>EvaluationClosing</a:t>
+            </a:r>
+            <a:r>
+              <a:rPr lang="en-US" sz="1600" b="1" dirty="0" smtClean="0"/>
+              <a:t/>
+            </a:r>
+            <a:br>
+              <a:rPr lang="en-US" sz="1600" b="1" dirty="0" smtClean="0"/>
+            </a:br>
+            <a:r>
+              <a:rPr lang="en-US" sz="1600" b="1" dirty="0" err="1" smtClean="0"/>
+              <a:t>RemindersServlet</a:t>
+            </a:r>
+            <a:endParaRPr lang="en-SG" sz="1600" b="1" dirty="0"/>
+          </a:p>
+        </p:txBody>
+      </p:sp>
+      <p:sp>
+        <p:nvSpPr>
+          <p:cNvPr id="94" name="Isosceles Triangle 93"/>
+          <p:cNvSpPr/>
+          <p:nvPr/>
+        </p:nvSpPr>
+        <p:spPr>
+          <a:xfrm>
+            <a:off x="3077668" y="5598159"/>
+            <a:ext cx="276225" cy="228600"/>
+          </a:xfrm>
+          <a:prstGeom prst="triangle">
+            <a:avLst/>
+          </a:prstGeom>
+        </p:spPr>
+        <p:style>
+          <a:lnRef idx="2">
+            <a:schemeClr val="accent5">
+              <a:shade val="50000"/>
+            </a:schemeClr>
+          </a:lnRef>
+          <a:fillRef idx="1">
+            <a:schemeClr val="accent5"/>
+          </a:fillRef>
+          <a:effectRef idx="0">
+            <a:schemeClr val="accent5"/>
+          </a:effectRef>
+          <a:fontRef idx="minor">
+            <a:schemeClr val="lt1"/>
+          </a:fontRef>
+        </p:style>
+        <p:txBody>
+          <a:bodyPr rtlCol="0" anchor="ctr"/>
+          <a:lstStyle/>
+          <a:p>
+            <a:pPr algn="ctr"/>
+            <a:endParaRPr lang="en-SG" sz="1600" b="1"/>
+          </a:p>
+        </p:txBody>
+      </p:sp>
+      <p:cxnSp>
+        <p:nvCxnSpPr>
+          <p:cNvPr id="95" name="Straight Connector 94"/>
+          <p:cNvCxnSpPr>
+            <a:stCxn id="94" idx="3"/>
+            <a:endCxn id="93" idx="0"/>
+          </p:cNvCxnSpPr>
+          <p:nvPr/>
+        </p:nvCxnSpPr>
+        <p:spPr>
+          <a:xfrm>
+            <a:off x="3215781" y="5826759"/>
+            <a:ext cx="0" cy="175833"/>
+          </a:xfrm>
+          <a:prstGeom prst="line">
+            <a:avLst/>
+          </a:prstGeom>
+        </p:spPr>
+        <p:style>
+          <a:lnRef idx="2">
+            <a:schemeClr val="accent5">
+              <a:shade val="50000"/>
+            </a:schemeClr>
+          </a:lnRef>
+          <a:fillRef idx="1">
+            <a:schemeClr val="accent5"/>
+          </a:fillRef>
+          <a:effectRef idx="0">
+            <a:schemeClr val="accent5"/>
+          </a:effectRef>
+          <a:fontRef idx="minor">
+            <a:schemeClr val="lt1"/>
+          </a:fontRef>
+        </p:style>
+      </p:cxnSp>
+      <p:cxnSp>
+        <p:nvCxnSpPr>
+          <p:cNvPr id="96" name="Straight Arrow Connector 95"/>
+          <p:cNvCxnSpPr/>
+          <p:nvPr/>
+        </p:nvCxnSpPr>
+        <p:spPr>
+          <a:xfrm flipV="1">
+            <a:off x="6183273" y="6521244"/>
+            <a:ext cx="0" cy="381000"/>
+          </a:xfrm>
+          <a:prstGeom prst="straightConnector1">
+            <a:avLst/>
+          </a:prstGeom>
+          <a:ln w="38100">
+            <a:solidFill>
+              <a:schemeClr val="tx1"/>
+            </a:solidFill>
+            <a:prstDash val="sysDash"/>
+            <a:tailEnd type="arrow"/>
+          </a:ln>
+        </p:spPr>
+        <p:style>
+          <a:lnRef idx="1">
+            <a:schemeClr val="accent1"/>
+          </a:lnRef>
+          <a:fillRef idx="0">
+            <a:schemeClr val="accent1"/>
+          </a:fillRef>
+          <a:effectRef idx="0">
+            <a:schemeClr val="accent1"/>
+          </a:effectRef>
+          <a:fontRef idx="minor">
+            <a:schemeClr val="tx1"/>
+          </a:fontRef>
+        </p:style>
+      </p:cxnSp>
+      <p:sp>
+        <p:nvSpPr>
+          <p:cNvPr id="97" name="TextBox 96"/>
+          <p:cNvSpPr txBox="1"/>
+          <p:nvPr/>
+        </p:nvSpPr>
+        <p:spPr>
+          <a:xfrm>
+            <a:off x="4953000" y="6823067"/>
+            <a:ext cx="2149303" cy="307777"/>
+          </a:xfrm>
+          <a:prstGeom prst="rect">
+            <a:avLst/>
+          </a:prstGeom>
+          <a:grpFill/>
+          <a:ln>
+            <a:noFill/>
+          </a:ln>
+        </p:spPr>
+        <p:style>
+          <a:lnRef idx="2">
+            <a:schemeClr val="accent1">
+              <a:shade val="50000"/>
+            </a:schemeClr>
+          </a:lnRef>
+          <a:fillRef idx="1">
+            <a:schemeClr val="accent1"/>
+          </a:fillRef>
+          <a:effectRef idx="0">
+            <a:schemeClr val="accent1"/>
+          </a:effectRef>
+          <a:fontRef idx="minor">
+            <a:schemeClr val="lt1"/>
+          </a:fontRef>
+        </p:style>
+        <p:txBody>
+          <a:bodyPr rtlCol="0" anchor="t" anchorCtr="0"/>
+          <a:lstStyle>
+            <a:defPPr>
+              <a:defRPr lang="en-US"/>
+            </a:defPPr>
+            <a:lvl1pPr>
+              <a:defRPr sz="1400" b="1">
+                <a:solidFill>
+                  <a:srgbClr val="7030A0"/>
+                </a:solidFill>
+              </a:defRPr>
+            </a:lvl1pPr>
+            <a:lvl2pPr>
+              <a:defRPr>
+                <a:solidFill>
+                  <a:schemeClr val="lt1"/>
+                </a:solidFill>
+              </a:defRPr>
+            </a:lvl2pPr>
+            <a:lvl3pPr>
+              <a:defRPr>
+                <a:solidFill>
+                  <a:schemeClr val="lt1"/>
+                </a:solidFill>
+              </a:defRPr>
+            </a:lvl3pPr>
+            <a:lvl4pPr>
+              <a:defRPr>
+                <a:solidFill>
+                  <a:schemeClr val="lt1"/>
+                </a:solidFill>
+              </a:defRPr>
+            </a:lvl4pPr>
+            <a:lvl5pPr>
+              <a:defRPr>
+                <a:solidFill>
+                  <a:schemeClr val="lt1"/>
+                </a:solidFill>
+              </a:defRPr>
+            </a:lvl5pPr>
+            <a:lvl6pPr>
+              <a:defRPr>
+                <a:solidFill>
+                  <a:schemeClr val="lt1"/>
+                </a:solidFill>
+              </a:defRPr>
+            </a:lvl6pPr>
+            <a:lvl7pPr>
+              <a:defRPr>
+                <a:solidFill>
+                  <a:schemeClr val="lt1"/>
+                </a:solidFill>
+              </a:defRPr>
+            </a:lvl7pPr>
+            <a:lvl8pPr>
+              <a:defRPr>
+                <a:solidFill>
+                  <a:schemeClr val="lt1"/>
+                </a:solidFill>
+              </a:defRPr>
+            </a:lvl8pPr>
+            <a:lvl9pPr>
+              <a:defRPr>
+                <a:solidFill>
+                  <a:schemeClr val="lt1"/>
+                </a:solidFill>
+              </a:defRPr>
+            </a:lvl9pPr>
+          </a:lstStyle>
+          <a:p>
+            <a:pPr algn="r"/>
+            <a:r>
+              <a:rPr lang="en-US" dirty="0" smtClean="0">
+                <a:solidFill>
+                  <a:schemeClr val="tx1"/>
+                </a:solidFill>
+              </a:rPr>
+              <a:t>App engine </a:t>
+            </a:r>
+            <a:r>
+              <a:rPr lang="en-US" dirty="0" smtClean="0">
+                <a:solidFill>
+                  <a:schemeClr val="tx1"/>
+                </a:solidFill>
+              </a:rPr>
+              <a:t>task queues</a:t>
+            </a:r>
+            <a:endParaRPr lang="en-SG" dirty="0">
+              <a:solidFill>
+                <a:schemeClr val="tx1"/>
+              </a:solidFill>
+            </a:endParaRPr>
+          </a:p>
+        </p:txBody>
+      </p:sp>
+      <p:cxnSp>
+        <p:nvCxnSpPr>
+          <p:cNvPr id="98" name="Straight Arrow Connector 97"/>
+          <p:cNvCxnSpPr>
+            <a:stCxn id="91" idx="3"/>
+          </p:cNvCxnSpPr>
+          <p:nvPr/>
+        </p:nvCxnSpPr>
+        <p:spPr>
+          <a:xfrm>
+            <a:off x="4360896" y="6163072"/>
+            <a:ext cx="754782" cy="15794"/>
+          </a:xfrm>
+          <a:prstGeom prst="straightConnector1">
+            <a:avLst/>
+          </a:prstGeom>
+          <a:ln>
+            <a:solidFill>
+              <a:schemeClr val="accent5">
+                <a:lumMod val="75000"/>
+              </a:schemeClr>
+            </a:solidFill>
+            <a:prstDash val="sysDash"/>
+            <a:headEnd type="none" w="med" len="med"/>
+            <a:tailEnd type="arrow" w="med" len="med"/>
+          </a:ln>
+        </p:spPr>
+        <p:style>
+          <a:lnRef idx="2">
+            <a:schemeClr val="accent2">
+              <a:shade val="50000"/>
+            </a:schemeClr>
+          </a:lnRef>
+          <a:fillRef idx="1">
+            <a:schemeClr val="accent2"/>
+          </a:fillRef>
+          <a:effectRef idx="0">
+            <a:schemeClr val="accent2"/>
           </a:effectRef>
           <a:fontRef idx="minor">
             <a:schemeClr val="lt1"/>

</xml_diff>